<commit_message>
information propagation subchapter done
</commit_message>
<xml_diff>
--- a/presentations/GrafikenThesis.pptx
+++ b/presentations/GrafikenThesis.pptx
@@ -5,9 +5,10 @@
     <p:sldMasterId id="2147483648" r:id="rId1"/>
   </p:sldMasterIdLst>
   <p:sldIdLst>
-    <p:sldId id="256" r:id="rId2"/>
-    <p:sldId id="257" r:id="rId3"/>
-    <p:sldId id="258" r:id="rId4"/>
+    <p:sldId id="257" r:id="rId2"/>
+    <p:sldId id="258" r:id="rId3"/>
+    <p:sldId id="259" r:id="rId4"/>
+    <p:sldId id="260" r:id="rId5"/>
   </p:sldIdLst>
   <p:sldSz cx="12192000" cy="6858000"/>
   <p:notesSz cx="6858000" cy="9144000"/>
@@ -106,6 +107,11 @@
       </a:defRPr>
     </a:lvl9pPr>
   </p:defaultTextStyle>
+  <p:extLst>
+    <p:ext uri="{EFAFB233-063F-42B5-8137-9DF3F51BA10A}">
+      <p15:sldGuideLst xmlns:p15="http://schemas.microsoft.com/office/powerpoint/2012/main"/>
+    </p:ext>
+  </p:extLst>
 </p:presentation>
 </file>
 
@@ -256,7 +262,7 @@
           <a:p>
             <a:fld id="{1E68AC87-6ADD-4255-8209-B0E6CC8A4267}" type="datetimeFigureOut">
               <a:rPr lang="de-DE" smtClean="0"/>
-              <a:t>03.08.2023</a:t>
+              <a:t>10.08.2023</a:t>
             </a:fld>
             <a:endParaRPr lang="de-DE"/>
           </a:p>
@@ -454,7 +460,7 @@
           <a:p>
             <a:fld id="{1E68AC87-6ADD-4255-8209-B0E6CC8A4267}" type="datetimeFigureOut">
               <a:rPr lang="de-DE" smtClean="0"/>
-              <a:t>03.08.2023</a:t>
+              <a:t>10.08.2023</a:t>
             </a:fld>
             <a:endParaRPr lang="de-DE"/>
           </a:p>
@@ -662,7 +668,7 @@
           <a:p>
             <a:fld id="{1E68AC87-6ADD-4255-8209-B0E6CC8A4267}" type="datetimeFigureOut">
               <a:rPr lang="de-DE" smtClean="0"/>
-              <a:t>03.08.2023</a:t>
+              <a:t>10.08.2023</a:t>
             </a:fld>
             <a:endParaRPr lang="de-DE"/>
           </a:p>
@@ -860,7 +866,7 @@
           <a:p>
             <a:fld id="{1E68AC87-6ADD-4255-8209-B0E6CC8A4267}" type="datetimeFigureOut">
               <a:rPr lang="de-DE" smtClean="0"/>
-              <a:t>03.08.2023</a:t>
+              <a:t>10.08.2023</a:t>
             </a:fld>
             <a:endParaRPr lang="de-DE"/>
           </a:p>
@@ -1135,7 +1141,7 @@
           <a:p>
             <a:fld id="{1E68AC87-6ADD-4255-8209-B0E6CC8A4267}" type="datetimeFigureOut">
               <a:rPr lang="de-DE" smtClean="0"/>
-              <a:t>03.08.2023</a:t>
+              <a:t>10.08.2023</a:t>
             </a:fld>
             <a:endParaRPr lang="de-DE"/>
           </a:p>
@@ -1400,7 +1406,7 @@
           <a:p>
             <a:fld id="{1E68AC87-6ADD-4255-8209-B0E6CC8A4267}" type="datetimeFigureOut">
               <a:rPr lang="de-DE" smtClean="0"/>
-              <a:t>03.08.2023</a:t>
+              <a:t>10.08.2023</a:t>
             </a:fld>
             <a:endParaRPr lang="de-DE"/>
           </a:p>
@@ -1812,7 +1818,7 @@
           <a:p>
             <a:fld id="{1E68AC87-6ADD-4255-8209-B0E6CC8A4267}" type="datetimeFigureOut">
               <a:rPr lang="de-DE" smtClean="0"/>
-              <a:t>03.08.2023</a:t>
+              <a:t>10.08.2023</a:t>
             </a:fld>
             <a:endParaRPr lang="de-DE"/>
           </a:p>
@@ -1953,7 +1959,7 @@
           <a:p>
             <a:fld id="{1E68AC87-6ADD-4255-8209-B0E6CC8A4267}" type="datetimeFigureOut">
               <a:rPr lang="de-DE" smtClean="0"/>
-              <a:t>03.08.2023</a:t>
+              <a:t>10.08.2023</a:t>
             </a:fld>
             <a:endParaRPr lang="de-DE"/>
           </a:p>
@@ -2066,7 +2072,7 @@
           <a:p>
             <a:fld id="{1E68AC87-6ADD-4255-8209-B0E6CC8A4267}" type="datetimeFigureOut">
               <a:rPr lang="de-DE" smtClean="0"/>
-              <a:t>03.08.2023</a:t>
+              <a:t>10.08.2023</a:t>
             </a:fld>
             <a:endParaRPr lang="de-DE"/>
           </a:p>
@@ -2377,7 +2383,7 @@
           <a:p>
             <a:fld id="{1E68AC87-6ADD-4255-8209-B0E6CC8A4267}" type="datetimeFigureOut">
               <a:rPr lang="de-DE" smtClean="0"/>
-              <a:t>03.08.2023</a:t>
+              <a:t>10.08.2023</a:t>
             </a:fld>
             <a:endParaRPr lang="de-DE"/>
           </a:p>
@@ -2665,7 +2671,7 @@
           <a:p>
             <a:fld id="{1E68AC87-6ADD-4255-8209-B0E6CC8A4267}" type="datetimeFigureOut">
               <a:rPr lang="de-DE" smtClean="0"/>
-              <a:t>03.08.2023</a:t>
+              <a:t>10.08.2023</a:t>
             </a:fld>
             <a:endParaRPr lang="de-DE"/>
           </a:p>
@@ -2906,7 +2912,7 @@
           <a:p>
             <a:fld id="{1E68AC87-6ADD-4255-8209-B0E6CC8A4267}" type="datetimeFigureOut">
               <a:rPr lang="de-DE" smtClean="0"/>
-              <a:t>03.08.2023</a:t>
+              <a:t>10.08.2023</a:t>
             </a:fld>
             <a:endParaRPr lang="de-DE"/>
           </a:p>
@@ -3325,86 +3331,6 @@
       </p:grpSpPr>
       <p:sp>
         <p:nvSpPr>
-          <p:cNvPr id="2" name="Titel 1">
-            <a:extLst>
-              <a:ext uri="{FF2B5EF4-FFF2-40B4-BE49-F238E27FC236}">
-                <a16:creationId xmlns:a16="http://schemas.microsoft.com/office/drawing/2014/main" id="{8A1C645A-94D3-0DCF-C546-3F58A5BAFFE9}"/>
-              </a:ext>
-            </a:extLst>
-          </p:cNvPr>
-          <p:cNvSpPr>
-            <a:spLocks noGrp="1"/>
-          </p:cNvSpPr>
-          <p:nvPr>
-            <p:ph type="ctrTitle"/>
-          </p:nvPr>
-        </p:nvSpPr>
-        <p:spPr/>
-        <p:txBody>
-          <a:bodyPr/>
-          <a:lstStyle/>
-          <a:p>
-            <a:endParaRPr lang="de-DE"/>
-          </a:p>
-        </p:txBody>
-      </p:sp>
-      <p:sp>
-        <p:nvSpPr>
-          <p:cNvPr id="3" name="Untertitel 2">
-            <a:extLst>
-              <a:ext uri="{FF2B5EF4-FFF2-40B4-BE49-F238E27FC236}">
-                <a16:creationId xmlns:a16="http://schemas.microsoft.com/office/drawing/2014/main" id="{B6CAF8B6-A3F1-AF12-7B1A-889B1D28D093}"/>
-              </a:ext>
-            </a:extLst>
-          </p:cNvPr>
-          <p:cNvSpPr>
-            <a:spLocks noGrp="1"/>
-          </p:cNvSpPr>
-          <p:nvPr>
-            <p:ph type="subTitle" idx="1"/>
-          </p:nvPr>
-        </p:nvSpPr>
-        <p:spPr/>
-        <p:txBody>
-          <a:bodyPr/>
-          <a:lstStyle/>
-          <a:p>
-            <a:endParaRPr lang="de-DE"/>
-          </a:p>
-        </p:txBody>
-      </p:sp>
-    </p:spTree>
-    <p:extLst>
-      <p:ext uri="{BB962C8B-B14F-4D97-AF65-F5344CB8AC3E}">
-        <p14:creationId xmlns:p14="http://schemas.microsoft.com/office/powerpoint/2010/main" val="2686893804"/>
-      </p:ext>
-    </p:extLst>
-  </p:cSld>
-  <p:clrMapOvr>
-    <a:masterClrMapping/>
-  </p:clrMapOvr>
-</p:sld>
-</file>
-
-<file path=ppt/slides/slide2.xml><?xml version="1.0" encoding="utf-8"?>
-<p:sld xmlns:a="http://schemas.openxmlformats.org/drawingml/2006/main" xmlns:r="http://schemas.openxmlformats.org/officeDocument/2006/relationships" xmlns:p="http://schemas.openxmlformats.org/presentationml/2006/main">
-  <p:cSld>
-    <p:spTree>
-      <p:nvGrpSpPr>
-        <p:cNvPr id="1" name=""/>
-        <p:cNvGrpSpPr/>
-        <p:nvPr/>
-      </p:nvGrpSpPr>
-      <p:grpSpPr>
-        <a:xfrm>
-          <a:off x="0" y="0"/>
-          <a:ext cx="0" cy="0"/>
-          <a:chOff x="0" y="0"/>
-          <a:chExt cx="0" cy="0"/>
-        </a:xfrm>
-      </p:grpSpPr>
-      <p:sp>
-        <p:nvSpPr>
           <p:cNvPr id="4" name="Rechteck: abgerundete Ecken 3">
             <a:extLst>
               <a:ext uri="{FF2B5EF4-FFF2-40B4-BE49-F238E27FC236}">
@@ -3544,8 +3470,8 @@
           </a:p>
         </p:txBody>
       </p:sp>
-      <mc:AlternateContent xmlns:mc="http://schemas.openxmlformats.org/markup-compatibility/2006">
-        <mc:Choice xmlns:a14="http://schemas.microsoft.com/office/drawing/2010/main" Requires="a14">
+      <mc:AlternateContent xmlns:mc="http://schemas.openxmlformats.org/markup-compatibility/2006" xmlns:a14="http://schemas.microsoft.com/office/drawing/2010/main">
+        <mc:Choice Requires="a14">
           <p:sp>
             <p:nvSpPr>
               <p:cNvPr id="7" name="Rechteck: abgerundete Ecken 6">
@@ -3690,7 +3616,7 @@
             </p:txBody>
           </p:sp>
         </mc:Choice>
-        <mc:Fallback>
+        <mc:Fallback xmlns="">
           <p:sp>
             <p:nvSpPr>
               <p:cNvPr id="7" name="Rechteck: abgerundete Ecken 6">
@@ -4009,7 +3935,7 @@
 </p:sld>
 </file>
 
-<file path=ppt/slides/slide3.xml><?xml version="1.0" encoding="utf-8"?>
+<file path=ppt/slides/slide2.xml><?xml version="1.0" encoding="utf-8"?>
 <p:sld xmlns:a="http://schemas.openxmlformats.org/drawingml/2006/main" xmlns:r="http://schemas.openxmlformats.org/officeDocument/2006/relationships" xmlns:p="http://schemas.openxmlformats.org/presentationml/2006/main">
   <p:cSld>
     <p:spTree>
@@ -4351,6 +4277,2532 @@
     <p:extLst>
       <p:ext uri="{BB962C8B-B14F-4D97-AF65-F5344CB8AC3E}">
         <p14:creationId xmlns:p14="http://schemas.microsoft.com/office/powerpoint/2010/main" val="3958632156"/>
+      </p:ext>
+    </p:extLst>
+  </p:cSld>
+  <p:clrMapOvr>
+    <a:masterClrMapping/>
+  </p:clrMapOvr>
+</p:sld>
+</file>
+
+<file path=ppt/slides/slide3.xml><?xml version="1.0" encoding="utf-8"?>
+<p:sld xmlns:a="http://schemas.openxmlformats.org/drawingml/2006/main" xmlns:r="http://schemas.openxmlformats.org/officeDocument/2006/relationships" xmlns:p="http://schemas.openxmlformats.org/presentationml/2006/main">
+  <p:cSld>
+    <p:spTree>
+      <p:nvGrpSpPr>
+        <p:cNvPr id="1" name=""/>
+        <p:cNvGrpSpPr/>
+        <p:nvPr/>
+      </p:nvGrpSpPr>
+      <p:grpSpPr>
+        <a:xfrm>
+          <a:off x="0" y="0"/>
+          <a:ext cx="0" cy="0"/>
+          <a:chOff x="0" y="0"/>
+          <a:chExt cx="0" cy="0"/>
+        </a:xfrm>
+      </p:grpSpPr>
+      <p:sp>
+        <p:nvSpPr>
+          <p:cNvPr id="20" name="Rechteck: abgerundete Ecken 19">
+            <a:extLst>
+              <a:ext uri="{FF2B5EF4-FFF2-40B4-BE49-F238E27FC236}">
+                <a16:creationId xmlns:a16="http://schemas.microsoft.com/office/drawing/2014/main" id="{5A379E40-7E59-9FEE-9886-46012A954383}"/>
+              </a:ext>
+            </a:extLst>
+          </p:cNvPr>
+          <p:cNvSpPr/>
+          <p:nvPr/>
+        </p:nvSpPr>
+        <p:spPr>
+          <a:xfrm>
+            <a:off x="3010679" y="3312369"/>
+            <a:ext cx="1785256" cy="606489"/>
+          </a:xfrm>
+          <a:prstGeom prst="roundRect">
+            <a:avLst/>
+          </a:prstGeom>
+        </p:spPr>
+        <p:style>
+          <a:lnRef idx="2">
+            <a:schemeClr val="dk1"/>
+          </a:lnRef>
+          <a:fillRef idx="1">
+            <a:schemeClr val="lt1"/>
+          </a:fillRef>
+          <a:effectRef idx="0">
+            <a:schemeClr val="dk1"/>
+          </a:effectRef>
+          <a:fontRef idx="minor">
+            <a:schemeClr val="dk1"/>
+          </a:fontRef>
+        </p:style>
+        <p:txBody>
+          <a:bodyPr rtlCol="0" anchor="ctr"/>
+          <a:lstStyle/>
+          <a:p>
+            <a:pPr algn="ctr"/>
+            <a:r>
+              <a:rPr lang="en-US" dirty="0"/>
+              <a:t>Recovered</a:t>
+            </a:r>
+          </a:p>
+        </p:txBody>
+      </p:sp>
+      <p:sp>
+        <p:nvSpPr>
+          <p:cNvPr id="21" name="Rechteck: abgerundete Ecken 20">
+            <a:extLst>
+              <a:ext uri="{FF2B5EF4-FFF2-40B4-BE49-F238E27FC236}">
+                <a16:creationId xmlns:a16="http://schemas.microsoft.com/office/drawing/2014/main" id="{7756CC12-E744-AC19-8EC1-1EBB65B6A8FD}"/>
+              </a:ext>
+            </a:extLst>
+          </p:cNvPr>
+          <p:cNvSpPr/>
+          <p:nvPr/>
+        </p:nvSpPr>
+        <p:spPr>
+          <a:xfrm>
+            <a:off x="6859904" y="3312368"/>
+            <a:ext cx="1785256" cy="606489"/>
+          </a:xfrm>
+          <a:prstGeom prst="roundRect">
+            <a:avLst/>
+          </a:prstGeom>
+        </p:spPr>
+        <p:style>
+          <a:lnRef idx="2">
+            <a:schemeClr val="dk1"/>
+          </a:lnRef>
+          <a:fillRef idx="1">
+            <a:schemeClr val="lt1"/>
+          </a:fillRef>
+          <a:effectRef idx="0">
+            <a:schemeClr val="dk1"/>
+          </a:effectRef>
+          <a:fontRef idx="minor">
+            <a:schemeClr val="dk1"/>
+          </a:fontRef>
+        </p:style>
+        <p:txBody>
+          <a:bodyPr rtlCol="0" anchor="ctr"/>
+          <a:lstStyle/>
+          <a:p>
+            <a:pPr algn="ctr"/>
+            <a:r>
+              <a:rPr lang="en-US" dirty="0"/>
+              <a:t>Infected</a:t>
+            </a:r>
+          </a:p>
+        </p:txBody>
+      </p:sp>
+      <p:sp>
+        <p:nvSpPr>
+          <p:cNvPr id="22" name="Rechteck: abgerundete Ecken 21">
+            <a:extLst>
+              <a:ext uri="{FF2B5EF4-FFF2-40B4-BE49-F238E27FC236}">
+                <a16:creationId xmlns:a16="http://schemas.microsoft.com/office/drawing/2014/main" id="{B223C3EF-F53E-54AA-6EC1-1083EB1EF05F}"/>
+              </a:ext>
+            </a:extLst>
+          </p:cNvPr>
+          <p:cNvSpPr/>
+          <p:nvPr/>
+        </p:nvSpPr>
+        <p:spPr>
+          <a:xfrm>
+            <a:off x="5057018" y="1570648"/>
+            <a:ext cx="1785256" cy="606489"/>
+          </a:xfrm>
+          <a:prstGeom prst="roundRect">
+            <a:avLst/>
+          </a:prstGeom>
+        </p:spPr>
+        <p:style>
+          <a:lnRef idx="2">
+            <a:schemeClr val="dk1"/>
+          </a:lnRef>
+          <a:fillRef idx="1">
+            <a:schemeClr val="lt1"/>
+          </a:fillRef>
+          <a:effectRef idx="0">
+            <a:schemeClr val="dk1"/>
+          </a:effectRef>
+          <a:fontRef idx="minor">
+            <a:schemeClr val="dk1"/>
+          </a:fontRef>
+        </p:style>
+        <p:txBody>
+          <a:bodyPr rtlCol="0" anchor="ctr"/>
+          <a:lstStyle/>
+          <a:p>
+            <a:pPr algn="ctr"/>
+            <a:r>
+              <a:rPr lang="en-US" dirty="0"/>
+              <a:t>Susceptible</a:t>
+            </a:r>
+          </a:p>
+        </p:txBody>
+      </p:sp>
+      <p:cxnSp>
+        <p:nvCxnSpPr>
+          <p:cNvPr id="24" name="Gerade Verbindung mit Pfeil 23">
+            <a:extLst>
+              <a:ext uri="{FF2B5EF4-FFF2-40B4-BE49-F238E27FC236}">
+                <a16:creationId xmlns:a16="http://schemas.microsoft.com/office/drawing/2014/main" id="{B6A8F3D3-D071-EE1B-EF41-29AAF7F74131}"/>
+              </a:ext>
+            </a:extLst>
+          </p:cNvPr>
+          <p:cNvCxnSpPr>
+            <a:cxnSpLocks/>
+          </p:cNvCxnSpPr>
+          <p:nvPr/>
+        </p:nvCxnSpPr>
+        <p:spPr>
+          <a:xfrm flipH="1">
+            <a:off x="3671882" y="2175353"/>
+            <a:ext cx="1660847" cy="1135227"/>
+          </a:xfrm>
+          <a:prstGeom prst="straightConnector1">
+            <a:avLst/>
+          </a:prstGeom>
+          <a:ln>
+            <a:tailEnd type="triangle"/>
+          </a:ln>
+        </p:spPr>
+        <p:style>
+          <a:lnRef idx="1">
+            <a:schemeClr val="dk1"/>
+          </a:lnRef>
+          <a:fillRef idx="0">
+            <a:schemeClr val="dk1"/>
+          </a:fillRef>
+          <a:effectRef idx="0">
+            <a:schemeClr val="dk1"/>
+          </a:effectRef>
+          <a:fontRef idx="minor">
+            <a:schemeClr val="tx1"/>
+          </a:fontRef>
+        </p:style>
+      </p:cxnSp>
+      <p:cxnSp>
+        <p:nvCxnSpPr>
+          <p:cNvPr id="26" name="Gerade Verbindung mit Pfeil 25">
+            <a:extLst>
+              <a:ext uri="{FF2B5EF4-FFF2-40B4-BE49-F238E27FC236}">
+                <a16:creationId xmlns:a16="http://schemas.microsoft.com/office/drawing/2014/main" id="{781F4E6E-6180-69EB-0C34-09F93EDCCF07}"/>
+              </a:ext>
+            </a:extLst>
+          </p:cNvPr>
+          <p:cNvCxnSpPr/>
+          <p:nvPr/>
+        </p:nvCxnSpPr>
+        <p:spPr>
+          <a:xfrm flipV="1">
+            <a:off x="4116494" y="2181587"/>
+            <a:ext cx="1567543" cy="1135226"/>
+          </a:xfrm>
+          <a:prstGeom prst="straightConnector1">
+            <a:avLst/>
+          </a:prstGeom>
+          <a:ln>
+            <a:tailEnd type="triangle"/>
+          </a:ln>
+        </p:spPr>
+        <p:style>
+          <a:lnRef idx="1">
+            <a:schemeClr val="dk1"/>
+          </a:lnRef>
+          <a:fillRef idx="0">
+            <a:schemeClr val="dk1"/>
+          </a:fillRef>
+          <a:effectRef idx="0">
+            <a:schemeClr val="dk1"/>
+          </a:effectRef>
+          <a:fontRef idx="minor">
+            <a:schemeClr val="tx1"/>
+          </a:fontRef>
+        </p:style>
+      </p:cxnSp>
+      <mc:AlternateContent xmlns:mc="http://schemas.openxmlformats.org/markup-compatibility/2006">
+        <mc:Choice xmlns:a14="http://schemas.microsoft.com/office/drawing/2010/main" Requires="a14">
+          <p:sp>
+            <p:nvSpPr>
+              <p:cNvPr id="27" name="Textfeld 26">
+                <a:extLst>
+                  <a:ext uri="{FF2B5EF4-FFF2-40B4-BE49-F238E27FC236}">
+                    <a16:creationId xmlns:a16="http://schemas.microsoft.com/office/drawing/2014/main" id="{A52C0655-7A89-9EBF-A7AF-6E6AB38A2B4B}"/>
+                  </a:ext>
+                </a:extLst>
+              </p:cNvPr>
+              <p:cNvSpPr txBox="1"/>
+              <p:nvPr/>
+            </p:nvSpPr>
+            <p:spPr>
+              <a:xfrm>
+                <a:off x="3714965" y="2424094"/>
+                <a:ext cx="813492" cy="232949"/>
+              </a:xfrm>
+              <a:prstGeom prst="rect">
+                <a:avLst/>
+              </a:prstGeom>
+              <a:noFill/>
+            </p:spPr>
+            <p:txBody>
+              <a:bodyPr wrap="none" lIns="0" tIns="0" rIns="0" bIns="0" rtlCol="0">
+                <a:spAutoFit/>
+              </a:bodyPr>
+              <a:lstStyle/>
+              <a:p>
+                <a14:m>
+                  <m:oMathPara xmlns:m="http://schemas.openxmlformats.org/officeDocument/2006/math">
+                    <m:oMathParaPr>
+                      <m:jc m:val="centerGroup"/>
+                    </m:oMathParaPr>
+                    <m:oMath xmlns:m="http://schemas.openxmlformats.org/officeDocument/2006/math">
+                      <m:sSub>
+                        <m:sSubPr>
+                          <m:ctrlPr>
+                            <a:rPr lang="de-DE" sz="1400" b="0" i="1" smtClean="0">
+                              <a:latin typeface="Cambria Math" panose="02040503050406030204" pitchFamily="18" charset="0"/>
+                            </a:rPr>
+                          </m:ctrlPr>
+                        </m:sSubPr>
+                        <m:e>
+                          <m:r>
+                            <a:rPr lang="de-DE" sz="1400" b="0" i="1" smtClean="0">
+                              <a:latin typeface="Cambria Math" panose="02040503050406030204" pitchFamily="18" charset="0"/>
+                            </a:rPr>
+                            <m:t>𝑔</m:t>
+                          </m:r>
+                        </m:e>
+                        <m:sub>
+                          <m:r>
+                            <a:rPr lang="de-DE" sz="1400" b="0" i="1" smtClean="0">
+                              <a:latin typeface="Cambria Math" panose="02040503050406030204" pitchFamily="18" charset="0"/>
+                            </a:rPr>
+                            <m:t>𝑛𝑒𝑖𝑔h𝑏𝑜𝑟𝑠</m:t>
+                          </m:r>
+                        </m:sub>
+                      </m:sSub>
+                    </m:oMath>
+                  </m:oMathPara>
+                </a14:m>
+                <a:endParaRPr lang="de-DE" sz="1400" dirty="0"/>
+              </a:p>
+            </p:txBody>
+          </p:sp>
+        </mc:Choice>
+        <mc:Fallback>
+          <p:sp>
+            <p:nvSpPr>
+              <p:cNvPr id="27" name="Textfeld 26">
+                <a:extLst>
+                  <a:ext uri="{FF2B5EF4-FFF2-40B4-BE49-F238E27FC236}">
+                    <a16:creationId xmlns:a16="http://schemas.microsoft.com/office/drawing/2014/main" id="{A52C0655-7A89-9EBF-A7AF-6E6AB38A2B4B}"/>
+                  </a:ext>
+                </a:extLst>
+              </p:cNvPr>
+              <p:cNvSpPr txBox="1">
+                <a:spLocks noRot="1" noChangeAspect="1" noMove="1" noResize="1" noEditPoints="1" noAdjustHandles="1" noChangeArrowheads="1" noChangeShapeType="1" noTextEdit="1"/>
+              </p:cNvSpPr>
+              <p:nvPr/>
+            </p:nvSpPr>
+            <p:spPr>
+              <a:xfrm>
+                <a:off x="3714965" y="2424094"/>
+                <a:ext cx="813492" cy="232949"/>
+              </a:xfrm>
+              <a:prstGeom prst="rect">
+                <a:avLst/>
+              </a:prstGeom>
+              <a:blipFill>
+                <a:blip r:embed="rId2"/>
+                <a:stretch>
+                  <a:fillRect l="-4478" r="-2239" b="-23684"/>
+                </a:stretch>
+              </a:blipFill>
+            </p:spPr>
+            <p:txBody>
+              <a:bodyPr/>
+              <a:lstStyle/>
+              <a:p>
+                <a:r>
+                  <a:rPr lang="de-DE">
+                    <a:noFill/>
+                  </a:rPr>
+                  <a:t> </a:t>
+                </a:r>
+              </a:p>
+            </p:txBody>
+          </p:sp>
+        </mc:Fallback>
+      </mc:AlternateContent>
+      <mc:AlternateContent xmlns:mc="http://schemas.openxmlformats.org/markup-compatibility/2006">
+        <mc:Choice xmlns:a14="http://schemas.microsoft.com/office/drawing/2010/main" Requires="a14">
+          <p:sp>
+            <p:nvSpPr>
+              <p:cNvPr id="29" name="Textfeld 28">
+                <a:extLst>
+                  <a:ext uri="{FF2B5EF4-FFF2-40B4-BE49-F238E27FC236}">
+                    <a16:creationId xmlns:a16="http://schemas.microsoft.com/office/drawing/2014/main" id="{67F37BC4-3BEA-6F17-AA92-48B8E0F4D7E2}"/>
+                  </a:ext>
+                </a:extLst>
+              </p:cNvPr>
+              <p:cNvSpPr txBox="1"/>
+              <p:nvPr/>
+            </p:nvSpPr>
+            <p:spPr>
+              <a:xfrm>
+                <a:off x="5667540" y="2481944"/>
+                <a:ext cx="582660" cy="232949"/>
+              </a:xfrm>
+              <a:prstGeom prst="rect">
+                <a:avLst/>
+              </a:prstGeom>
+              <a:noFill/>
+            </p:spPr>
+            <p:txBody>
+              <a:bodyPr wrap="none" lIns="0" tIns="0" rIns="0" bIns="0" rtlCol="0">
+                <a:spAutoFit/>
+              </a:bodyPr>
+              <a:lstStyle/>
+              <a:p>
+                <a14:m>
+                  <m:oMathPara xmlns:m="http://schemas.openxmlformats.org/officeDocument/2006/math">
+                    <m:oMathParaPr>
+                      <m:jc m:val="centerGroup"/>
+                    </m:oMathParaPr>
+                    <m:oMath xmlns:m="http://schemas.openxmlformats.org/officeDocument/2006/math">
+                      <m:sSub>
+                        <m:sSubPr>
+                          <m:ctrlPr>
+                            <a:rPr lang="de-DE" sz="1400" b="0" i="1" smtClean="0">
+                              <a:latin typeface="Cambria Math" panose="02040503050406030204" pitchFamily="18" charset="0"/>
+                            </a:rPr>
+                          </m:ctrlPr>
+                        </m:sSubPr>
+                        <m:e>
+                          <m:r>
+                            <a:rPr lang="de-DE" sz="1400" b="0" i="1" smtClean="0">
+                              <a:latin typeface="Cambria Math" panose="02040503050406030204" pitchFamily="18" charset="0"/>
+                            </a:rPr>
+                            <m:t>𝑝</m:t>
+                          </m:r>
+                        </m:e>
+                        <m:sub>
+                          <m:r>
+                            <a:rPr lang="de-DE" sz="1400" b="0" i="1" smtClean="0">
+                              <a:latin typeface="Cambria Math" panose="02040503050406030204" pitchFamily="18" charset="0"/>
+                            </a:rPr>
+                            <m:t>𝑓𝑜𝑟𝑔𝑒𝑡</m:t>
+                          </m:r>
+                        </m:sub>
+                      </m:sSub>
+                    </m:oMath>
+                  </m:oMathPara>
+                </a14:m>
+                <a:endParaRPr lang="de-DE" sz="1400" dirty="0"/>
+              </a:p>
+            </p:txBody>
+          </p:sp>
+        </mc:Choice>
+        <mc:Fallback>
+          <p:sp>
+            <p:nvSpPr>
+              <p:cNvPr id="29" name="Textfeld 28">
+                <a:extLst>
+                  <a:ext uri="{FF2B5EF4-FFF2-40B4-BE49-F238E27FC236}">
+                    <a16:creationId xmlns:a16="http://schemas.microsoft.com/office/drawing/2014/main" id="{67F37BC4-3BEA-6F17-AA92-48B8E0F4D7E2}"/>
+                  </a:ext>
+                </a:extLst>
+              </p:cNvPr>
+              <p:cNvSpPr txBox="1">
+                <a:spLocks noRot="1" noChangeAspect="1" noMove="1" noResize="1" noEditPoints="1" noAdjustHandles="1" noChangeArrowheads="1" noChangeShapeType="1" noTextEdit="1"/>
+              </p:cNvSpPr>
+              <p:nvPr/>
+            </p:nvSpPr>
+            <p:spPr>
+              <a:xfrm>
+                <a:off x="5667540" y="2481944"/>
+                <a:ext cx="582660" cy="232949"/>
+              </a:xfrm>
+              <a:prstGeom prst="rect">
+                <a:avLst/>
+              </a:prstGeom>
+              <a:blipFill>
+                <a:blip r:embed="rId3"/>
+                <a:stretch>
+                  <a:fillRect l="-7368" r="-3158" b="-26316"/>
+                </a:stretch>
+              </a:blipFill>
+            </p:spPr>
+            <p:txBody>
+              <a:bodyPr/>
+              <a:lstStyle/>
+              <a:p>
+                <a:r>
+                  <a:rPr lang="de-DE">
+                    <a:noFill/>
+                  </a:rPr>
+                  <a:t> </a:t>
+                </a:r>
+              </a:p>
+            </p:txBody>
+          </p:sp>
+        </mc:Fallback>
+      </mc:AlternateContent>
+      <p:cxnSp>
+        <p:nvCxnSpPr>
+          <p:cNvPr id="30" name="Gerade Verbindung mit Pfeil 29">
+            <a:extLst>
+              <a:ext uri="{FF2B5EF4-FFF2-40B4-BE49-F238E27FC236}">
+                <a16:creationId xmlns:a16="http://schemas.microsoft.com/office/drawing/2014/main" id="{EEDDD0A5-62A1-8491-A4F3-9DF3DF6C3309}"/>
+              </a:ext>
+            </a:extLst>
+          </p:cNvPr>
+          <p:cNvCxnSpPr>
+            <a:cxnSpLocks/>
+          </p:cNvCxnSpPr>
+          <p:nvPr/>
+        </p:nvCxnSpPr>
+        <p:spPr>
+          <a:xfrm>
+            <a:off x="6502018" y="2173993"/>
+            <a:ext cx="1413414" cy="1135229"/>
+          </a:xfrm>
+          <a:prstGeom prst="straightConnector1">
+            <a:avLst/>
+          </a:prstGeom>
+          <a:ln>
+            <a:tailEnd type="triangle"/>
+          </a:ln>
+        </p:spPr>
+        <p:style>
+          <a:lnRef idx="1">
+            <a:schemeClr val="dk1"/>
+          </a:lnRef>
+          <a:fillRef idx="0">
+            <a:schemeClr val="dk1"/>
+          </a:fillRef>
+          <a:effectRef idx="0">
+            <a:schemeClr val="dk1"/>
+          </a:effectRef>
+          <a:fontRef idx="minor">
+            <a:schemeClr val="tx1"/>
+          </a:fontRef>
+        </p:style>
+      </p:cxnSp>
+      <p:cxnSp>
+        <p:nvCxnSpPr>
+          <p:cNvPr id="33" name="Gerade Verbindung mit Pfeil 32">
+            <a:extLst>
+              <a:ext uri="{FF2B5EF4-FFF2-40B4-BE49-F238E27FC236}">
+                <a16:creationId xmlns:a16="http://schemas.microsoft.com/office/drawing/2014/main" id="{3DEABD77-16C0-0802-BAFD-9DD6B81A5BC7}"/>
+              </a:ext>
+            </a:extLst>
+          </p:cNvPr>
+          <p:cNvCxnSpPr>
+            <a:cxnSpLocks/>
+          </p:cNvCxnSpPr>
+          <p:nvPr/>
+        </p:nvCxnSpPr>
+        <p:spPr>
+          <a:xfrm flipH="1" flipV="1">
+            <a:off x="6150710" y="2170847"/>
+            <a:ext cx="1457567" cy="1135226"/>
+          </a:xfrm>
+          <a:prstGeom prst="straightConnector1">
+            <a:avLst/>
+          </a:prstGeom>
+          <a:ln>
+            <a:tailEnd type="triangle"/>
+          </a:ln>
+        </p:spPr>
+        <p:style>
+          <a:lnRef idx="1">
+            <a:schemeClr val="dk1"/>
+          </a:lnRef>
+          <a:fillRef idx="0">
+            <a:schemeClr val="dk1"/>
+          </a:fillRef>
+          <a:effectRef idx="0">
+            <a:schemeClr val="dk1"/>
+          </a:effectRef>
+          <a:fontRef idx="minor">
+            <a:schemeClr val="tx1"/>
+          </a:fontRef>
+        </p:style>
+      </p:cxnSp>
+      <p:cxnSp>
+        <p:nvCxnSpPr>
+          <p:cNvPr id="35" name="Gerade Verbindung mit Pfeil 34">
+            <a:extLst>
+              <a:ext uri="{FF2B5EF4-FFF2-40B4-BE49-F238E27FC236}">
+                <a16:creationId xmlns:a16="http://schemas.microsoft.com/office/drawing/2014/main" id="{B08AC044-99B7-A692-C4A7-0F4B74DA34DB}"/>
+              </a:ext>
+            </a:extLst>
+          </p:cNvPr>
+          <p:cNvCxnSpPr>
+            <a:cxnSpLocks/>
+            <a:stCxn id="21" idx="1"/>
+          </p:cNvCxnSpPr>
+          <p:nvPr/>
+        </p:nvCxnSpPr>
+        <p:spPr>
+          <a:xfrm flipH="1">
+            <a:off x="4795935" y="3615613"/>
+            <a:ext cx="2063969" cy="0"/>
+          </a:xfrm>
+          <a:prstGeom prst="straightConnector1">
+            <a:avLst/>
+          </a:prstGeom>
+          <a:ln>
+            <a:tailEnd type="triangle"/>
+          </a:ln>
+        </p:spPr>
+        <p:style>
+          <a:lnRef idx="1">
+            <a:schemeClr val="dk1"/>
+          </a:lnRef>
+          <a:fillRef idx="0">
+            <a:schemeClr val="dk1"/>
+          </a:fillRef>
+          <a:effectRef idx="0">
+            <a:schemeClr val="dk1"/>
+          </a:effectRef>
+          <a:fontRef idx="minor">
+            <a:schemeClr val="tx1"/>
+          </a:fontRef>
+        </p:style>
+      </p:cxnSp>
+      <mc:AlternateContent xmlns:mc="http://schemas.openxmlformats.org/markup-compatibility/2006">
+        <mc:Choice xmlns:a14="http://schemas.microsoft.com/office/drawing/2010/main" Requires="a14">
+          <p:sp>
+            <p:nvSpPr>
+              <p:cNvPr id="39" name="Textfeld 38">
+                <a:extLst>
+                  <a:ext uri="{FF2B5EF4-FFF2-40B4-BE49-F238E27FC236}">
+                    <a16:creationId xmlns:a16="http://schemas.microsoft.com/office/drawing/2014/main" id="{6B9D1D02-ED72-45DC-CA2F-CF8A17728857}"/>
+                  </a:ext>
+                </a:extLst>
+              </p:cNvPr>
+              <p:cNvSpPr txBox="1"/>
+              <p:nvPr/>
+            </p:nvSpPr>
+            <p:spPr>
+              <a:xfrm>
+                <a:off x="5675875" y="3656281"/>
+                <a:ext cx="565989" cy="232692"/>
+              </a:xfrm>
+              <a:prstGeom prst="rect">
+                <a:avLst/>
+              </a:prstGeom>
+              <a:noFill/>
+            </p:spPr>
+            <p:txBody>
+              <a:bodyPr wrap="none" lIns="0" tIns="0" rIns="0" bIns="0" rtlCol="0">
+                <a:spAutoFit/>
+              </a:bodyPr>
+              <a:lstStyle/>
+              <a:p>
+                <a14:m>
+                  <m:oMathPara xmlns:m="http://schemas.openxmlformats.org/officeDocument/2006/math">
+                    <m:oMathParaPr>
+                      <m:jc m:val="centerGroup"/>
+                    </m:oMathParaPr>
+                    <m:oMath xmlns:m="http://schemas.openxmlformats.org/officeDocument/2006/math">
+                      <m:sSub>
+                        <m:sSubPr>
+                          <m:ctrlPr>
+                            <a:rPr lang="de-DE" sz="1400" b="0" i="1" smtClean="0">
+                              <a:latin typeface="Cambria Math" panose="02040503050406030204" pitchFamily="18" charset="0"/>
+                            </a:rPr>
+                          </m:ctrlPr>
+                        </m:sSubPr>
+                        <m:e>
+                          <m:r>
+                            <a:rPr lang="de-DE" sz="1400" b="0" i="1" smtClean="0">
+                              <a:latin typeface="Cambria Math" panose="02040503050406030204" pitchFamily="18" charset="0"/>
+                            </a:rPr>
+                            <m:t>𝑝</m:t>
+                          </m:r>
+                        </m:e>
+                        <m:sub>
+                          <m:r>
+                            <a:rPr lang="de-DE" sz="1400" b="0" i="1" smtClean="0">
+                              <a:latin typeface="Cambria Math" panose="02040503050406030204" pitchFamily="18" charset="0"/>
+                            </a:rPr>
+                            <m:t>𝑣𝑒𝑟𝑖𝑓𝑦</m:t>
+                          </m:r>
+                        </m:sub>
+                      </m:sSub>
+                    </m:oMath>
+                  </m:oMathPara>
+                </a14:m>
+                <a:endParaRPr lang="de-DE" sz="1400" dirty="0"/>
+              </a:p>
+            </p:txBody>
+          </p:sp>
+        </mc:Choice>
+        <mc:Fallback>
+          <p:sp>
+            <p:nvSpPr>
+              <p:cNvPr id="39" name="Textfeld 38">
+                <a:extLst>
+                  <a:ext uri="{FF2B5EF4-FFF2-40B4-BE49-F238E27FC236}">
+                    <a16:creationId xmlns:a16="http://schemas.microsoft.com/office/drawing/2014/main" id="{6B9D1D02-ED72-45DC-CA2F-CF8A17728857}"/>
+                  </a:ext>
+                </a:extLst>
+              </p:cNvPr>
+              <p:cNvSpPr txBox="1">
+                <a:spLocks noRot="1" noChangeAspect="1" noMove="1" noResize="1" noEditPoints="1" noAdjustHandles="1" noChangeArrowheads="1" noChangeShapeType="1" noTextEdit="1"/>
+              </p:cNvSpPr>
+              <p:nvPr/>
+            </p:nvSpPr>
+            <p:spPr>
+              <a:xfrm>
+                <a:off x="5675875" y="3656281"/>
+                <a:ext cx="565989" cy="232692"/>
+              </a:xfrm>
+              <a:prstGeom prst="rect">
+                <a:avLst/>
+              </a:prstGeom>
+              <a:blipFill>
+                <a:blip r:embed="rId4"/>
+                <a:stretch>
+                  <a:fillRect l="-6452" r="-3226" b="-23684"/>
+                </a:stretch>
+              </a:blipFill>
+            </p:spPr>
+            <p:txBody>
+              <a:bodyPr/>
+              <a:lstStyle/>
+              <a:p>
+                <a:r>
+                  <a:rPr lang="de-DE">
+                    <a:noFill/>
+                  </a:rPr>
+                  <a:t> </a:t>
+                </a:r>
+              </a:p>
+            </p:txBody>
+          </p:sp>
+        </mc:Fallback>
+      </mc:AlternateContent>
+      <p:cxnSp>
+        <p:nvCxnSpPr>
+          <p:cNvPr id="41" name="Verbinder: gewinkelt 40">
+            <a:extLst>
+              <a:ext uri="{FF2B5EF4-FFF2-40B4-BE49-F238E27FC236}">
+                <a16:creationId xmlns:a16="http://schemas.microsoft.com/office/drawing/2014/main" id="{B070634C-CA5B-E156-B330-D58D9108987D}"/>
+              </a:ext>
+            </a:extLst>
+          </p:cNvPr>
+          <p:cNvCxnSpPr>
+            <a:stCxn id="20" idx="2"/>
+            <a:endCxn id="20" idx="1"/>
+          </p:cNvCxnSpPr>
+          <p:nvPr/>
+        </p:nvCxnSpPr>
+        <p:spPr>
+          <a:xfrm rot="5400000" flipH="1">
+            <a:off x="3305371" y="3320922"/>
+            <a:ext cx="303244" cy="892628"/>
+          </a:xfrm>
+          <a:prstGeom prst="bentConnector4">
+            <a:avLst>
+              <a:gd name="adj1" fmla="val -75385"/>
+              <a:gd name="adj2" fmla="val 125610"/>
+            </a:avLst>
+          </a:prstGeom>
+          <a:ln>
+            <a:tailEnd type="triangle"/>
+          </a:ln>
+        </p:spPr>
+        <p:style>
+          <a:lnRef idx="1">
+            <a:schemeClr val="dk1"/>
+          </a:lnRef>
+          <a:fillRef idx="0">
+            <a:schemeClr val="dk1"/>
+          </a:fillRef>
+          <a:effectRef idx="0">
+            <a:schemeClr val="dk1"/>
+          </a:effectRef>
+          <a:fontRef idx="minor">
+            <a:schemeClr val="tx1"/>
+          </a:fontRef>
+        </p:style>
+      </p:cxnSp>
+      <mc:AlternateContent xmlns:mc="http://schemas.openxmlformats.org/markup-compatibility/2006">
+        <mc:Choice xmlns:a14="http://schemas.microsoft.com/office/drawing/2010/main" Requires="a14">
+          <p:sp>
+            <p:nvSpPr>
+              <p:cNvPr id="42" name="Textfeld 41">
+                <a:extLst>
+                  <a:ext uri="{FF2B5EF4-FFF2-40B4-BE49-F238E27FC236}">
+                    <a16:creationId xmlns:a16="http://schemas.microsoft.com/office/drawing/2014/main" id="{AE372B47-8553-B1FB-D801-858B368324D6}"/>
+                  </a:ext>
+                </a:extLst>
+              </p:cNvPr>
+              <p:cNvSpPr txBox="1"/>
+              <p:nvPr/>
+            </p:nvSpPr>
+            <p:spPr>
+              <a:xfrm>
+                <a:off x="7151050" y="2365469"/>
+                <a:ext cx="780406" cy="232949"/>
+              </a:xfrm>
+              <a:prstGeom prst="rect">
+                <a:avLst/>
+              </a:prstGeom>
+              <a:noFill/>
+            </p:spPr>
+            <p:txBody>
+              <a:bodyPr wrap="none" lIns="0" tIns="0" rIns="0" bIns="0" rtlCol="0">
+                <a:spAutoFit/>
+              </a:bodyPr>
+              <a:lstStyle/>
+              <a:p>
+                <a14:m>
+                  <m:oMathPara xmlns:m="http://schemas.openxmlformats.org/officeDocument/2006/math">
+                    <m:oMathParaPr>
+                      <m:jc m:val="centerGroup"/>
+                    </m:oMathParaPr>
+                    <m:oMath xmlns:m="http://schemas.openxmlformats.org/officeDocument/2006/math">
+                      <m:sSub>
+                        <m:sSubPr>
+                          <m:ctrlPr>
+                            <a:rPr lang="de-DE" sz="1400" b="0" i="1" smtClean="0">
+                              <a:latin typeface="Cambria Math" panose="02040503050406030204" pitchFamily="18" charset="0"/>
+                            </a:rPr>
+                          </m:ctrlPr>
+                        </m:sSubPr>
+                        <m:e>
+                          <m:r>
+                            <a:rPr lang="de-DE" sz="1400" b="0" i="1" smtClean="0">
+                              <a:latin typeface="Cambria Math" panose="02040503050406030204" pitchFamily="18" charset="0"/>
+                            </a:rPr>
+                            <m:t>𝑓</m:t>
+                          </m:r>
+                        </m:e>
+                        <m:sub>
+                          <m:r>
+                            <a:rPr lang="de-DE" sz="1400" b="0" i="1" smtClean="0">
+                              <a:latin typeface="Cambria Math" panose="02040503050406030204" pitchFamily="18" charset="0"/>
+                            </a:rPr>
+                            <m:t>𝑛𝑒𝑖𝑔h𝑏𝑜𝑟𝑠</m:t>
+                          </m:r>
+                        </m:sub>
+                      </m:sSub>
+                    </m:oMath>
+                  </m:oMathPara>
+                </a14:m>
+                <a:endParaRPr lang="de-DE" sz="1400" dirty="0"/>
+              </a:p>
+            </p:txBody>
+          </p:sp>
+        </mc:Choice>
+        <mc:Fallback>
+          <p:sp>
+            <p:nvSpPr>
+              <p:cNvPr id="42" name="Textfeld 41">
+                <a:extLst>
+                  <a:ext uri="{FF2B5EF4-FFF2-40B4-BE49-F238E27FC236}">
+                    <a16:creationId xmlns:a16="http://schemas.microsoft.com/office/drawing/2014/main" id="{AE372B47-8553-B1FB-D801-858B368324D6}"/>
+                  </a:ext>
+                </a:extLst>
+              </p:cNvPr>
+              <p:cNvSpPr txBox="1">
+                <a:spLocks noRot="1" noChangeAspect="1" noMove="1" noResize="1" noEditPoints="1" noAdjustHandles="1" noChangeArrowheads="1" noChangeShapeType="1" noTextEdit="1"/>
+              </p:cNvSpPr>
+              <p:nvPr/>
+            </p:nvSpPr>
+            <p:spPr>
+              <a:xfrm>
+                <a:off x="7151050" y="2365469"/>
+                <a:ext cx="780406" cy="232949"/>
+              </a:xfrm>
+              <a:prstGeom prst="rect">
+                <a:avLst/>
+              </a:prstGeom>
+              <a:blipFill>
+                <a:blip r:embed="rId5"/>
+                <a:stretch>
+                  <a:fillRect l="-7031" r="-2344" b="-26316"/>
+                </a:stretch>
+              </a:blipFill>
+            </p:spPr>
+            <p:txBody>
+              <a:bodyPr/>
+              <a:lstStyle/>
+              <a:p>
+                <a:r>
+                  <a:rPr lang="de-DE">
+                    <a:noFill/>
+                  </a:rPr>
+                  <a:t> </a:t>
+                </a:r>
+              </a:p>
+            </p:txBody>
+          </p:sp>
+        </mc:Fallback>
+      </mc:AlternateContent>
+      <mc:AlternateContent xmlns:mc="http://schemas.openxmlformats.org/markup-compatibility/2006">
+        <mc:Choice xmlns:a14="http://schemas.microsoft.com/office/drawing/2010/main" Requires="a14">
+          <p:sp>
+            <p:nvSpPr>
+              <p:cNvPr id="43" name="Textfeld 42">
+                <a:extLst>
+                  <a:ext uri="{FF2B5EF4-FFF2-40B4-BE49-F238E27FC236}">
+                    <a16:creationId xmlns:a16="http://schemas.microsoft.com/office/drawing/2014/main" id="{BE6B589D-5969-CFAC-BD47-CBE514B02FEB}"/>
+                  </a:ext>
+                </a:extLst>
+              </p:cNvPr>
+              <p:cNvSpPr txBox="1"/>
+              <p:nvPr/>
+            </p:nvSpPr>
+            <p:spPr>
+              <a:xfrm>
+                <a:off x="2814009" y="4222103"/>
+                <a:ext cx="896464" cy="232949"/>
+              </a:xfrm>
+              <a:prstGeom prst="rect">
+                <a:avLst/>
+              </a:prstGeom>
+              <a:noFill/>
+            </p:spPr>
+            <p:txBody>
+              <a:bodyPr wrap="none" lIns="0" tIns="0" rIns="0" bIns="0" rtlCol="0">
+                <a:spAutoFit/>
+              </a:bodyPr>
+              <a:lstStyle/>
+              <a:p>
+                <a14:m>
+                  <m:oMathPara xmlns:m="http://schemas.openxmlformats.org/officeDocument/2006/math">
+                    <m:oMathParaPr>
+                      <m:jc m:val="centerGroup"/>
+                    </m:oMathParaPr>
+                    <m:oMath xmlns:m="http://schemas.openxmlformats.org/officeDocument/2006/math">
+                      <m:r>
+                        <a:rPr lang="de-DE" sz="1400" b="0" i="1" smtClean="0">
+                          <a:latin typeface="Cambria Math" panose="02040503050406030204" pitchFamily="18" charset="0"/>
+                        </a:rPr>
+                        <m:t>1−</m:t>
+                      </m:r>
+                      <m:sSub>
+                        <m:sSubPr>
+                          <m:ctrlPr>
+                            <a:rPr lang="de-DE" sz="1400" b="0" i="1" smtClean="0">
+                              <a:latin typeface="Cambria Math" panose="02040503050406030204" pitchFamily="18" charset="0"/>
+                            </a:rPr>
+                          </m:ctrlPr>
+                        </m:sSubPr>
+                        <m:e>
+                          <m:r>
+                            <a:rPr lang="de-DE" sz="1400" b="0" i="1" smtClean="0">
+                              <a:latin typeface="Cambria Math" panose="02040503050406030204" pitchFamily="18" charset="0"/>
+                            </a:rPr>
+                            <m:t>𝑝</m:t>
+                          </m:r>
+                        </m:e>
+                        <m:sub>
+                          <m:r>
+                            <a:rPr lang="de-DE" sz="1400" b="0" i="1" smtClean="0">
+                              <a:latin typeface="Cambria Math" panose="02040503050406030204" pitchFamily="18" charset="0"/>
+                            </a:rPr>
+                            <m:t>𝑓𝑜𝑟𝑔𝑒𝑡</m:t>
+                          </m:r>
+                        </m:sub>
+                      </m:sSub>
+                    </m:oMath>
+                  </m:oMathPara>
+                </a14:m>
+                <a:endParaRPr lang="de-DE" sz="1400" dirty="0"/>
+              </a:p>
+            </p:txBody>
+          </p:sp>
+        </mc:Choice>
+        <mc:Fallback>
+          <p:sp>
+            <p:nvSpPr>
+              <p:cNvPr id="43" name="Textfeld 42">
+                <a:extLst>
+                  <a:ext uri="{FF2B5EF4-FFF2-40B4-BE49-F238E27FC236}">
+                    <a16:creationId xmlns:a16="http://schemas.microsoft.com/office/drawing/2014/main" id="{BE6B589D-5969-CFAC-BD47-CBE514B02FEB}"/>
+                  </a:ext>
+                </a:extLst>
+              </p:cNvPr>
+              <p:cNvSpPr txBox="1">
+                <a:spLocks noRot="1" noChangeAspect="1" noMove="1" noResize="1" noEditPoints="1" noAdjustHandles="1" noChangeArrowheads="1" noChangeShapeType="1" noTextEdit="1"/>
+              </p:cNvSpPr>
+              <p:nvPr/>
+            </p:nvSpPr>
+            <p:spPr>
+              <a:xfrm>
+                <a:off x="2814009" y="4222103"/>
+                <a:ext cx="896464" cy="232949"/>
+              </a:xfrm>
+              <a:prstGeom prst="rect">
+                <a:avLst/>
+              </a:prstGeom>
+              <a:blipFill>
+                <a:blip r:embed="rId6"/>
+                <a:stretch>
+                  <a:fillRect l="-4082" r="-1361" b="-23684"/>
+                </a:stretch>
+              </a:blipFill>
+            </p:spPr>
+            <p:txBody>
+              <a:bodyPr/>
+              <a:lstStyle/>
+              <a:p>
+                <a:r>
+                  <a:rPr lang="de-DE">
+                    <a:noFill/>
+                  </a:rPr>
+                  <a:t> </a:t>
+                </a:r>
+              </a:p>
+            </p:txBody>
+          </p:sp>
+        </mc:Fallback>
+      </mc:AlternateContent>
+      <p:cxnSp>
+        <p:nvCxnSpPr>
+          <p:cNvPr id="47" name="Verbinder: gewinkelt 46">
+            <a:extLst>
+              <a:ext uri="{FF2B5EF4-FFF2-40B4-BE49-F238E27FC236}">
+                <a16:creationId xmlns:a16="http://schemas.microsoft.com/office/drawing/2014/main" id="{DE077F33-3709-F6C0-3954-A587D2575B7B}"/>
+              </a:ext>
+            </a:extLst>
+          </p:cNvPr>
+          <p:cNvCxnSpPr>
+            <a:stCxn id="22" idx="1"/>
+            <a:endCxn id="22" idx="0"/>
+          </p:cNvCxnSpPr>
+          <p:nvPr/>
+        </p:nvCxnSpPr>
+        <p:spPr>
+          <a:xfrm rot="10800000" flipH="1">
+            <a:off x="5057018" y="1570649"/>
+            <a:ext cx="892628" cy="303245"/>
+          </a:xfrm>
+          <a:prstGeom prst="bentConnector4">
+            <a:avLst>
+              <a:gd name="adj1" fmla="val -25610"/>
+              <a:gd name="adj2" fmla="val 175385"/>
+            </a:avLst>
+          </a:prstGeom>
+          <a:ln>
+            <a:tailEnd type="triangle"/>
+          </a:ln>
+        </p:spPr>
+        <p:style>
+          <a:lnRef idx="1">
+            <a:schemeClr val="dk1"/>
+          </a:lnRef>
+          <a:fillRef idx="0">
+            <a:schemeClr val="dk1"/>
+          </a:fillRef>
+          <a:effectRef idx="0">
+            <a:schemeClr val="dk1"/>
+          </a:effectRef>
+          <a:fontRef idx="minor">
+            <a:schemeClr val="tx1"/>
+          </a:fontRef>
+        </p:style>
+      </p:cxnSp>
+      <p:cxnSp>
+        <p:nvCxnSpPr>
+          <p:cNvPr id="49" name="Verbinder: gewinkelt 48">
+            <a:extLst>
+              <a:ext uri="{FF2B5EF4-FFF2-40B4-BE49-F238E27FC236}">
+                <a16:creationId xmlns:a16="http://schemas.microsoft.com/office/drawing/2014/main" id="{E9F2BDFA-24D9-6364-7FEC-6D0F9F913471}"/>
+              </a:ext>
+            </a:extLst>
+          </p:cNvPr>
+          <p:cNvCxnSpPr>
+            <a:stCxn id="21" idx="3"/>
+            <a:endCxn id="21" idx="2"/>
+          </p:cNvCxnSpPr>
+          <p:nvPr/>
+        </p:nvCxnSpPr>
+        <p:spPr>
+          <a:xfrm flipH="1">
+            <a:off x="7752532" y="3615613"/>
+            <a:ext cx="892628" cy="303244"/>
+          </a:xfrm>
+          <a:prstGeom prst="bentConnector4">
+            <a:avLst>
+              <a:gd name="adj1" fmla="val -25610"/>
+              <a:gd name="adj2" fmla="val 175385"/>
+            </a:avLst>
+          </a:prstGeom>
+          <a:ln>
+            <a:tailEnd type="triangle"/>
+          </a:ln>
+        </p:spPr>
+        <p:style>
+          <a:lnRef idx="1">
+            <a:schemeClr val="dk1"/>
+          </a:lnRef>
+          <a:fillRef idx="0">
+            <a:schemeClr val="dk1"/>
+          </a:fillRef>
+          <a:effectRef idx="0">
+            <a:schemeClr val="dk1"/>
+          </a:effectRef>
+          <a:fontRef idx="minor">
+            <a:schemeClr val="tx1"/>
+          </a:fontRef>
+        </p:style>
+      </p:cxnSp>
+      <mc:AlternateContent xmlns:mc="http://schemas.openxmlformats.org/markup-compatibility/2006">
+        <mc:Choice xmlns:a14="http://schemas.microsoft.com/office/drawing/2010/main" Requires="a14">
+          <p:sp>
+            <p:nvSpPr>
+              <p:cNvPr id="50" name="Textfeld 49">
+                <a:extLst>
+                  <a:ext uri="{FF2B5EF4-FFF2-40B4-BE49-F238E27FC236}">
+                    <a16:creationId xmlns:a16="http://schemas.microsoft.com/office/drawing/2014/main" id="{BCB17AF9-4A7B-76AC-B544-3CC07E782BA0}"/>
+                  </a:ext>
+                </a:extLst>
+              </p:cNvPr>
+              <p:cNvSpPr txBox="1"/>
+              <p:nvPr/>
+            </p:nvSpPr>
+            <p:spPr>
+              <a:xfrm>
+                <a:off x="4464524" y="978465"/>
+                <a:ext cx="2082045" cy="232949"/>
+              </a:xfrm>
+              <a:prstGeom prst="rect">
+                <a:avLst/>
+              </a:prstGeom>
+              <a:noFill/>
+            </p:spPr>
+            <p:txBody>
+              <a:bodyPr wrap="none" lIns="0" tIns="0" rIns="0" bIns="0" rtlCol="0">
+                <a:spAutoFit/>
+              </a:bodyPr>
+              <a:lstStyle/>
+              <a:p>
+                <a14:m>
+                  <m:oMathPara xmlns:m="http://schemas.openxmlformats.org/officeDocument/2006/math">
+                    <m:oMathParaPr>
+                      <m:jc m:val="centerGroup"/>
+                    </m:oMathParaPr>
+                    <m:oMath xmlns:m="http://schemas.openxmlformats.org/officeDocument/2006/math">
+                      <m:sSub>
+                        <m:sSubPr>
+                          <m:ctrlPr>
+                            <a:rPr lang="de-DE" sz="1400" b="0" i="1" smtClean="0">
+                              <a:latin typeface="Cambria Math" panose="02040503050406030204" pitchFamily="18" charset="0"/>
+                            </a:rPr>
+                          </m:ctrlPr>
+                        </m:sSubPr>
+                        <m:e>
+                          <m:r>
+                            <a:rPr lang="de-DE" sz="1400" b="0" i="1" smtClean="0">
+                              <a:latin typeface="Cambria Math" panose="02040503050406030204" pitchFamily="18" charset="0"/>
+                            </a:rPr>
+                            <m:t>1−</m:t>
+                          </m:r>
+                          <m:r>
+                            <a:rPr lang="de-DE" sz="1400" b="0" i="1" smtClean="0">
+                              <a:latin typeface="Cambria Math" panose="02040503050406030204" pitchFamily="18" charset="0"/>
+                            </a:rPr>
+                            <m:t>𝑔</m:t>
+                          </m:r>
+                        </m:e>
+                        <m:sub>
+                          <m:r>
+                            <a:rPr lang="de-DE" sz="1400" b="0" i="1" smtClean="0">
+                              <a:latin typeface="Cambria Math" panose="02040503050406030204" pitchFamily="18" charset="0"/>
+                            </a:rPr>
+                            <m:t>𝑛𝑒𝑖𝑔h𝑏𝑜𝑟𝑠</m:t>
+                          </m:r>
+                        </m:sub>
+                      </m:sSub>
+                      <m:r>
+                        <a:rPr lang="de-DE" sz="1400" b="0" i="1" smtClean="0">
+                          <a:latin typeface="Cambria Math" panose="02040503050406030204" pitchFamily="18" charset="0"/>
+                        </a:rPr>
+                        <m:t>−</m:t>
+                      </m:r>
+                      <m:sSub>
+                        <m:sSubPr>
+                          <m:ctrlPr>
+                            <a:rPr lang="de-DE" sz="1400" b="0" i="1" smtClean="0">
+                              <a:latin typeface="Cambria Math" panose="02040503050406030204" pitchFamily="18" charset="0"/>
+                            </a:rPr>
+                          </m:ctrlPr>
+                        </m:sSubPr>
+                        <m:e>
+                          <m:r>
+                            <a:rPr lang="de-DE" sz="1400" b="0" i="1" smtClean="0">
+                              <a:latin typeface="Cambria Math" panose="02040503050406030204" pitchFamily="18" charset="0"/>
+                            </a:rPr>
+                            <m:t>𝑓</m:t>
+                          </m:r>
+                        </m:e>
+                        <m:sub>
+                          <m:r>
+                            <a:rPr lang="de-DE" sz="1400" b="0" i="1" smtClean="0">
+                              <a:latin typeface="Cambria Math" panose="02040503050406030204" pitchFamily="18" charset="0"/>
+                            </a:rPr>
+                            <m:t>𝑛𝑒𝑖𝑔h𝑏𝑜𝑟𝑠</m:t>
+                          </m:r>
+                        </m:sub>
+                      </m:sSub>
+                    </m:oMath>
+                  </m:oMathPara>
+                </a14:m>
+                <a:endParaRPr lang="de-DE" sz="1400" dirty="0"/>
+              </a:p>
+            </p:txBody>
+          </p:sp>
+        </mc:Choice>
+        <mc:Fallback>
+          <p:sp>
+            <p:nvSpPr>
+              <p:cNvPr id="50" name="Textfeld 49">
+                <a:extLst>
+                  <a:ext uri="{FF2B5EF4-FFF2-40B4-BE49-F238E27FC236}">
+                    <a16:creationId xmlns:a16="http://schemas.microsoft.com/office/drawing/2014/main" id="{BCB17AF9-4A7B-76AC-B544-3CC07E782BA0}"/>
+                  </a:ext>
+                </a:extLst>
+              </p:cNvPr>
+              <p:cNvSpPr txBox="1">
+                <a:spLocks noRot="1" noChangeAspect="1" noMove="1" noResize="1" noEditPoints="1" noAdjustHandles="1" noChangeArrowheads="1" noChangeShapeType="1" noTextEdit="1"/>
+              </p:cNvSpPr>
+              <p:nvPr/>
+            </p:nvSpPr>
+            <p:spPr>
+              <a:xfrm>
+                <a:off x="4464524" y="978465"/>
+                <a:ext cx="2082045" cy="232949"/>
+              </a:xfrm>
+              <a:prstGeom prst="rect">
+                <a:avLst/>
+              </a:prstGeom>
+              <a:blipFill>
+                <a:blip r:embed="rId7"/>
+                <a:stretch>
+                  <a:fillRect l="-1462" r="-585" b="-23684"/>
+                </a:stretch>
+              </a:blipFill>
+            </p:spPr>
+            <p:txBody>
+              <a:bodyPr/>
+              <a:lstStyle/>
+              <a:p>
+                <a:r>
+                  <a:rPr lang="de-DE">
+                    <a:noFill/>
+                  </a:rPr>
+                  <a:t> </a:t>
+                </a:r>
+              </a:p>
+            </p:txBody>
+          </p:sp>
+        </mc:Fallback>
+      </mc:AlternateContent>
+      <mc:AlternateContent xmlns:mc="http://schemas.openxmlformats.org/markup-compatibility/2006">
+        <mc:Choice xmlns:a14="http://schemas.microsoft.com/office/drawing/2010/main" Requires="a14">
+          <p:sp>
+            <p:nvSpPr>
+              <p:cNvPr id="51" name="Textfeld 50">
+                <a:extLst>
+                  <a:ext uri="{FF2B5EF4-FFF2-40B4-BE49-F238E27FC236}">
+                    <a16:creationId xmlns:a16="http://schemas.microsoft.com/office/drawing/2014/main" id="{4F83388F-F183-1DF1-FC03-1409D803120E}"/>
+                  </a:ext>
+                </a:extLst>
+              </p:cNvPr>
+              <p:cNvSpPr txBox="1"/>
+              <p:nvPr/>
+            </p:nvSpPr>
+            <p:spPr>
+              <a:xfrm>
+                <a:off x="7826762" y="4245429"/>
+                <a:ext cx="1636795" cy="232949"/>
+              </a:xfrm>
+              <a:prstGeom prst="rect">
+                <a:avLst/>
+              </a:prstGeom>
+              <a:noFill/>
+            </p:spPr>
+            <p:txBody>
+              <a:bodyPr wrap="none" lIns="0" tIns="0" rIns="0" bIns="0" rtlCol="0">
+                <a:spAutoFit/>
+              </a:bodyPr>
+              <a:lstStyle/>
+              <a:p>
+                <a14:m>
+                  <m:oMathPara xmlns:m="http://schemas.openxmlformats.org/officeDocument/2006/math">
+                    <m:oMathParaPr>
+                      <m:jc m:val="centerGroup"/>
+                    </m:oMathParaPr>
+                    <m:oMath xmlns:m="http://schemas.openxmlformats.org/officeDocument/2006/math">
+                      <m:r>
+                        <a:rPr lang="de-DE" sz="1400" b="0" i="1" smtClean="0">
+                          <a:latin typeface="Cambria Math" panose="02040503050406030204" pitchFamily="18" charset="0"/>
+                        </a:rPr>
+                        <m:t>1−</m:t>
+                      </m:r>
+                      <m:sSub>
+                        <m:sSubPr>
+                          <m:ctrlPr>
+                            <a:rPr lang="de-DE" sz="1400" b="0" i="1" smtClean="0">
+                              <a:latin typeface="Cambria Math" panose="02040503050406030204" pitchFamily="18" charset="0"/>
+                            </a:rPr>
+                          </m:ctrlPr>
+                        </m:sSubPr>
+                        <m:e>
+                          <m:r>
+                            <a:rPr lang="de-DE" sz="1400" b="0" i="1" smtClean="0">
+                              <a:latin typeface="Cambria Math" panose="02040503050406030204" pitchFamily="18" charset="0"/>
+                            </a:rPr>
+                            <m:t>𝑝</m:t>
+                          </m:r>
+                        </m:e>
+                        <m:sub>
+                          <m:r>
+                            <a:rPr lang="de-DE" sz="1400" b="0" i="1" smtClean="0">
+                              <a:latin typeface="Cambria Math" panose="02040503050406030204" pitchFamily="18" charset="0"/>
+                            </a:rPr>
+                            <m:t>𝑓𝑜𝑟𝑔𝑒𝑡</m:t>
+                          </m:r>
+                        </m:sub>
+                      </m:sSub>
+                      <m:r>
+                        <a:rPr lang="de-DE" sz="1400" b="0" i="1" smtClean="0">
+                          <a:latin typeface="Cambria Math" panose="02040503050406030204" pitchFamily="18" charset="0"/>
+                        </a:rPr>
+                        <m:t>−</m:t>
+                      </m:r>
+                      <m:sSub>
+                        <m:sSubPr>
+                          <m:ctrlPr>
+                            <a:rPr lang="de-DE" sz="1400" b="0" i="1" smtClean="0">
+                              <a:latin typeface="Cambria Math" panose="02040503050406030204" pitchFamily="18" charset="0"/>
+                            </a:rPr>
+                          </m:ctrlPr>
+                        </m:sSubPr>
+                        <m:e>
+                          <m:r>
+                            <a:rPr lang="de-DE" sz="1400" b="0" i="1" smtClean="0">
+                              <a:latin typeface="Cambria Math" panose="02040503050406030204" pitchFamily="18" charset="0"/>
+                            </a:rPr>
+                            <m:t>𝑝</m:t>
+                          </m:r>
+                        </m:e>
+                        <m:sub>
+                          <m:r>
+                            <a:rPr lang="de-DE" sz="1400" b="0" i="1" smtClean="0">
+                              <a:latin typeface="Cambria Math" panose="02040503050406030204" pitchFamily="18" charset="0"/>
+                            </a:rPr>
+                            <m:t>𝑣𝑒𝑟𝑖𝑓𝑦</m:t>
+                          </m:r>
+                        </m:sub>
+                      </m:sSub>
+                    </m:oMath>
+                  </m:oMathPara>
+                </a14:m>
+                <a:endParaRPr lang="de-DE" sz="1400" dirty="0"/>
+              </a:p>
+            </p:txBody>
+          </p:sp>
+        </mc:Choice>
+        <mc:Fallback>
+          <p:sp>
+            <p:nvSpPr>
+              <p:cNvPr id="51" name="Textfeld 50">
+                <a:extLst>
+                  <a:ext uri="{FF2B5EF4-FFF2-40B4-BE49-F238E27FC236}">
+                    <a16:creationId xmlns:a16="http://schemas.microsoft.com/office/drawing/2014/main" id="{4F83388F-F183-1DF1-FC03-1409D803120E}"/>
+                  </a:ext>
+                </a:extLst>
+              </p:cNvPr>
+              <p:cNvSpPr txBox="1">
+                <a:spLocks noRot="1" noChangeAspect="1" noMove="1" noResize="1" noEditPoints="1" noAdjustHandles="1" noChangeArrowheads="1" noChangeShapeType="1" noTextEdit="1"/>
+              </p:cNvSpPr>
+              <p:nvPr/>
+            </p:nvSpPr>
+            <p:spPr>
+              <a:xfrm>
+                <a:off x="7826762" y="4245429"/>
+                <a:ext cx="1636795" cy="232949"/>
+              </a:xfrm>
+              <a:prstGeom prst="rect">
+                <a:avLst/>
+              </a:prstGeom>
+              <a:blipFill>
+                <a:blip r:embed="rId8"/>
+                <a:stretch>
+                  <a:fillRect l="-1866" r="-746" b="-23077"/>
+                </a:stretch>
+              </a:blipFill>
+            </p:spPr>
+            <p:txBody>
+              <a:bodyPr/>
+              <a:lstStyle/>
+              <a:p>
+                <a:r>
+                  <a:rPr lang="de-DE">
+                    <a:noFill/>
+                  </a:rPr>
+                  <a:t> </a:t>
+                </a:r>
+              </a:p>
+            </p:txBody>
+          </p:sp>
+        </mc:Fallback>
+      </mc:AlternateContent>
+    </p:spTree>
+    <p:extLst>
+      <p:ext uri="{BB962C8B-B14F-4D97-AF65-F5344CB8AC3E}">
+        <p14:creationId xmlns:p14="http://schemas.microsoft.com/office/powerpoint/2010/main" val="2439263106"/>
+      </p:ext>
+    </p:extLst>
+  </p:cSld>
+  <p:clrMapOvr>
+    <a:masterClrMapping/>
+  </p:clrMapOvr>
+</p:sld>
+</file>
+
+<file path=ppt/slides/slide4.xml><?xml version="1.0" encoding="utf-8"?>
+<p:sld xmlns:a="http://schemas.openxmlformats.org/drawingml/2006/main" xmlns:r="http://schemas.openxmlformats.org/officeDocument/2006/relationships" xmlns:p="http://schemas.openxmlformats.org/presentationml/2006/main">
+  <p:cSld>
+    <p:spTree>
+      <p:nvGrpSpPr>
+        <p:cNvPr id="1" name=""/>
+        <p:cNvGrpSpPr/>
+        <p:nvPr/>
+      </p:nvGrpSpPr>
+      <p:grpSpPr>
+        <a:xfrm>
+          <a:off x="0" y="0"/>
+          <a:ext cx="0" cy="0"/>
+          <a:chOff x="0" y="0"/>
+          <a:chExt cx="0" cy="0"/>
+        </a:xfrm>
+      </p:grpSpPr>
+      <p:sp>
+        <p:nvSpPr>
+          <p:cNvPr id="32" name="Rechteck: abgerundete Ecken 31">
+            <a:extLst>
+              <a:ext uri="{FF2B5EF4-FFF2-40B4-BE49-F238E27FC236}">
+                <a16:creationId xmlns:a16="http://schemas.microsoft.com/office/drawing/2014/main" id="{445E8BF8-7448-3643-F7B4-5DD7720D4895}"/>
+              </a:ext>
+            </a:extLst>
+          </p:cNvPr>
+          <p:cNvSpPr/>
+          <p:nvPr/>
+        </p:nvSpPr>
+        <p:spPr>
+          <a:xfrm>
+            <a:off x="3010679" y="3312369"/>
+            <a:ext cx="1785256" cy="606489"/>
+          </a:xfrm>
+          <a:prstGeom prst="roundRect">
+            <a:avLst/>
+          </a:prstGeom>
+        </p:spPr>
+        <p:style>
+          <a:lnRef idx="2">
+            <a:schemeClr val="dk1"/>
+          </a:lnRef>
+          <a:fillRef idx="1">
+            <a:schemeClr val="lt1"/>
+          </a:fillRef>
+          <a:effectRef idx="0">
+            <a:schemeClr val="dk1"/>
+          </a:effectRef>
+          <a:fontRef idx="minor">
+            <a:schemeClr val="dk1"/>
+          </a:fontRef>
+        </p:style>
+        <p:txBody>
+          <a:bodyPr rtlCol="0" anchor="ctr"/>
+          <a:lstStyle/>
+          <a:p>
+            <a:pPr algn="ctr"/>
+            <a:r>
+              <a:rPr lang="en-US" dirty="0"/>
+              <a:t>Recovered</a:t>
+            </a:r>
+          </a:p>
+        </p:txBody>
+      </p:sp>
+      <p:sp>
+        <p:nvSpPr>
+          <p:cNvPr id="34" name="Rechteck: abgerundete Ecken 33">
+            <a:extLst>
+              <a:ext uri="{FF2B5EF4-FFF2-40B4-BE49-F238E27FC236}">
+                <a16:creationId xmlns:a16="http://schemas.microsoft.com/office/drawing/2014/main" id="{E7F642EF-E805-668D-2687-C95D5E9BB9F1}"/>
+              </a:ext>
+            </a:extLst>
+          </p:cNvPr>
+          <p:cNvSpPr/>
+          <p:nvPr/>
+        </p:nvSpPr>
+        <p:spPr>
+          <a:xfrm>
+            <a:off x="6859904" y="3312368"/>
+            <a:ext cx="1785256" cy="606489"/>
+          </a:xfrm>
+          <a:prstGeom prst="roundRect">
+            <a:avLst/>
+          </a:prstGeom>
+        </p:spPr>
+        <p:style>
+          <a:lnRef idx="2">
+            <a:schemeClr val="dk1"/>
+          </a:lnRef>
+          <a:fillRef idx="1">
+            <a:schemeClr val="lt1"/>
+          </a:fillRef>
+          <a:effectRef idx="0">
+            <a:schemeClr val="dk1"/>
+          </a:effectRef>
+          <a:fontRef idx="minor">
+            <a:schemeClr val="dk1"/>
+          </a:fontRef>
+        </p:style>
+        <p:txBody>
+          <a:bodyPr rtlCol="0" anchor="ctr"/>
+          <a:lstStyle/>
+          <a:p>
+            <a:pPr algn="ctr"/>
+            <a:r>
+              <a:rPr lang="en-US" dirty="0"/>
+              <a:t>Infected</a:t>
+            </a:r>
+          </a:p>
+        </p:txBody>
+      </p:sp>
+      <p:sp>
+        <p:nvSpPr>
+          <p:cNvPr id="36" name="Rechteck: abgerundete Ecken 35">
+            <a:extLst>
+              <a:ext uri="{FF2B5EF4-FFF2-40B4-BE49-F238E27FC236}">
+                <a16:creationId xmlns:a16="http://schemas.microsoft.com/office/drawing/2014/main" id="{EACF0D6A-B850-6BCD-D5BF-ED0CD40DFC03}"/>
+              </a:ext>
+            </a:extLst>
+          </p:cNvPr>
+          <p:cNvSpPr/>
+          <p:nvPr/>
+        </p:nvSpPr>
+        <p:spPr>
+          <a:xfrm>
+            <a:off x="5057018" y="1570648"/>
+            <a:ext cx="1785256" cy="606489"/>
+          </a:xfrm>
+          <a:prstGeom prst="roundRect">
+            <a:avLst/>
+          </a:prstGeom>
+        </p:spPr>
+        <p:style>
+          <a:lnRef idx="2">
+            <a:schemeClr val="dk1"/>
+          </a:lnRef>
+          <a:fillRef idx="1">
+            <a:schemeClr val="lt1"/>
+          </a:fillRef>
+          <a:effectRef idx="0">
+            <a:schemeClr val="dk1"/>
+          </a:effectRef>
+          <a:fontRef idx="minor">
+            <a:schemeClr val="dk1"/>
+          </a:fontRef>
+        </p:style>
+        <p:txBody>
+          <a:bodyPr rtlCol="0" anchor="ctr"/>
+          <a:lstStyle/>
+          <a:p>
+            <a:pPr algn="ctr"/>
+            <a:r>
+              <a:rPr lang="en-US" dirty="0"/>
+              <a:t>Susceptible</a:t>
+            </a:r>
+          </a:p>
+        </p:txBody>
+      </p:sp>
+      <p:cxnSp>
+        <p:nvCxnSpPr>
+          <p:cNvPr id="37" name="Gerade Verbindung mit Pfeil 36">
+            <a:extLst>
+              <a:ext uri="{FF2B5EF4-FFF2-40B4-BE49-F238E27FC236}">
+                <a16:creationId xmlns:a16="http://schemas.microsoft.com/office/drawing/2014/main" id="{12736418-2B44-8518-10FE-9F0C94886403}"/>
+              </a:ext>
+            </a:extLst>
+          </p:cNvPr>
+          <p:cNvCxnSpPr>
+            <a:cxnSpLocks/>
+          </p:cNvCxnSpPr>
+          <p:nvPr/>
+        </p:nvCxnSpPr>
+        <p:spPr>
+          <a:xfrm flipH="1">
+            <a:off x="3671882" y="2175353"/>
+            <a:ext cx="1660847" cy="1135227"/>
+          </a:xfrm>
+          <a:prstGeom prst="straightConnector1">
+            <a:avLst/>
+          </a:prstGeom>
+          <a:ln>
+            <a:tailEnd type="triangle"/>
+          </a:ln>
+        </p:spPr>
+        <p:style>
+          <a:lnRef idx="1">
+            <a:schemeClr val="dk1"/>
+          </a:lnRef>
+          <a:fillRef idx="0">
+            <a:schemeClr val="dk1"/>
+          </a:fillRef>
+          <a:effectRef idx="0">
+            <a:schemeClr val="dk1"/>
+          </a:effectRef>
+          <a:fontRef idx="minor">
+            <a:schemeClr val="tx1"/>
+          </a:fontRef>
+        </p:style>
+      </p:cxnSp>
+      <mc:AlternateContent xmlns:mc="http://schemas.openxmlformats.org/markup-compatibility/2006">
+        <mc:Choice xmlns:a14="http://schemas.microsoft.com/office/drawing/2010/main" Requires="a14">
+          <p:sp>
+            <p:nvSpPr>
+              <p:cNvPr id="40" name="Textfeld 39">
+                <a:extLst>
+                  <a:ext uri="{FF2B5EF4-FFF2-40B4-BE49-F238E27FC236}">
+                    <a16:creationId xmlns:a16="http://schemas.microsoft.com/office/drawing/2014/main" id="{891CF306-4DBF-F1BB-C75B-6DD14C15CCE2}"/>
+                  </a:ext>
+                </a:extLst>
+              </p:cNvPr>
+              <p:cNvSpPr txBox="1"/>
+              <p:nvPr/>
+            </p:nvSpPr>
+            <p:spPr>
+              <a:xfrm>
+                <a:off x="3714965" y="2424094"/>
+                <a:ext cx="813492" cy="232949"/>
+              </a:xfrm>
+              <a:prstGeom prst="rect">
+                <a:avLst/>
+              </a:prstGeom>
+              <a:noFill/>
+            </p:spPr>
+            <p:txBody>
+              <a:bodyPr wrap="none" lIns="0" tIns="0" rIns="0" bIns="0" rtlCol="0">
+                <a:spAutoFit/>
+              </a:bodyPr>
+              <a:lstStyle/>
+              <a:p>
+                <a14:m>
+                  <m:oMathPara xmlns:m="http://schemas.openxmlformats.org/officeDocument/2006/math">
+                    <m:oMathParaPr>
+                      <m:jc m:val="centerGroup"/>
+                    </m:oMathParaPr>
+                    <m:oMath xmlns:m="http://schemas.openxmlformats.org/officeDocument/2006/math">
+                      <m:sSub>
+                        <m:sSubPr>
+                          <m:ctrlPr>
+                            <a:rPr lang="de-DE" sz="1400" b="0" i="1" smtClean="0">
+                              <a:latin typeface="Cambria Math" panose="02040503050406030204" pitchFamily="18" charset="0"/>
+                            </a:rPr>
+                          </m:ctrlPr>
+                        </m:sSubPr>
+                        <m:e>
+                          <m:r>
+                            <a:rPr lang="de-DE" sz="1400" b="0" i="1" smtClean="0">
+                              <a:latin typeface="Cambria Math" panose="02040503050406030204" pitchFamily="18" charset="0"/>
+                            </a:rPr>
+                            <m:t>𝑔</m:t>
+                          </m:r>
+                        </m:e>
+                        <m:sub>
+                          <m:r>
+                            <a:rPr lang="de-DE" sz="1400" b="0" i="1" smtClean="0">
+                              <a:latin typeface="Cambria Math" panose="02040503050406030204" pitchFamily="18" charset="0"/>
+                            </a:rPr>
+                            <m:t>𝑛𝑒𝑖𝑔h𝑏𝑜𝑟𝑠</m:t>
+                          </m:r>
+                        </m:sub>
+                      </m:sSub>
+                    </m:oMath>
+                  </m:oMathPara>
+                </a14:m>
+                <a:endParaRPr lang="de-DE" sz="1400" dirty="0"/>
+              </a:p>
+            </p:txBody>
+          </p:sp>
+        </mc:Choice>
+        <mc:Fallback>
+          <p:sp>
+            <p:nvSpPr>
+              <p:cNvPr id="40" name="Textfeld 39">
+                <a:extLst>
+                  <a:ext uri="{FF2B5EF4-FFF2-40B4-BE49-F238E27FC236}">
+                    <a16:creationId xmlns:a16="http://schemas.microsoft.com/office/drawing/2014/main" id="{891CF306-4DBF-F1BB-C75B-6DD14C15CCE2}"/>
+                  </a:ext>
+                </a:extLst>
+              </p:cNvPr>
+              <p:cNvSpPr txBox="1">
+                <a:spLocks noRot="1" noChangeAspect="1" noMove="1" noResize="1" noEditPoints="1" noAdjustHandles="1" noChangeArrowheads="1" noChangeShapeType="1" noTextEdit="1"/>
+              </p:cNvSpPr>
+              <p:nvPr/>
+            </p:nvSpPr>
+            <p:spPr>
+              <a:xfrm>
+                <a:off x="3714965" y="2424094"/>
+                <a:ext cx="813492" cy="232949"/>
+              </a:xfrm>
+              <a:prstGeom prst="rect">
+                <a:avLst/>
+              </a:prstGeom>
+              <a:blipFill>
+                <a:blip r:embed="rId2"/>
+                <a:stretch>
+                  <a:fillRect l="-4478" r="-2239" b="-23684"/>
+                </a:stretch>
+              </a:blipFill>
+            </p:spPr>
+            <p:txBody>
+              <a:bodyPr/>
+              <a:lstStyle/>
+              <a:p>
+                <a:r>
+                  <a:rPr lang="de-DE">
+                    <a:noFill/>
+                  </a:rPr>
+                  <a:t> </a:t>
+                </a:r>
+              </a:p>
+            </p:txBody>
+          </p:sp>
+        </mc:Fallback>
+      </mc:AlternateContent>
+      <p:cxnSp>
+        <p:nvCxnSpPr>
+          <p:cNvPr id="45" name="Gerade Verbindung mit Pfeil 44">
+            <a:extLst>
+              <a:ext uri="{FF2B5EF4-FFF2-40B4-BE49-F238E27FC236}">
+                <a16:creationId xmlns:a16="http://schemas.microsoft.com/office/drawing/2014/main" id="{BAFF3747-58EF-4148-222F-305B49C35684}"/>
+              </a:ext>
+            </a:extLst>
+          </p:cNvPr>
+          <p:cNvCxnSpPr>
+            <a:cxnSpLocks/>
+          </p:cNvCxnSpPr>
+          <p:nvPr/>
+        </p:nvCxnSpPr>
+        <p:spPr>
+          <a:xfrm>
+            <a:off x="6502018" y="2173993"/>
+            <a:ext cx="1413414" cy="1135229"/>
+          </a:xfrm>
+          <a:prstGeom prst="straightConnector1">
+            <a:avLst/>
+          </a:prstGeom>
+          <a:ln>
+            <a:tailEnd type="triangle"/>
+          </a:ln>
+        </p:spPr>
+        <p:style>
+          <a:lnRef idx="1">
+            <a:schemeClr val="dk1"/>
+          </a:lnRef>
+          <a:fillRef idx="0">
+            <a:schemeClr val="dk1"/>
+          </a:fillRef>
+          <a:effectRef idx="0">
+            <a:schemeClr val="dk1"/>
+          </a:effectRef>
+          <a:fontRef idx="minor">
+            <a:schemeClr val="tx1"/>
+          </a:fontRef>
+        </p:style>
+      </p:cxnSp>
+      <p:cxnSp>
+        <p:nvCxnSpPr>
+          <p:cNvPr id="48" name="Gerade Verbindung mit Pfeil 47">
+            <a:extLst>
+              <a:ext uri="{FF2B5EF4-FFF2-40B4-BE49-F238E27FC236}">
+                <a16:creationId xmlns:a16="http://schemas.microsoft.com/office/drawing/2014/main" id="{8A149A1D-AA3F-91C7-9040-AA2B5D4BE809}"/>
+              </a:ext>
+            </a:extLst>
+          </p:cNvPr>
+          <p:cNvCxnSpPr>
+            <a:cxnSpLocks/>
+            <a:stCxn id="34" idx="1"/>
+          </p:cNvCxnSpPr>
+          <p:nvPr/>
+        </p:nvCxnSpPr>
+        <p:spPr>
+          <a:xfrm flipH="1">
+            <a:off x="4795935" y="3615613"/>
+            <a:ext cx="2063969" cy="0"/>
+          </a:xfrm>
+          <a:prstGeom prst="straightConnector1">
+            <a:avLst/>
+          </a:prstGeom>
+          <a:ln>
+            <a:tailEnd type="triangle"/>
+          </a:ln>
+        </p:spPr>
+        <p:style>
+          <a:lnRef idx="1">
+            <a:schemeClr val="dk1"/>
+          </a:lnRef>
+          <a:fillRef idx="0">
+            <a:schemeClr val="dk1"/>
+          </a:fillRef>
+          <a:effectRef idx="0">
+            <a:schemeClr val="dk1"/>
+          </a:effectRef>
+          <a:fontRef idx="minor">
+            <a:schemeClr val="tx1"/>
+          </a:fontRef>
+        </p:style>
+      </p:cxnSp>
+      <mc:AlternateContent xmlns:mc="http://schemas.openxmlformats.org/markup-compatibility/2006">
+        <mc:Choice xmlns:a14="http://schemas.microsoft.com/office/drawing/2010/main" Requires="a14">
+          <p:sp>
+            <p:nvSpPr>
+              <p:cNvPr id="52" name="Textfeld 51">
+                <a:extLst>
+                  <a:ext uri="{FF2B5EF4-FFF2-40B4-BE49-F238E27FC236}">
+                    <a16:creationId xmlns:a16="http://schemas.microsoft.com/office/drawing/2014/main" id="{C93643DD-4F1B-65B0-2CEE-F5FCA3DF8F14}"/>
+                  </a:ext>
+                </a:extLst>
+              </p:cNvPr>
+              <p:cNvSpPr txBox="1"/>
+              <p:nvPr/>
+            </p:nvSpPr>
+            <p:spPr>
+              <a:xfrm>
+                <a:off x="5675875" y="3656281"/>
+                <a:ext cx="565989" cy="232692"/>
+              </a:xfrm>
+              <a:prstGeom prst="rect">
+                <a:avLst/>
+              </a:prstGeom>
+              <a:noFill/>
+            </p:spPr>
+            <p:txBody>
+              <a:bodyPr wrap="none" lIns="0" tIns="0" rIns="0" bIns="0" rtlCol="0">
+                <a:spAutoFit/>
+              </a:bodyPr>
+              <a:lstStyle/>
+              <a:p>
+                <a14:m>
+                  <m:oMathPara xmlns:m="http://schemas.openxmlformats.org/officeDocument/2006/math">
+                    <m:oMathParaPr>
+                      <m:jc m:val="centerGroup"/>
+                    </m:oMathParaPr>
+                    <m:oMath xmlns:m="http://schemas.openxmlformats.org/officeDocument/2006/math">
+                      <m:sSub>
+                        <m:sSubPr>
+                          <m:ctrlPr>
+                            <a:rPr lang="de-DE" sz="1400" b="0" i="1" smtClean="0">
+                              <a:latin typeface="Cambria Math" panose="02040503050406030204" pitchFamily="18" charset="0"/>
+                            </a:rPr>
+                          </m:ctrlPr>
+                        </m:sSubPr>
+                        <m:e>
+                          <m:r>
+                            <a:rPr lang="de-DE" sz="1400" b="0" i="1" smtClean="0">
+                              <a:latin typeface="Cambria Math" panose="02040503050406030204" pitchFamily="18" charset="0"/>
+                            </a:rPr>
+                            <m:t>𝑝</m:t>
+                          </m:r>
+                        </m:e>
+                        <m:sub>
+                          <m:r>
+                            <a:rPr lang="de-DE" sz="1400" b="0" i="1" smtClean="0">
+                              <a:latin typeface="Cambria Math" panose="02040503050406030204" pitchFamily="18" charset="0"/>
+                            </a:rPr>
+                            <m:t>𝑣𝑒𝑟𝑖𝑓𝑦</m:t>
+                          </m:r>
+                        </m:sub>
+                      </m:sSub>
+                    </m:oMath>
+                  </m:oMathPara>
+                </a14:m>
+                <a:endParaRPr lang="de-DE" sz="1400" dirty="0"/>
+              </a:p>
+            </p:txBody>
+          </p:sp>
+        </mc:Choice>
+        <mc:Fallback>
+          <p:sp>
+            <p:nvSpPr>
+              <p:cNvPr id="52" name="Textfeld 51">
+                <a:extLst>
+                  <a:ext uri="{FF2B5EF4-FFF2-40B4-BE49-F238E27FC236}">
+                    <a16:creationId xmlns:a16="http://schemas.microsoft.com/office/drawing/2014/main" id="{C93643DD-4F1B-65B0-2CEE-F5FCA3DF8F14}"/>
+                  </a:ext>
+                </a:extLst>
+              </p:cNvPr>
+              <p:cNvSpPr txBox="1">
+                <a:spLocks noRot="1" noChangeAspect="1" noMove="1" noResize="1" noEditPoints="1" noAdjustHandles="1" noChangeArrowheads="1" noChangeShapeType="1" noTextEdit="1"/>
+              </p:cNvSpPr>
+              <p:nvPr/>
+            </p:nvSpPr>
+            <p:spPr>
+              <a:xfrm>
+                <a:off x="5675875" y="3656281"/>
+                <a:ext cx="565989" cy="232692"/>
+              </a:xfrm>
+              <a:prstGeom prst="rect">
+                <a:avLst/>
+              </a:prstGeom>
+              <a:blipFill>
+                <a:blip r:embed="rId3"/>
+                <a:stretch>
+                  <a:fillRect l="-6452" r="-3226" b="-23684"/>
+                </a:stretch>
+              </a:blipFill>
+            </p:spPr>
+            <p:txBody>
+              <a:bodyPr/>
+              <a:lstStyle/>
+              <a:p>
+                <a:r>
+                  <a:rPr lang="de-DE">
+                    <a:noFill/>
+                  </a:rPr>
+                  <a:t> </a:t>
+                </a:r>
+              </a:p>
+            </p:txBody>
+          </p:sp>
+        </mc:Fallback>
+      </mc:AlternateContent>
+      <p:cxnSp>
+        <p:nvCxnSpPr>
+          <p:cNvPr id="53" name="Verbinder: gewinkelt 52">
+            <a:extLst>
+              <a:ext uri="{FF2B5EF4-FFF2-40B4-BE49-F238E27FC236}">
+                <a16:creationId xmlns:a16="http://schemas.microsoft.com/office/drawing/2014/main" id="{2263C789-BD18-D4FA-13C9-9A3EECB3D6C7}"/>
+              </a:ext>
+            </a:extLst>
+          </p:cNvPr>
+          <p:cNvCxnSpPr>
+            <a:stCxn id="32" idx="2"/>
+            <a:endCxn id="32" idx="1"/>
+          </p:cNvCxnSpPr>
+          <p:nvPr/>
+        </p:nvCxnSpPr>
+        <p:spPr>
+          <a:xfrm rot="5400000" flipH="1">
+            <a:off x="3305371" y="3320922"/>
+            <a:ext cx="303244" cy="892628"/>
+          </a:xfrm>
+          <a:prstGeom prst="bentConnector4">
+            <a:avLst>
+              <a:gd name="adj1" fmla="val -75385"/>
+              <a:gd name="adj2" fmla="val 125610"/>
+            </a:avLst>
+          </a:prstGeom>
+          <a:ln>
+            <a:tailEnd type="triangle"/>
+          </a:ln>
+        </p:spPr>
+        <p:style>
+          <a:lnRef idx="1">
+            <a:schemeClr val="dk1"/>
+          </a:lnRef>
+          <a:fillRef idx="0">
+            <a:schemeClr val="dk1"/>
+          </a:fillRef>
+          <a:effectRef idx="0">
+            <a:schemeClr val="dk1"/>
+          </a:effectRef>
+          <a:fontRef idx="minor">
+            <a:schemeClr val="tx1"/>
+          </a:fontRef>
+        </p:style>
+      </p:cxnSp>
+      <mc:AlternateContent xmlns:mc="http://schemas.openxmlformats.org/markup-compatibility/2006">
+        <mc:Choice xmlns:a14="http://schemas.microsoft.com/office/drawing/2010/main" Requires="a14">
+          <p:sp>
+            <p:nvSpPr>
+              <p:cNvPr id="54" name="Textfeld 53">
+                <a:extLst>
+                  <a:ext uri="{FF2B5EF4-FFF2-40B4-BE49-F238E27FC236}">
+                    <a16:creationId xmlns:a16="http://schemas.microsoft.com/office/drawing/2014/main" id="{3C99110D-1389-E9ED-6CDB-EBC2EF52FB9F}"/>
+                  </a:ext>
+                </a:extLst>
+              </p:cNvPr>
+              <p:cNvSpPr txBox="1"/>
+              <p:nvPr/>
+            </p:nvSpPr>
+            <p:spPr>
+              <a:xfrm>
+                <a:off x="7151050" y="2365469"/>
+                <a:ext cx="780406" cy="232949"/>
+              </a:xfrm>
+              <a:prstGeom prst="rect">
+                <a:avLst/>
+              </a:prstGeom>
+              <a:noFill/>
+            </p:spPr>
+            <p:txBody>
+              <a:bodyPr wrap="none" lIns="0" tIns="0" rIns="0" bIns="0" rtlCol="0">
+                <a:spAutoFit/>
+              </a:bodyPr>
+              <a:lstStyle/>
+              <a:p>
+                <a14:m>
+                  <m:oMathPara xmlns:m="http://schemas.openxmlformats.org/officeDocument/2006/math">
+                    <m:oMathParaPr>
+                      <m:jc m:val="centerGroup"/>
+                    </m:oMathParaPr>
+                    <m:oMath xmlns:m="http://schemas.openxmlformats.org/officeDocument/2006/math">
+                      <m:sSub>
+                        <m:sSubPr>
+                          <m:ctrlPr>
+                            <a:rPr lang="de-DE" sz="1400" b="0" i="1" smtClean="0">
+                              <a:latin typeface="Cambria Math" panose="02040503050406030204" pitchFamily="18" charset="0"/>
+                            </a:rPr>
+                          </m:ctrlPr>
+                        </m:sSubPr>
+                        <m:e>
+                          <m:r>
+                            <a:rPr lang="de-DE" sz="1400" b="0" i="1" smtClean="0">
+                              <a:latin typeface="Cambria Math" panose="02040503050406030204" pitchFamily="18" charset="0"/>
+                            </a:rPr>
+                            <m:t>𝑓</m:t>
+                          </m:r>
+                        </m:e>
+                        <m:sub>
+                          <m:r>
+                            <a:rPr lang="de-DE" sz="1400" b="0" i="1" smtClean="0">
+                              <a:latin typeface="Cambria Math" panose="02040503050406030204" pitchFamily="18" charset="0"/>
+                            </a:rPr>
+                            <m:t>𝑛𝑒𝑖𝑔h𝑏𝑜𝑟𝑠</m:t>
+                          </m:r>
+                        </m:sub>
+                      </m:sSub>
+                    </m:oMath>
+                  </m:oMathPara>
+                </a14:m>
+                <a:endParaRPr lang="de-DE" sz="1400" dirty="0"/>
+              </a:p>
+            </p:txBody>
+          </p:sp>
+        </mc:Choice>
+        <mc:Fallback>
+          <p:sp>
+            <p:nvSpPr>
+              <p:cNvPr id="54" name="Textfeld 53">
+                <a:extLst>
+                  <a:ext uri="{FF2B5EF4-FFF2-40B4-BE49-F238E27FC236}">
+                    <a16:creationId xmlns:a16="http://schemas.microsoft.com/office/drawing/2014/main" id="{3C99110D-1389-E9ED-6CDB-EBC2EF52FB9F}"/>
+                  </a:ext>
+                </a:extLst>
+              </p:cNvPr>
+              <p:cNvSpPr txBox="1">
+                <a:spLocks noRot="1" noChangeAspect="1" noMove="1" noResize="1" noEditPoints="1" noAdjustHandles="1" noChangeArrowheads="1" noChangeShapeType="1" noTextEdit="1"/>
+              </p:cNvSpPr>
+              <p:nvPr/>
+            </p:nvSpPr>
+            <p:spPr>
+              <a:xfrm>
+                <a:off x="7151050" y="2365469"/>
+                <a:ext cx="780406" cy="232949"/>
+              </a:xfrm>
+              <a:prstGeom prst="rect">
+                <a:avLst/>
+              </a:prstGeom>
+              <a:blipFill>
+                <a:blip r:embed="rId4"/>
+                <a:stretch>
+                  <a:fillRect l="-7031" r="-2344" b="-26316"/>
+                </a:stretch>
+              </a:blipFill>
+            </p:spPr>
+            <p:txBody>
+              <a:bodyPr/>
+              <a:lstStyle/>
+              <a:p>
+                <a:r>
+                  <a:rPr lang="de-DE">
+                    <a:noFill/>
+                  </a:rPr>
+                  <a:t> </a:t>
+                </a:r>
+              </a:p>
+            </p:txBody>
+          </p:sp>
+        </mc:Fallback>
+      </mc:AlternateContent>
+      <mc:AlternateContent xmlns:mc="http://schemas.openxmlformats.org/markup-compatibility/2006">
+        <mc:Choice xmlns:a14="http://schemas.microsoft.com/office/drawing/2010/main" Requires="a14">
+          <p:sp>
+            <p:nvSpPr>
+              <p:cNvPr id="55" name="Textfeld 54">
+                <a:extLst>
+                  <a:ext uri="{FF2B5EF4-FFF2-40B4-BE49-F238E27FC236}">
+                    <a16:creationId xmlns:a16="http://schemas.microsoft.com/office/drawing/2014/main" id="{C51B48B2-7462-56BB-5897-C29FF2B4D399}"/>
+                  </a:ext>
+                </a:extLst>
+              </p:cNvPr>
+              <p:cNvSpPr txBox="1"/>
+              <p:nvPr/>
+            </p:nvSpPr>
+            <p:spPr>
+              <a:xfrm>
+                <a:off x="2814009" y="4222103"/>
+                <a:ext cx="139461" cy="215444"/>
+              </a:xfrm>
+              <a:prstGeom prst="rect">
+                <a:avLst/>
+              </a:prstGeom>
+              <a:noFill/>
+            </p:spPr>
+            <p:txBody>
+              <a:bodyPr wrap="none" lIns="0" tIns="0" rIns="0" bIns="0" rtlCol="0">
+                <a:spAutoFit/>
+              </a:bodyPr>
+              <a:lstStyle/>
+              <a:p>
+                <a14:m>
+                  <m:oMathPara xmlns:m="http://schemas.openxmlformats.org/officeDocument/2006/math">
+                    <m:oMathParaPr>
+                      <m:jc m:val="centerGroup"/>
+                    </m:oMathParaPr>
+                    <m:oMath xmlns:m="http://schemas.openxmlformats.org/officeDocument/2006/math">
+                      <m:r>
+                        <a:rPr lang="de-DE" sz="1400" b="0" i="1" smtClean="0">
+                          <a:latin typeface="Cambria Math" panose="02040503050406030204" pitchFamily="18" charset="0"/>
+                        </a:rPr>
+                        <m:t>1</m:t>
+                      </m:r>
+                    </m:oMath>
+                  </m:oMathPara>
+                </a14:m>
+                <a:endParaRPr lang="de-DE" sz="1400" dirty="0"/>
+              </a:p>
+            </p:txBody>
+          </p:sp>
+        </mc:Choice>
+        <mc:Fallback>
+          <p:sp>
+            <p:nvSpPr>
+              <p:cNvPr id="55" name="Textfeld 54">
+                <a:extLst>
+                  <a:ext uri="{FF2B5EF4-FFF2-40B4-BE49-F238E27FC236}">
+                    <a16:creationId xmlns:a16="http://schemas.microsoft.com/office/drawing/2014/main" id="{C51B48B2-7462-56BB-5897-C29FF2B4D399}"/>
+                  </a:ext>
+                </a:extLst>
+              </p:cNvPr>
+              <p:cNvSpPr txBox="1">
+                <a:spLocks noRot="1" noChangeAspect="1" noMove="1" noResize="1" noEditPoints="1" noAdjustHandles="1" noChangeArrowheads="1" noChangeShapeType="1" noTextEdit="1"/>
+              </p:cNvSpPr>
+              <p:nvPr/>
+            </p:nvSpPr>
+            <p:spPr>
+              <a:xfrm>
+                <a:off x="2814009" y="4222103"/>
+                <a:ext cx="139461" cy="215444"/>
+              </a:xfrm>
+              <a:prstGeom prst="rect">
+                <a:avLst/>
+              </a:prstGeom>
+              <a:blipFill>
+                <a:blip r:embed="rId5"/>
+                <a:stretch>
+                  <a:fillRect l="-31818" r="-31818" b="-5714"/>
+                </a:stretch>
+              </a:blipFill>
+            </p:spPr>
+            <p:txBody>
+              <a:bodyPr/>
+              <a:lstStyle/>
+              <a:p>
+                <a:r>
+                  <a:rPr lang="de-DE">
+                    <a:noFill/>
+                  </a:rPr>
+                  <a:t> </a:t>
+                </a:r>
+              </a:p>
+            </p:txBody>
+          </p:sp>
+        </mc:Fallback>
+      </mc:AlternateContent>
+      <p:cxnSp>
+        <p:nvCxnSpPr>
+          <p:cNvPr id="56" name="Verbinder: gewinkelt 55">
+            <a:extLst>
+              <a:ext uri="{FF2B5EF4-FFF2-40B4-BE49-F238E27FC236}">
+                <a16:creationId xmlns:a16="http://schemas.microsoft.com/office/drawing/2014/main" id="{F0E69714-535B-34CA-1BB1-87BCE87793BC}"/>
+              </a:ext>
+            </a:extLst>
+          </p:cNvPr>
+          <p:cNvCxnSpPr>
+            <a:stCxn id="36" idx="1"/>
+            <a:endCxn id="36" idx="0"/>
+          </p:cNvCxnSpPr>
+          <p:nvPr/>
+        </p:nvCxnSpPr>
+        <p:spPr>
+          <a:xfrm rot="10800000" flipH="1">
+            <a:off x="5057018" y="1570649"/>
+            <a:ext cx="892628" cy="303245"/>
+          </a:xfrm>
+          <a:prstGeom prst="bentConnector4">
+            <a:avLst>
+              <a:gd name="adj1" fmla="val -25610"/>
+              <a:gd name="adj2" fmla="val 175385"/>
+            </a:avLst>
+          </a:prstGeom>
+          <a:ln>
+            <a:tailEnd type="triangle"/>
+          </a:ln>
+        </p:spPr>
+        <p:style>
+          <a:lnRef idx="1">
+            <a:schemeClr val="dk1"/>
+          </a:lnRef>
+          <a:fillRef idx="0">
+            <a:schemeClr val="dk1"/>
+          </a:fillRef>
+          <a:effectRef idx="0">
+            <a:schemeClr val="dk1"/>
+          </a:effectRef>
+          <a:fontRef idx="minor">
+            <a:schemeClr val="tx1"/>
+          </a:fontRef>
+        </p:style>
+      </p:cxnSp>
+      <p:cxnSp>
+        <p:nvCxnSpPr>
+          <p:cNvPr id="57" name="Verbinder: gewinkelt 56">
+            <a:extLst>
+              <a:ext uri="{FF2B5EF4-FFF2-40B4-BE49-F238E27FC236}">
+                <a16:creationId xmlns:a16="http://schemas.microsoft.com/office/drawing/2014/main" id="{5156D7E0-670F-4A59-1B1F-AD83F463E143}"/>
+              </a:ext>
+            </a:extLst>
+          </p:cNvPr>
+          <p:cNvCxnSpPr>
+            <a:stCxn id="34" idx="3"/>
+            <a:endCxn id="34" idx="2"/>
+          </p:cNvCxnSpPr>
+          <p:nvPr/>
+        </p:nvCxnSpPr>
+        <p:spPr>
+          <a:xfrm flipH="1">
+            <a:off x="7752532" y="3615613"/>
+            <a:ext cx="892628" cy="303244"/>
+          </a:xfrm>
+          <a:prstGeom prst="bentConnector4">
+            <a:avLst>
+              <a:gd name="adj1" fmla="val -25610"/>
+              <a:gd name="adj2" fmla="val 175385"/>
+            </a:avLst>
+          </a:prstGeom>
+          <a:ln>
+            <a:tailEnd type="triangle"/>
+          </a:ln>
+        </p:spPr>
+        <p:style>
+          <a:lnRef idx="1">
+            <a:schemeClr val="dk1"/>
+          </a:lnRef>
+          <a:fillRef idx="0">
+            <a:schemeClr val="dk1"/>
+          </a:fillRef>
+          <a:effectRef idx="0">
+            <a:schemeClr val="dk1"/>
+          </a:effectRef>
+          <a:fontRef idx="minor">
+            <a:schemeClr val="tx1"/>
+          </a:fontRef>
+        </p:style>
+      </p:cxnSp>
+      <mc:AlternateContent xmlns:mc="http://schemas.openxmlformats.org/markup-compatibility/2006">
+        <mc:Choice xmlns:a14="http://schemas.microsoft.com/office/drawing/2010/main" Requires="a14">
+          <p:sp>
+            <p:nvSpPr>
+              <p:cNvPr id="58" name="Textfeld 57">
+                <a:extLst>
+                  <a:ext uri="{FF2B5EF4-FFF2-40B4-BE49-F238E27FC236}">
+                    <a16:creationId xmlns:a16="http://schemas.microsoft.com/office/drawing/2014/main" id="{916A7B1B-BD04-4FB8-8AF9-08C2CB5E21F4}"/>
+                  </a:ext>
+                </a:extLst>
+              </p:cNvPr>
+              <p:cNvSpPr txBox="1"/>
+              <p:nvPr/>
+            </p:nvSpPr>
+            <p:spPr>
+              <a:xfrm>
+                <a:off x="4464524" y="978465"/>
+                <a:ext cx="2082045" cy="232949"/>
+              </a:xfrm>
+              <a:prstGeom prst="rect">
+                <a:avLst/>
+              </a:prstGeom>
+              <a:noFill/>
+            </p:spPr>
+            <p:txBody>
+              <a:bodyPr wrap="none" lIns="0" tIns="0" rIns="0" bIns="0" rtlCol="0">
+                <a:spAutoFit/>
+              </a:bodyPr>
+              <a:lstStyle/>
+              <a:p>
+                <a14:m>
+                  <m:oMathPara xmlns:m="http://schemas.openxmlformats.org/officeDocument/2006/math">
+                    <m:oMathParaPr>
+                      <m:jc m:val="centerGroup"/>
+                    </m:oMathParaPr>
+                    <m:oMath xmlns:m="http://schemas.openxmlformats.org/officeDocument/2006/math">
+                      <m:sSub>
+                        <m:sSubPr>
+                          <m:ctrlPr>
+                            <a:rPr lang="de-DE" sz="1400" b="0" i="1" smtClean="0">
+                              <a:latin typeface="Cambria Math" panose="02040503050406030204" pitchFamily="18" charset="0"/>
+                            </a:rPr>
+                          </m:ctrlPr>
+                        </m:sSubPr>
+                        <m:e>
+                          <m:r>
+                            <a:rPr lang="de-DE" sz="1400" b="0" i="1" smtClean="0">
+                              <a:latin typeface="Cambria Math" panose="02040503050406030204" pitchFamily="18" charset="0"/>
+                            </a:rPr>
+                            <m:t>1−</m:t>
+                          </m:r>
+                          <m:r>
+                            <a:rPr lang="de-DE" sz="1400" b="0" i="1" smtClean="0">
+                              <a:latin typeface="Cambria Math" panose="02040503050406030204" pitchFamily="18" charset="0"/>
+                            </a:rPr>
+                            <m:t>𝑔</m:t>
+                          </m:r>
+                        </m:e>
+                        <m:sub>
+                          <m:r>
+                            <a:rPr lang="de-DE" sz="1400" b="0" i="1" smtClean="0">
+                              <a:latin typeface="Cambria Math" panose="02040503050406030204" pitchFamily="18" charset="0"/>
+                            </a:rPr>
+                            <m:t>𝑛𝑒𝑖𝑔h𝑏𝑜𝑟𝑠</m:t>
+                          </m:r>
+                        </m:sub>
+                      </m:sSub>
+                      <m:r>
+                        <a:rPr lang="de-DE" sz="1400" b="0" i="1" smtClean="0">
+                          <a:latin typeface="Cambria Math" panose="02040503050406030204" pitchFamily="18" charset="0"/>
+                        </a:rPr>
+                        <m:t>−</m:t>
+                      </m:r>
+                      <m:sSub>
+                        <m:sSubPr>
+                          <m:ctrlPr>
+                            <a:rPr lang="de-DE" sz="1400" b="0" i="1" smtClean="0">
+                              <a:latin typeface="Cambria Math" panose="02040503050406030204" pitchFamily="18" charset="0"/>
+                            </a:rPr>
+                          </m:ctrlPr>
+                        </m:sSubPr>
+                        <m:e>
+                          <m:r>
+                            <a:rPr lang="de-DE" sz="1400" b="0" i="1" smtClean="0">
+                              <a:latin typeface="Cambria Math" panose="02040503050406030204" pitchFamily="18" charset="0"/>
+                            </a:rPr>
+                            <m:t>𝑓</m:t>
+                          </m:r>
+                        </m:e>
+                        <m:sub>
+                          <m:r>
+                            <a:rPr lang="de-DE" sz="1400" b="0" i="1" smtClean="0">
+                              <a:latin typeface="Cambria Math" panose="02040503050406030204" pitchFamily="18" charset="0"/>
+                            </a:rPr>
+                            <m:t>𝑛𝑒𝑖𝑔h𝑏𝑜𝑟𝑠</m:t>
+                          </m:r>
+                        </m:sub>
+                      </m:sSub>
+                    </m:oMath>
+                  </m:oMathPara>
+                </a14:m>
+                <a:endParaRPr lang="de-DE" sz="1400" dirty="0"/>
+              </a:p>
+            </p:txBody>
+          </p:sp>
+        </mc:Choice>
+        <mc:Fallback>
+          <p:sp>
+            <p:nvSpPr>
+              <p:cNvPr id="58" name="Textfeld 57">
+                <a:extLst>
+                  <a:ext uri="{FF2B5EF4-FFF2-40B4-BE49-F238E27FC236}">
+                    <a16:creationId xmlns:a16="http://schemas.microsoft.com/office/drawing/2014/main" id="{916A7B1B-BD04-4FB8-8AF9-08C2CB5E21F4}"/>
+                  </a:ext>
+                </a:extLst>
+              </p:cNvPr>
+              <p:cNvSpPr txBox="1">
+                <a:spLocks noRot="1" noChangeAspect="1" noMove="1" noResize="1" noEditPoints="1" noAdjustHandles="1" noChangeArrowheads="1" noChangeShapeType="1" noTextEdit="1"/>
+              </p:cNvSpPr>
+              <p:nvPr/>
+            </p:nvSpPr>
+            <p:spPr>
+              <a:xfrm>
+                <a:off x="4464524" y="978465"/>
+                <a:ext cx="2082045" cy="232949"/>
+              </a:xfrm>
+              <a:prstGeom prst="rect">
+                <a:avLst/>
+              </a:prstGeom>
+              <a:blipFill>
+                <a:blip r:embed="rId6"/>
+                <a:stretch>
+                  <a:fillRect l="-1462" r="-585" b="-23684"/>
+                </a:stretch>
+              </a:blipFill>
+            </p:spPr>
+            <p:txBody>
+              <a:bodyPr/>
+              <a:lstStyle/>
+              <a:p>
+                <a:r>
+                  <a:rPr lang="de-DE">
+                    <a:noFill/>
+                  </a:rPr>
+                  <a:t> </a:t>
+                </a:r>
+              </a:p>
+            </p:txBody>
+          </p:sp>
+        </mc:Fallback>
+      </mc:AlternateContent>
+      <mc:AlternateContent xmlns:mc="http://schemas.openxmlformats.org/markup-compatibility/2006">
+        <mc:Choice xmlns:a14="http://schemas.microsoft.com/office/drawing/2010/main" Requires="a14">
+          <p:sp>
+            <p:nvSpPr>
+              <p:cNvPr id="59" name="Textfeld 58">
+                <a:extLst>
+                  <a:ext uri="{FF2B5EF4-FFF2-40B4-BE49-F238E27FC236}">
+                    <a16:creationId xmlns:a16="http://schemas.microsoft.com/office/drawing/2014/main" id="{62C2A237-3232-5954-21A6-6944E48083E4}"/>
+                  </a:ext>
+                </a:extLst>
+              </p:cNvPr>
+              <p:cNvSpPr txBox="1"/>
+              <p:nvPr/>
+            </p:nvSpPr>
+            <p:spPr>
+              <a:xfrm>
+                <a:off x="7826762" y="4245429"/>
+                <a:ext cx="879792" cy="232692"/>
+              </a:xfrm>
+              <a:prstGeom prst="rect">
+                <a:avLst/>
+              </a:prstGeom>
+              <a:noFill/>
+            </p:spPr>
+            <p:txBody>
+              <a:bodyPr wrap="none" lIns="0" tIns="0" rIns="0" bIns="0" rtlCol="0">
+                <a:spAutoFit/>
+              </a:bodyPr>
+              <a:lstStyle/>
+              <a:p>
+                <a14:m>
+                  <m:oMathPara xmlns:m="http://schemas.openxmlformats.org/officeDocument/2006/math">
+                    <m:oMathParaPr>
+                      <m:jc m:val="centerGroup"/>
+                    </m:oMathParaPr>
+                    <m:oMath xmlns:m="http://schemas.openxmlformats.org/officeDocument/2006/math">
+                      <m:r>
+                        <a:rPr lang="de-DE" sz="1400" b="0" i="1" smtClean="0">
+                          <a:latin typeface="Cambria Math" panose="02040503050406030204" pitchFamily="18" charset="0"/>
+                        </a:rPr>
+                        <m:t>1−</m:t>
+                      </m:r>
+                      <m:sSub>
+                        <m:sSubPr>
+                          <m:ctrlPr>
+                            <a:rPr lang="de-DE" sz="1400" b="0" i="1" smtClean="0">
+                              <a:latin typeface="Cambria Math" panose="02040503050406030204" pitchFamily="18" charset="0"/>
+                            </a:rPr>
+                          </m:ctrlPr>
+                        </m:sSubPr>
+                        <m:e>
+                          <m:r>
+                            <a:rPr lang="de-DE" sz="1400" b="0" i="1" smtClean="0">
+                              <a:latin typeface="Cambria Math" panose="02040503050406030204" pitchFamily="18" charset="0"/>
+                            </a:rPr>
+                            <m:t>𝑝</m:t>
+                          </m:r>
+                        </m:e>
+                        <m:sub>
+                          <m:r>
+                            <a:rPr lang="de-DE" sz="1400" b="0" i="1" smtClean="0">
+                              <a:latin typeface="Cambria Math" panose="02040503050406030204" pitchFamily="18" charset="0"/>
+                            </a:rPr>
+                            <m:t>𝑣𝑒𝑟𝑖𝑓𝑦</m:t>
+                          </m:r>
+                        </m:sub>
+                      </m:sSub>
+                    </m:oMath>
+                  </m:oMathPara>
+                </a14:m>
+                <a:endParaRPr lang="de-DE" sz="1400" dirty="0"/>
+              </a:p>
+            </p:txBody>
+          </p:sp>
+        </mc:Choice>
+        <mc:Fallback>
+          <p:sp>
+            <p:nvSpPr>
+              <p:cNvPr id="59" name="Textfeld 58">
+                <a:extLst>
+                  <a:ext uri="{FF2B5EF4-FFF2-40B4-BE49-F238E27FC236}">
+                    <a16:creationId xmlns:a16="http://schemas.microsoft.com/office/drawing/2014/main" id="{62C2A237-3232-5954-21A6-6944E48083E4}"/>
+                  </a:ext>
+                </a:extLst>
+              </p:cNvPr>
+              <p:cNvSpPr txBox="1">
+                <a:spLocks noRot="1" noChangeAspect="1" noMove="1" noResize="1" noEditPoints="1" noAdjustHandles="1" noChangeArrowheads="1" noChangeShapeType="1" noTextEdit="1"/>
+              </p:cNvSpPr>
+              <p:nvPr/>
+            </p:nvSpPr>
+            <p:spPr>
+              <a:xfrm>
+                <a:off x="7826762" y="4245429"/>
+                <a:ext cx="879792" cy="232692"/>
+              </a:xfrm>
+              <a:prstGeom prst="rect">
+                <a:avLst/>
+              </a:prstGeom>
+              <a:blipFill>
+                <a:blip r:embed="rId7"/>
+                <a:stretch>
+                  <a:fillRect l="-4167" r="-2083" b="-23077"/>
+                </a:stretch>
+              </a:blipFill>
+            </p:spPr>
+            <p:txBody>
+              <a:bodyPr/>
+              <a:lstStyle/>
+              <a:p>
+                <a:r>
+                  <a:rPr lang="de-DE">
+                    <a:noFill/>
+                  </a:rPr>
+                  <a:t> </a:t>
+                </a:r>
+              </a:p>
+            </p:txBody>
+          </p:sp>
+        </mc:Fallback>
+      </mc:AlternateContent>
+    </p:spTree>
+    <p:extLst>
+      <p:ext uri="{BB962C8B-B14F-4D97-AF65-F5344CB8AC3E}">
+        <p14:creationId xmlns:p14="http://schemas.microsoft.com/office/powerpoint/2010/main" val="3952970300"/>
       </p:ext>
     </p:extLst>
   </p:cSld>

</xml_diff>

<commit_message>
found massive bug and solved it
</commit_message>
<xml_diff>
--- a/presentations/GrafikenThesis.pptx
+++ b/presentations/GrafikenThesis.pptx
@@ -9,6 +9,7 @@
     <p:sldId id="258" r:id="rId3"/>
     <p:sldId id="259" r:id="rId4"/>
     <p:sldId id="260" r:id="rId5"/>
+    <p:sldId id="261" r:id="rId6"/>
   </p:sldIdLst>
   <p:sldSz cx="12192000" cy="6858000"/>
   <p:notesSz cx="6858000" cy="9144000"/>
@@ -262,7 +263,7 @@
           <a:p>
             <a:fld id="{1E68AC87-6ADD-4255-8209-B0E6CC8A4267}" type="datetimeFigureOut">
               <a:rPr lang="de-DE" smtClean="0"/>
-              <a:t>10.08.2023</a:t>
+              <a:t>21.08.2023</a:t>
             </a:fld>
             <a:endParaRPr lang="de-DE"/>
           </a:p>
@@ -460,7 +461,7 @@
           <a:p>
             <a:fld id="{1E68AC87-6ADD-4255-8209-B0E6CC8A4267}" type="datetimeFigureOut">
               <a:rPr lang="de-DE" smtClean="0"/>
-              <a:t>10.08.2023</a:t>
+              <a:t>21.08.2023</a:t>
             </a:fld>
             <a:endParaRPr lang="de-DE"/>
           </a:p>
@@ -668,7 +669,7 @@
           <a:p>
             <a:fld id="{1E68AC87-6ADD-4255-8209-B0E6CC8A4267}" type="datetimeFigureOut">
               <a:rPr lang="de-DE" smtClean="0"/>
-              <a:t>10.08.2023</a:t>
+              <a:t>21.08.2023</a:t>
             </a:fld>
             <a:endParaRPr lang="de-DE"/>
           </a:p>
@@ -866,7 +867,7 @@
           <a:p>
             <a:fld id="{1E68AC87-6ADD-4255-8209-B0E6CC8A4267}" type="datetimeFigureOut">
               <a:rPr lang="de-DE" smtClean="0"/>
-              <a:t>10.08.2023</a:t>
+              <a:t>21.08.2023</a:t>
             </a:fld>
             <a:endParaRPr lang="de-DE"/>
           </a:p>
@@ -1141,7 +1142,7 @@
           <a:p>
             <a:fld id="{1E68AC87-6ADD-4255-8209-B0E6CC8A4267}" type="datetimeFigureOut">
               <a:rPr lang="de-DE" smtClean="0"/>
-              <a:t>10.08.2023</a:t>
+              <a:t>21.08.2023</a:t>
             </a:fld>
             <a:endParaRPr lang="de-DE"/>
           </a:p>
@@ -1406,7 +1407,7 @@
           <a:p>
             <a:fld id="{1E68AC87-6ADD-4255-8209-B0E6CC8A4267}" type="datetimeFigureOut">
               <a:rPr lang="de-DE" smtClean="0"/>
-              <a:t>10.08.2023</a:t>
+              <a:t>21.08.2023</a:t>
             </a:fld>
             <a:endParaRPr lang="de-DE"/>
           </a:p>
@@ -1818,7 +1819,7 @@
           <a:p>
             <a:fld id="{1E68AC87-6ADD-4255-8209-B0E6CC8A4267}" type="datetimeFigureOut">
               <a:rPr lang="de-DE" smtClean="0"/>
-              <a:t>10.08.2023</a:t>
+              <a:t>21.08.2023</a:t>
             </a:fld>
             <a:endParaRPr lang="de-DE"/>
           </a:p>
@@ -1959,7 +1960,7 @@
           <a:p>
             <a:fld id="{1E68AC87-6ADD-4255-8209-B0E6CC8A4267}" type="datetimeFigureOut">
               <a:rPr lang="de-DE" smtClean="0"/>
-              <a:t>10.08.2023</a:t>
+              <a:t>21.08.2023</a:t>
             </a:fld>
             <a:endParaRPr lang="de-DE"/>
           </a:p>
@@ -2072,7 +2073,7 @@
           <a:p>
             <a:fld id="{1E68AC87-6ADD-4255-8209-B0E6CC8A4267}" type="datetimeFigureOut">
               <a:rPr lang="de-DE" smtClean="0"/>
-              <a:t>10.08.2023</a:t>
+              <a:t>21.08.2023</a:t>
             </a:fld>
             <a:endParaRPr lang="de-DE"/>
           </a:p>
@@ -2383,7 +2384,7 @@
           <a:p>
             <a:fld id="{1E68AC87-6ADD-4255-8209-B0E6CC8A4267}" type="datetimeFigureOut">
               <a:rPr lang="de-DE" smtClean="0"/>
-              <a:t>10.08.2023</a:t>
+              <a:t>21.08.2023</a:t>
             </a:fld>
             <a:endParaRPr lang="de-DE"/>
           </a:p>
@@ -2671,7 +2672,7 @@
           <a:p>
             <a:fld id="{1E68AC87-6ADD-4255-8209-B0E6CC8A4267}" type="datetimeFigureOut">
               <a:rPr lang="de-DE" smtClean="0"/>
-              <a:t>10.08.2023</a:t>
+              <a:t>21.08.2023</a:t>
             </a:fld>
             <a:endParaRPr lang="de-DE"/>
           </a:p>
@@ -2912,7 +2913,7 @@
           <a:p>
             <a:fld id="{1E68AC87-6ADD-4255-8209-B0E6CC8A4267}" type="datetimeFigureOut">
               <a:rPr lang="de-DE" smtClean="0"/>
-              <a:t>10.08.2023</a:t>
+              <a:t>21.08.2023</a:t>
             </a:fld>
             <a:endParaRPr lang="de-DE"/>
           </a:p>
@@ -3371,7 +3372,7 @@
             <a:pPr algn="ctr"/>
             <a:r>
               <a:rPr lang="en-US" dirty="0"/>
-              <a:t>search for relevant social media posts</a:t>
+              <a:t>Search for relevant social media posts</a:t>
             </a:r>
           </a:p>
         </p:txBody>
@@ -3418,7 +3419,7 @@
             <a:pPr algn="ctr"/>
             <a:r>
               <a:rPr lang="en-US" dirty="0"/>
-              <a:t>count the amount of social media posts over a given amount of time</a:t>
+              <a:t>Count the amount of social media posts over a given amount of time</a:t>
             </a:r>
           </a:p>
         </p:txBody>
@@ -3465,7 +3466,7 @@
             <a:pPr algn="ctr"/>
             <a:r>
               <a:rPr lang="en-US" dirty="0"/>
-              <a:t>filter the data plot</a:t>
+              <a:t>Filter the data plot</a:t>
             </a:r>
           </a:p>
         </p:txBody>
@@ -3514,7 +3515,7 @@
                 <a:pPr algn="ctr"/>
                 <a:r>
                   <a:rPr lang="en-US" dirty="0"/>
-                  <a:t>minimize</a:t>
+                  <a:t>Minimize</a:t>
                 </a:r>
               </a:p>
               <a:p>
@@ -3642,7 +3643,7 @@
               <a:blipFill>
                 <a:blip r:embed="rId2"/>
                 <a:stretch>
-                  <a:fillRect l="-862"/>
+                  <a:fillRect/>
                 </a:stretch>
               </a:blipFill>
             </p:spPr>
@@ -3703,7 +3704,7 @@
             <a:pPr algn="ctr"/>
             <a:r>
               <a:rPr lang="en-US" dirty="0"/>
-              <a:t>solve differential equations</a:t>
+              <a:t>Solve differential equations</a:t>
             </a:r>
           </a:p>
         </p:txBody>
@@ -3994,7 +3995,7 @@
             <a:pPr algn="ctr"/>
             <a:r>
               <a:rPr lang="en-US" dirty="0"/>
-              <a:t>search for relevant social media posts</a:t>
+              <a:t>Search for relevant social media posts</a:t>
             </a:r>
           </a:p>
         </p:txBody>
@@ -4041,7 +4042,7 @@
             <a:pPr algn="ctr"/>
             <a:r>
               <a:rPr lang="en-US" dirty="0"/>
-              <a:t>estimate system parameters</a:t>
+              <a:t>Estimate system parameters</a:t>
             </a:r>
           </a:p>
         </p:txBody>
@@ -4088,7 +4089,7 @@
             <a:pPr algn="ctr"/>
             <a:r>
               <a:rPr lang="en-US" dirty="0"/>
-              <a:t>run simulation</a:t>
+              <a:t>Run simulation</a:t>
             </a:r>
           </a:p>
         </p:txBody>
@@ -4524,8 +4525,8 @@
           </a:fontRef>
         </p:style>
       </p:cxnSp>
-      <mc:AlternateContent xmlns:mc="http://schemas.openxmlformats.org/markup-compatibility/2006">
-        <mc:Choice xmlns:a14="http://schemas.microsoft.com/office/drawing/2010/main" Requires="a14">
+      <mc:AlternateContent xmlns:mc="http://schemas.openxmlformats.org/markup-compatibility/2006" xmlns:a14="http://schemas.microsoft.com/office/drawing/2010/main">
+        <mc:Choice Requires="a14">
           <p:sp>
             <p:nvSpPr>
               <p:cNvPr id="27" name="Textfeld 26">
@@ -4554,6 +4555,7 @@
               </a:bodyPr>
               <a:lstStyle/>
               <a:p>
+                <a:pPr/>
                 <a14:m>
                   <m:oMathPara xmlns:m="http://schemas.openxmlformats.org/officeDocument/2006/math">
                     <m:oMathParaPr>
@@ -4593,7 +4595,7 @@
             </p:txBody>
           </p:sp>
         </mc:Choice>
-        <mc:Fallback>
+        <mc:Fallback xmlns="">
           <p:sp>
             <p:nvSpPr>
               <p:cNvPr id="27" name="Textfeld 26">
@@ -4638,8 +4640,8 @@
           </p:sp>
         </mc:Fallback>
       </mc:AlternateContent>
-      <mc:AlternateContent xmlns:mc="http://schemas.openxmlformats.org/markup-compatibility/2006">
-        <mc:Choice xmlns:a14="http://schemas.microsoft.com/office/drawing/2010/main" Requires="a14">
+      <mc:AlternateContent xmlns:mc="http://schemas.openxmlformats.org/markup-compatibility/2006" xmlns:a14="http://schemas.microsoft.com/office/drawing/2010/main">
+        <mc:Choice Requires="a14">
           <p:sp>
             <p:nvSpPr>
               <p:cNvPr id="29" name="Textfeld 28">
@@ -4668,6 +4670,7 @@
               </a:bodyPr>
               <a:lstStyle/>
               <a:p>
+                <a:pPr/>
                 <a14:m>
                   <m:oMathPara xmlns:m="http://schemas.openxmlformats.org/officeDocument/2006/math">
                     <m:oMathParaPr>
@@ -4707,7 +4710,7 @@
             </p:txBody>
           </p:sp>
         </mc:Choice>
-        <mc:Fallback>
+        <mc:Fallback xmlns="">
           <p:sp>
             <p:nvSpPr>
               <p:cNvPr id="29" name="Textfeld 28">
@@ -4876,8 +4879,8 @@
           </a:fontRef>
         </p:style>
       </p:cxnSp>
-      <mc:AlternateContent xmlns:mc="http://schemas.openxmlformats.org/markup-compatibility/2006">
-        <mc:Choice xmlns:a14="http://schemas.microsoft.com/office/drawing/2010/main" Requires="a14">
+      <mc:AlternateContent xmlns:mc="http://schemas.openxmlformats.org/markup-compatibility/2006" xmlns:a14="http://schemas.microsoft.com/office/drawing/2010/main">
+        <mc:Choice Requires="a14">
           <p:sp>
             <p:nvSpPr>
               <p:cNvPr id="39" name="Textfeld 38">
@@ -4906,6 +4909,7 @@
               </a:bodyPr>
               <a:lstStyle/>
               <a:p>
+                <a:pPr/>
                 <a14:m>
                   <m:oMathPara xmlns:m="http://schemas.openxmlformats.org/officeDocument/2006/math">
                     <m:oMathParaPr>
@@ -4945,7 +4949,7 @@
             </p:txBody>
           </p:sp>
         </mc:Choice>
-        <mc:Fallback>
+        <mc:Fallback xmlns="">
           <p:sp>
             <p:nvSpPr>
               <p:cNvPr id="39" name="Textfeld 38">
@@ -5035,8 +5039,8 @@
           </a:fontRef>
         </p:style>
       </p:cxnSp>
-      <mc:AlternateContent xmlns:mc="http://schemas.openxmlformats.org/markup-compatibility/2006">
-        <mc:Choice xmlns:a14="http://schemas.microsoft.com/office/drawing/2010/main" Requires="a14">
+      <mc:AlternateContent xmlns:mc="http://schemas.openxmlformats.org/markup-compatibility/2006" xmlns:a14="http://schemas.microsoft.com/office/drawing/2010/main">
+        <mc:Choice Requires="a14">
           <p:sp>
             <p:nvSpPr>
               <p:cNvPr id="42" name="Textfeld 41">
@@ -5065,6 +5069,7 @@
               </a:bodyPr>
               <a:lstStyle/>
               <a:p>
+                <a:pPr/>
                 <a14:m>
                   <m:oMathPara xmlns:m="http://schemas.openxmlformats.org/officeDocument/2006/math">
                     <m:oMathParaPr>
@@ -5104,7 +5109,7 @@
             </p:txBody>
           </p:sp>
         </mc:Choice>
-        <mc:Fallback>
+        <mc:Fallback xmlns="">
           <p:sp>
             <p:nvSpPr>
               <p:cNvPr id="42" name="Textfeld 41">
@@ -5149,8 +5154,8 @@
           </p:sp>
         </mc:Fallback>
       </mc:AlternateContent>
-      <mc:AlternateContent xmlns:mc="http://schemas.openxmlformats.org/markup-compatibility/2006">
-        <mc:Choice xmlns:a14="http://schemas.microsoft.com/office/drawing/2010/main" Requires="a14">
+      <mc:AlternateContent xmlns:mc="http://schemas.openxmlformats.org/markup-compatibility/2006" xmlns:a14="http://schemas.microsoft.com/office/drawing/2010/main">
+        <mc:Choice Requires="a14">
           <p:sp>
             <p:nvSpPr>
               <p:cNvPr id="43" name="Textfeld 42">
@@ -5179,6 +5184,7 @@
               </a:bodyPr>
               <a:lstStyle/>
               <a:p>
+                <a:pPr/>
                 <a14:m>
                   <m:oMathPara xmlns:m="http://schemas.openxmlformats.org/officeDocument/2006/math">
                     <m:oMathParaPr>
@@ -5224,7 +5230,7 @@
             </p:txBody>
           </p:sp>
         </mc:Choice>
-        <mc:Fallback>
+        <mc:Fallback xmlns="">
           <p:sp>
             <p:nvSpPr>
               <p:cNvPr id="43" name="Textfeld 42">
@@ -5359,8 +5365,8 @@
           </a:fontRef>
         </p:style>
       </p:cxnSp>
-      <mc:AlternateContent xmlns:mc="http://schemas.openxmlformats.org/markup-compatibility/2006">
-        <mc:Choice xmlns:a14="http://schemas.microsoft.com/office/drawing/2010/main" Requires="a14">
+      <mc:AlternateContent xmlns:mc="http://schemas.openxmlformats.org/markup-compatibility/2006" xmlns:a14="http://schemas.microsoft.com/office/drawing/2010/main">
+        <mc:Choice Requires="a14">
           <p:sp>
             <p:nvSpPr>
               <p:cNvPr id="50" name="Textfeld 49">
@@ -5389,6 +5395,7 @@
               </a:bodyPr>
               <a:lstStyle/>
               <a:p>
+                <a:pPr/>
                 <a14:m>
                   <m:oMathPara xmlns:m="http://schemas.openxmlformats.org/officeDocument/2006/math">
                     <m:oMathParaPr>
@@ -5465,7 +5472,7 @@
             </p:txBody>
           </p:sp>
         </mc:Choice>
-        <mc:Fallback>
+        <mc:Fallback xmlns="">
           <p:sp>
             <p:nvSpPr>
               <p:cNvPr id="50" name="Textfeld 49">
@@ -5510,8 +5517,8 @@
           </p:sp>
         </mc:Fallback>
       </mc:AlternateContent>
-      <mc:AlternateContent xmlns:mc="http://schemas.openxmlformats.org/markup-compatibility/2006">
-        <mc:Choice xmlns:a14="http://schemas.microsoft.com/office/drawing/2010/main" Requires="a14">
+      <mc:AlternateContent xmlns:mc="http://schemas.openxmlformats.org/markup-compatibility/2006" xmlns:a14="http://schemas.microsoft.com/office/drawing/2010/main">
+        <mc:Choice Requires="a14">
           <p:sp>
             <p:nvSpPr>
               <p:cNvPr id="51" name="Textfeld 50">
@@ -5540,6 +5547,7 @@
               </a:bodyPr>
               <a:lstStyle/>
               <a:p>
+                <a:pPr/>
                 <a14:m>
                   <m:oMathPara xmlns:m="http://schemas.openxmlformats.org/officeDocument/2006/math">
                     <m:oMathParaPr>
@@ -5616,7 +5624,7 @@
             </p:txBody>
           </p:sp>
         </mc:Choice>
-        <mc:Fallback>
+        <mc:Fallback xmlns="">
           <p:sp>
             <p:nvSpPr>
               <p:cNvPr id="51" name="Textfeld 50">
@@ -5873,8 +5881,8 @@
           </a:fontRef>
         </p:style>
       </p:cxnSp>
-      <mc:AlternateContent xmlns:mc="http://schemas.openxmlformats.org/markup-compatibility/2006">
-        <mc:Choice xmlns:a14="http://schemas.microsoft.com/office/drawing/2010/main" Requires="a14">
+      <mc:AlternateContent xmlns:mc="http://schemas.openxmlformats.org/markup-compatibility/2006" xmlns:a14="http://schemas.microsoft.com/office/drawing/2010/main">
+        <mc:Choice Requires="a14">
           <p:sp>
             <p:nvSpPr>
               <p:cNvPr id="40" name="Textfeld 39">
@@ -5903,6 +5911,7 @@
               </a:bodyPr>
               <a:lstStyle/>
               <a:p>
+                <a:pPr/>
                 <a14:m>
                   <m:oMathPara xmlns:m="http://schemas.openxmlformats.org/officeDocument/2006/math">
                     <m:oMathParaPr>
@@ -5942,7 +5951,7 @@
             </p:txBody>
           </p:sp>
         </mc:Choice>
-        <mc:Fallback>
+        <mc:Fallback xmlns="">
           <p:sp>
             <p:nvSpPr>
               <p:cNvPr id="40" name="Textfeld 39">
@@ -6070,8 +6079,8 @@
           </a:fontRef>
         </p:style>
       </p:cxnSp>
-      <mc:AlternateContent xmlns:mc="http://schemas.openxmlformats.org/markup-compatibility/2006">
-        <mc:Choice xmlns:a14="http://schemas.microsoft.com/office/drawing/2010/main" Requires="a14">
+      <mc:AlternateContent xmlns:mc="http://schemas.openxmlformats.org/markup-compatibility/2006" xmlns:a14="http://schemas.microsoft.com/office/drawing/2010/main">
+        <mc:Choice Requires="a14">
           <p:sp>
             <p:nvSpPr>
               <p:cNvPr id="52" name="Textfeld 51">
@@ -6100,6 +6109,7 @@
               </a:bodyPr>
               <a:lstStyle/>
               <a:p>
+                <a:pPr/>
                 <a14:m>
                   <m:oMathPara xmlns:m="http://schemas.openxmlformats.org/officeDocument/2006/math">
                     <m:oMathParaPr>
@@ -6139,7 +6149,7 @@
             </p:txBody>
           </p:sp>
         </mc:Choice>
-        <mc:Fallback>
+        <mc:Fallback xmlns="">
           <p:sp>
             <p:nvSpPr>
               <p:cNvPr id="52" name="Textfeld 51">
@@ -6229,8 +6239,8 @@
           </a:fontRef>
         </p:style>
       </p:cxnSp>
-      <mc:AlternateContent xmlns:mc="http://schemas.openxmlformats.org/markup-compatibility/2006">
-        <mc:Choice xmlns:a14="http://schemas.microsoft.com/office/drawing/2010/main" Requires="a14">
+      <mc:AlternateContent xmlns:mc="http://schemas.openxmlformats.org/markup-compatibility/2006" xmlns:a14="http://schemas.microsoft.com/office/drawing/2010/main">
+        <mc:Choice Requires="a14">
           <p:sp>
             <p:nvSpPr>
               <p:cNvPr id="54" name="Textfeld 53">
@@ -6259,6 +6269,7 @@
               </a:bodyPr>
               <a:lstStyle/>
               <a:p>
+                <a:pPr/>
                 <a14:m>
                   <m:oMathPara xmlns:m="http://schemas.openxmlformats.org/officeDocument/2006/math">
                     <m:oMathParaPr>
@@ -6298,7 +6309,7 @@
             </p:txBody>
           </p:sp>
         </mc:Choice>
-        <mc:Fallback>
+        <mc:Fallback xmlns="">
           <p:sp>
             <p:nvSpPr>
               <p:cNvPr id="54" name="Textfeld 53">
@@ -6343,8 +6354,8 @@
           </p:sp>
         </mc:Fallback>
       </mc:AlternateContent>
-      <mc:AlternateContent xmlns:mc="http://schemas.openxmlformats.org/markup-compatibility/2006">
-        <mc:Choice xmlns:a14="http://schemas.microsoft.com/office/drawing/2010/main" Requires="a14">
+      <mc:AlternateContent xmlns:mc="http://schemas.openxmlformats.org/markup-compatibility/2006" xmlns:a14="http://schemas.microsoft.com/office/drawing/2010/main">
+        <mc:Choice Requires="a14">
           <p:sp>
             <p:nvSpPr>
               <p:cNvPr id="55" name="Textfeld 54">
@@ -6373,6 +6384,7 @@
               </a:bodyPr>
               <a:lstStyle/>
               <a:p>
+                <a:pPr/>
                 <a14:m>
                   <m:oMathPara xmlns:m="http://schemas.openxmlformats.org/officeDocument/2006/math">
                     <m:oMathParaPr>
@@ -6393,7 +6405,7 @@
             </p:txBody>
           </p:sp>
         </mc:Choice>
-        <mc:Fallback>
+        <mc:Fallback xmlns="">
           <p:sp>
             <p:nvSpPr>
               <p:cNvPr id="55" name="Textfeld 54">
@@ -6528,8 +6540,8 @@
           </a:fontRef>
         </p:style>
       </p:cxnSp>
-      <mc:AlternateContent xmlns:mc="http://schemas.openxmlformats.org/markup-compatibility/2006">
-        <mc:Choice xmlns:a14="http://schemas.microsoft.com/office/drawing/2010/main" Requires="a14">
+      <mc:AlternateContent xmlns:mc="http://schemas.openxmlformats.org/markup-compatibility/2006" xmlns:a14="http://schemas.microsoft.com/office/drawing/2010/main">
+        <mc:Choice Requires="a14">
           <p:sp>
             <p:nvSpPr>
               <p:cNvPr id="58" name="Textfeld 57">
@@ -6558,6 +6570,7 @@
               </a:bodyPr>
               <a:lstStyle/>
               <a:p>
+                <a:pPr/>
                 <a14:m>
                   <m:oMathPara xmlns:m="http://schemas.openxmlformats.org/officeDocument/2006/math">
                     <m:oMathParaPr>
@@ -6634,7 +6647,7 @@
             </p:txBody>
           </p:sp>
         </mc:Choice>
-        <mc:Fallback>
+        <mc:Fallback xmlns="">
           <p:sp>
             <p:nvSpPr>
               <p:cNvPr id="58" name="Textfeld 57">
@@ -6679,8 +6692,8 @@
           </p:sp>
         </mc:Fallback>
       </mc:AlternateContent>
-      <mc:AlternateContent xmlns:mc="http://schemas.openxmlformats.org/markup-compatibility/2006">
-        <mc:Choice xmlns:a14="http://schemas.microsoft.com/office/drawing/2010/main" Requires="a14">
+      <mc:AlternateContent xmlns:mc="http://schemas.openxmlformats.org/markup-compatibility/2006" xmlns:a14="http://schemas.microsoft.com/office/drawing/2010/main">
+        <mc:Choice Requires="a14">
           <p:sp>
             <p:nvSpPr>
               <p:cNvPr id="59" name="Textfeld 58">
@@ -6709,6 +6722,7 @@
               </a:bodyPr>
               <a:lstStyle/>
               <a:p>
+                <a:pPr/>
                 <a14:m>
                   <m:oMathPara xmlns:m="http://schemas.openxmlformats.org/officeDocument/2006/math">
                     <m:oMathParaPr>
@@ -6754,7 +6768,7 @@
             </p:txBody>
           </p:sp>
         </mc:Choice>
-        <mc:Fallback>
+        <mc:Fallback xmlns="">
           <p:sp>
             <p:nvSpPr>
               <p:cNvPr id="59" name="Textfeld 58">
@@ -6803,6 +6817,869 @@
     <p:extLst>
       <p:ext uri="{BB962C8B-B14F-4D97-AF65-F5344CB8AC3E}">
         <p14:creationId xmlns:p14="http://schemas.microsoft.com/office/powerpoint/2010/main" val="3952970300"/>
+      </p:ext>
+    </p:extLst>
+  </p:cSld>
+  <p:clrMapOvr>
+    <a:masterClrMapping/>
+  </p:clrMapOvr>
+</p:sld>
+</file>
+
+<file path=ppt/slides/slide5.xml><?xml version="1.0" encoding="utf-8"?>
+<p:sld xmlns:a="http://schemas.openxmlformats.org/drawingml/2006/main" xmlns:r="http://schemas.openxmlformats.org/officeDocument/2006/relationships" xmlns:p="http://schemas.openxmlformats.org/presentationml/2006/main">
+  <p:cSld>
+    <p:spTree>
+      <p:nvGrpSpPr>
+        <p:cNvPr id="1" name=""/>
+        <p:cNvGrpSpPr/>
+        <p:nvPr/>
+      </p:nvGrpSpPr>
+      <p:grpSpPr>
+        <a:xfrm>
+          <a:off x="0" y="0"/>
+          <a:ext cx="0" cy="0"/>
+          <a:chOff x="0" y="0"/>
+          <a:chExt cx="0" cy="0"/>
+        </a:xfrm>
+      </p:grpSpPr>
+      <p:sp>
+        <p:nvSpPr>
+          <p:cNvPr id="4" name="Rechteck: abgerundete Ecken 3">
+            <a:extLst>
+              <a:ext uri="{FF2B5EF4-FFF2-40B4-BE49-F238E27FC236}">
+                <a16:creationId xmlns:a16="http://schemas.microsoft.com/office/drawing/2014/main" id="{9126F907-4B56-607F-4E1D-EC878DE6AEB0}"/>
+              </a:ext>
+            </a:extLst>
+          </p:cNvPr>
+          <p:cNvSpPr/>
+          <p:nvPr/>
+        </p:nvSpPr>
+        <p:spPr>
+          <a:xfrm>
+            <a:off x="212272" y="1338353"/>
+            <a:ext cx="2108718" cy="4134639"/>
+          </a:xfrm>
+          <a:prstGeom prst="roundRect">
+            <a:avLst/>
+          </a:prstGeom>
+        </p:spPr>
+        <p:style>
+          <a:lnRef idx="2">
+            <a:schemeClr val="dk1"/>
+          </a:lnRef>
+          <a:fillRef idx="1">
+            <a:schemeClr val="lt1"/>
+          </a:fillRef>
+          <a:effectRef idx="0">
+            <a:schemeClr val="dk1"/>
+          </a:effectRef>
+          <a:fontRef idx="minor">
+            <a:schemeClr val="dk1"/>
+          </a:fontRef>
+        </p:style>
+        <p:txBody>
+          <a:bodyPr rtlCol="0" anchor="ctr"/>
+          <a:lstStyle/>
+          <a:p>
+            <a:pPr algn="ctr"/>
+            <a:r>
+              <a:rPr lang="en-US" dirty="0"/>
+              <a:t>Input:</a:t>
+            </a:r>
+          </a:p>
+          <a:p>
+            <a:pPr algn="ctr"/>
+            <a:endParaRPr lang="en-US" dirty="0"/>
+          </a:p>
+          <a:p>
+            <a:pPr algn="ctr"/>
+            <a:endParaRPr lang="en-US" dirty="0"/>
+          </a:p>
+          <a:p>
+            <a:pPr algn="ctr"/>
+            <a:endParaRPr lang="en-US" dirty="0"/>
+          </a:p>
+          <a:p>
+            <a:pPr algn="ctr"/>
+            <a:endParaRPr lang="en-US" dirty="0"/>
+          </a:p>
+          <a:p>
+            <a:pPr algn="ctr"/>
+            <a:endParaRPr lang="en-US" dirty="0"/>
+          </a:p>
+          <a:p>
+            <a:pPr algn="ctr"/>
+            <a:endParaRPr lang="en-US" dirty="0"/>
+          </a:p>
+          <a:p>
+            <a:pPr algn="ctr"/>
+            <a:endParaRPr lang="en-US" dirty="0"/>
+          </a:p>
+          <a:p>
+            <a:pPr algn="ctr"/>
+            <a:endParaRPr lang="en-US" dirty="0"/>
+          </a:p>
+          <a:p>
+            <a:pPr algn="ctr"/>
+            <a:endParaRPr lang="en-US" dirty="0"/>
+          </a:p>
+          <a:p>
+            <a:pPr algn="ctr"/>
+            <a:endParaRPr lang="en-US" dirty="0"/>
+          </a:p>
+          <a:p>
+            <a:pPr algn="ctr"/>
+            <a:endParaRPr lang="en-US" dirty="0"/>
+          </a:p>
+          <a:p>
+            <a:pPr algn="ctr"/>
+            <a:endParaRPr lang="en-US" dirty="0"/>
+          </a:p>
+          <a:p>
+            <a:pPr algn="ctr"/>
+            <a:endParaRPr lang="en-US" dirty="0"/>
+          </a:p>
+        </p:txBody>
+      </p:sp>
+      <mc:AlternateContent xmlns:mc="http://schemas.openxmlformats.org/markup-compatibility/2006">
+        <mc:Choice xmlns:a14="http://schemas.microsoft.com/office/drawing/2010/main" Requires="a14">
+          <p:sp>
+            <p:nvSpPr>
+              <p:cNvPr id="5" name="Rechteck: abgerundete Ecken 4">
+                <a:extLst>
+                  <a:ext uri="{FF2B5EF4-FFF2-40B4-BE49-F238E27FC236}">
+                    <a16:creationId xmlns:a16="http://schemas.microsoft.com/office/drawing/2014/main" id="{7578C3A9-59A2-1568-E5E3-55796468011A}"/>
+                  </a:ext>
+                </a:extLst>
+              </p:cNvPr>
+              <p:cNvSpPr/>
+              <p:nvPr/>
+            </p:nvSpPr>
+            <p:spPr>
+              <a:xfrm>
+                <a:off x="2597022" y="1338353"/>
+                <a:ext cx="5595256" cy="4134639"/>
+              </a:xfrm>
+              <a:prstGeom prst="roundRect">
+                <a:avLst/>
+              </a:prstGeom>
+            </p:spPr>
+            <p:style>
+              <a:lnRef idx="2">
+                <a:schemeClr val="dk1"/>
+              </a:lnRef>
+              <a:fillRef idx="1">
+                <a:schemeClr val="lt1"/>
+              </a:fillRef>
+              <a:effectRef idx="0">
+                <a:schemeClr val="dk1"/>
+              </a:effectRef>
+              <a:fontRef idx="minor">
+                <a:schemeClr val="dk1"/>
+              </a:fontRef>
+            </p:style>
+            <p:txBody>
+              <a:bodyPr rtlCol="0" anchor="ctr"/>
+              <a:lstStyle/>
+              <a:p>
+                <a:pPr algn="ctr"/>
+                <a:r>
+                  <a:rPr lang="en-US" dirty="0"/>
+                  <a:t>Simulation steps:</a:t>
+                </a:r>
+              </a:p>
+              <a:p>
+                <a:pPr algn="ctr"/>
+                <a:endParaRPr lang="en-US" dirty="0"/>
+              </a:p>
+              <a:p>
+                <a:pPr marL="342900" indent="-342900">
+                  <a:buFont typeface="+mj-lt"/>
+                  <a:buAutoNum type="arabicPeriod"/>
+                </a:pPr>
+                <a:r>
+                  <a:rPr lang="en-US" dirty="0"/>
+                  <a:t>Initialize the network graph with one node as a source of information</a:t>
+                </a:r>
+              </a:p>
+              <a:p>
+                <a:pPr marL="342900" indent="-342900">
+                  <a:buFont typeface="+mj-lt"/>
+                  <a:buAutoNum type="arabicPeriod"/>
+                </a:pPr>
+                <a:r>
+                  <a:rPr lang="en-US" dirty="0"/>
+                  <a:t>For each iteration step </a:t>
+                </a:r>
+                <a14:m>
+                  <m:oMath xmlns:m="http://schemas.openxmlformats.org/officeDocument/2006/math">
+                    <m:sSub>
+                      <m:sSubPr>
+                        <m:ctrlPr>
+                          <a:rPr lang="en-US" i="1" smtClean="0">
+                            <a:latin typeface="Cambria Math" panose="02040503050406030204" pitchFamily="18" charset="0"/>
+                          </a:rPr>
+                        </m:ctrlPr>
+                      </m:sSubPr>
+                      <m:e>
+                        <m:r>
+                          <a:rPr lang="de-DE" b="0" i="1" smtClean="0">
+                            <a:latin typeface="Cambria Math" panose="02040503050406030204" pitchFamily="18" charset="0"/>
+                          </a:rPr>
+                          <m:t>𝑡</m:t>
+                        </m:r>
+                      </m:e>
+                      <m:sub>
+                        <m:r>
+                          <a:rPr lang="de-DE" b="0" i="1" smtClean="0">
+                            <a:latin typeface="Cambria Math" panose="02040503050406030204" pitchFamily="18" charset="0"/>
+                          </a:rPr>
+                          <m:t>𝑖</m:t>
+                        </m:r>
+                      </m:sub>
+                    </m:sSub>
+                  </m:oMath>
+                </a14:m>
+                <a:r>
+                  <a:rPr lang="en-US" dirty="0"/>
+                  <a:t>:</a:t>
+                </a:r>
+              </a:p>
+              <a:p>
+                <a:pPr marL="800100" lvl="1" indent="-342900">
+                  <a:buFont typeface="+mj-lt"/>
+                  <a:buAutoNum type="alphaLcPeriod"/>
+                </a:pPr>
+                <a:r>
+                  <a:rPr lang="en-US" sz="1600" dirty="0"/>
+                  <a:t>Calculate the power consumption as the sum of the power consumption of all nodes, where each node </a:t>
+                </a:r>
+                <a14:m>
+                  <m:oMath xmlns:m="http://schemas.openxmlformats.org/officeDocument/2006/math">
+                    <m:r>
+                      <a:rPr lang="de-DE" sz="1600" b="0" i="1" smtClean="0">
+                        <a:latin typeface="Cambria Math" panose="02040503050406030204" pitchFamily="18" charset="0"/>
+                      </a:rPr>
+                      <m:t>𝑛</m:t>
+                    </m:r>
+                  </m:oMath>
+                </a14:m>
+                <a:r>
+                  <a:rPr lang="en-US" sz="1600" dirty="0"/>
+                  <a:t> consumes power given the equation </a:t>
+                </a:r>
+                <a14:m>
+                  <m:oMath xmlns:m="http://schemas.openxmlformats.org/officeDocument/2006/math">
+                    <m:sSub>
+                      <m:sSubPr>
+                        <m:ctrlPr>
+                          <a:rPr lang="en-US" sz="1600" i="1" smtClean="0">
+                            <a:latin typeface="Cambria Math" panose="02040503050406030204" pitchFamily="18" charset="0"/>
+                          </a:rPr>
+                        </m:ctrlPr>
+                      </m:sSubPr>
+                      <m:e>
+                        <m:r>
+                          <a:rPr lang="de-DE" sz="1600" b="0" i="1" smtClean="0">
+                            <a:latin typeface="Cambria Math" panose="02040503050406030204" pitchFamily="18" charset="0"/>
+                          </a:rPr>
+                          <m:t>𝑝𝑜𝑤𝑒𝑟</m:t>
+                        </m:r>
+                      </m:e>
+                      <m:sub>
+                        <m:r>
+                          <a:rPr lang="de-DE" sz="1600" b="0" i="1" smtClean="0">
+                            <a:latin typeface="Cambria Math" panose="02040503050406030204" pitchFamily="18" charset="0"/>
+                          </a:rPr>
+                          <m:t>𝑛</m:t>
+                        </m:r>
+                      </m:sub>
+                    </m:sSub>
+                    <m:r>
+                      <a:rPr lang="de-DE" sz="1600" b="0" i="1" smtClean="0">
+                        <a:latin typeface="Cambria Math" panose="02040503050406030204" pitchFamily="18" charset="0"/>
+                      </a:rPr>
+                      <m:t>=</m:t>
+                    </m:r>
+                    <m:r>
+                      <a:rPr lang="de-DE" sz="1600" b="0" i="1" smtClean="0">
+                        <a:latin typeface="Cambria Math" panose="02040503050406030204" pitchFamily="18" charset="0"/>
+                      </a:rPr>
+                      <m:t>𝑎</m:t>
+                    </m:r>
+                    <m:r>
+                      <a:rPr lang="de-DE" sz="1600" b="0" i="1" smtClean="0">
+                        <a:latin typeface="Cambria Math" panose="02040503050406030204" pitchFamily="18" charset="0"/>
+                        <a:ea typeface="Cambria Math" panose="02040503050406030204" pitchFamily="18" charset="0"/>
+                      </a:rPr>
+                      <m:t>∙</m:t>
+                    </m:r>
+                    <m:sSub>
+                      <m:sSubPr>
+                        <m:ctrlPr>
+                          <a:rPr lang="de-DE" sz="1600" b="0" i="1" smtClean="0">
+                            <a:latin typeface="Cambria Math" panose="02040503050406030204" pitchFamily="18" charset="0"/>
+                            <a:ea typeface="Cambria Math" panose="02040503050406030204" pitchFamily="18" charset="0"/>
+                          </a:rPr>
+                        </m:ctrlPr>
+                      </m:sSubPr>
+                      <m:e>
+                        <m:r>
+                          <a:rPr lang="de-DE" sz="1600" b="0" i="1" smtClean="0">
+                            <a:latin typeface="Cambria Math" panose="02040503050406030204" pitchFamily="18" charset="0"/>
+                            <a:ea typeface="Cambria Math" panose="02040503050406030204" pitchFamily="18" charset="0"/>
+                          </a:rPr>
+                          <m:t>𝑝𝑜𝑤𝑒𝑟</m:t>
+                        </m:r>
+                      </m:e>
+                      <m:sub>
+                        <m:r>
+                          <a:rPr lang="de-DE" sz="1600" b="0" i="1" smtClean="0">
+                            <a:latin typeface="Cambria Math" panose="02040503050406030204" pitchFamily="18" charset="0"/>
+                            <a:ea typeface="Cambria Math" panose="02040503050406030204" pitchFamily="18" charset="0"/>
+                          </a:rPr>
+                          <m:t>𝑟𝑒𝑓</m:t>
+                        </m:r>
+                      </m:sub>
+                    </m:sSub>
+                    <m:r>
+                      <a:rPr lang="de-DE" sz="1600" b="0" i="1" smtClean="0">
+                        <a:latin typeface="Cambria Math" panose="02040503050406030204" pitchFamily="18" charset="0"/>
+                        <a:ea typeface="Cambria Math" panose="02040503050406030204" pitchFamily="18" charset="0"/>
+                      </a:rPr>
+                      <m:t>+</m:t>
+                    </m:r>
+                    <m:r>
+                      <a:rPr lang="de-DE" sz="1600" b="0" i="1" smtClean="0">
+                        <a:latin typeface="Cambria Math" panose="02040503050406030204" pitchFamily="18" charset="0"/>
+                        <a:ea typeface="Cambria Math" panose="02040503050406030204" pitchFamily="18" charset="0"/>
+                      </a:rPr>
+                      <m:t>𝑜𝑓𝑓𝑠𝑒𝑡</m:t>
+                    </m:r>
+                  </m:oMath>
+                </a14:m>
+                <a:r>
+                  <a:rPr lang="en-US" sz="1600" dirty="0"/>
+                  <a:t>, where </a:t>
+                </a:r>
+                <a14:m>
+                  <m:oMath xmlns:m="http://schemas.openxmlformats.org/officeDocument/2006/math">
+                    <m:r>
+                      <a:rPr lang="de-DE" sz="1600" b="0" i="1" smtClean="0">
+                        <a:latin typeface="Cambria Math" panose="02040503050406030204" pitchFamily="18" charset="0"/>
+                      </a:rPr>
+                      <m:t>𝑎</m:t>
+                    </m:r>
+                  </m:oMath>
+                </a14:m>
+                <a:r>
+                  <a:rPr lang="en-US" sz="1600" dirty="0"/>
+                  <a:t> is the constant overconsumption factor and </a:t>
+                </a:r>
+                <a14:m>
+                  <m:oMath xmlns:m="http://schemas.openxmlformats.org/officeDocument/2006/math">
+                    <m:r>
+                      <a:rPr lang="de-DE" sz="1600" b="0" i="1" smtClean="0">
+                        <a:latin typeface="Cambria Math" panose="02040503050406030204" pitchFamily="18" charset="0"/>
+                      </a:rPr>
+                      <m:t>𝑜𝑓𝑓𝑠𝑒𝑡</m:t>
+                    </m:r>
+                  </m:oMath>
+                </a14:m>
+                <a:r>
+                  <a:rPr lang="en-US" sz="1600" dirty="0"/>
+                  <a:t> is the excess power demand by the usage of the appliances defined in the JSON file</a:t>
+                </a:r>
+              </a:p>
+              <a:p>
+                <a:pPr marL="800100" lvl="1" indent="-342900">
+                  <a:buFont typeface="+mj-lt"/>
+                  <a:buAutoNum type="alphaLcPeriod"/>
+                </a:pPr>
+                <a:r>
+                  <a:rPr lang="en-US" sz="1600" dirty="0"/>
+                  <a:t>Calculate the next step of the information propagation process</a:t>
+                </a:r>
+                <a:endParaRPr lang="en-US" dirty="0"/>
+              </a:p>
+              <a:p>
+                <a:pPr algn="ctr"/>
+                <a:endParaRPr lang="en-US" dirty="0"/>
+              </a:p>
+              <a:p>
+                <a:pPr algn="ctr"/>
+                <a:endParaRPr lang="en-US" dirty="0"/>
+              </a:p>
+            </p:txBody>
+          </p:sp>
+        </mc:Choice>
+        <mc:Fallback>
+          <p:sp>
+            <p:nvSpPr>
+              <p:cNvPr id="5" name="Rechteck: abgerundete Ecken 4">
+                <a:extLst>
+                  <a:ext uri="{FF2B5EF4-FFF2-40B4-BE49-F238E27FC236}">
+                    <a16:creationId xmlns:a16="http://schemas.microsoft.com/office/drawing/2014/main" id="{7578C3A9-59A2-1568-E5E3-55796468011A}"/>
+                  </a:ext>
+                </a:extLst>
+              </p:cNvPr>
+              <p:cNvSpPr>
+                <a:spLocks noRot="1" noChangeAspect="1" noMove="1" noResize="1" noEditPoints="1" noAdjustHandles="1" noChangeArrowheads="1" noChangeShapeType="1" noTextEdit="1"/>
+              </p:cNvSpPr>
+              <p:nvPr/>
+            </p:nvSpPr>
+            <p:spPr>
+              <a:xfrm>
+                <a:off x="2597022" y="1338353"/>
+                <a:ext cx="5595256" cy="4134639"/>
+              </a:xfrm>
+              <a:prstGeom prst="roundRect">
+                <a:avLst/>
+              </a:prstGeom>
+              <a:blipFill>
+                <a:blip r:embed="rId2"/>
+                <a:stretch>
+                  <a:fillRect t="-1765"/>
+                </a:stretch>
+              </a:blipFill>
+            </p:spPr>
+            <p:txBody>
+              <a:bodyPr/>
+              <a:lstStyle/>
+              <a:p>
+                <a:r>
+                  <a:rPr lang="de-DE">
+                    <a:noFill/>
+                  </a:rPr>
+                  <a:t> </a:t>
+                </a:r>
+              </a:p>
+            </p:txBody>
+          </p:sp>
+        </mc:Fallback>
+      </mc:AlternateContent>
+      <p:cxnSp>
+        <p:nvCxnSpPr>
+          <p:cNvPr id="10" name="Gerade Verbindung mit Pfeil 9">
+            <a:extLst>
+              <a:ext uri="{FF2B5EF4-FFF2-40B4-BE49-F238E27FC236}">
+                <a16:creationId xmlns:a16="http://schemas.microsoft.com/office/drawing/2014/main" id="{146B2A59-696E-03E1-3386-0B2AF06D3AB4}"/>
+              </a:ext>
+            </a:extLst>
+          </p:cNvPr>
+          <p:cNvCxnSpPr>
+            <a:cxnSpLocks/>
+            <a:stCxn id="4" idx="3"/>
+            <a:endCxn id="5" idx="1"/>
+          </p:cNvCxnSpPr>
+          <p:nvPr/>
+        </p:nvCxnSpPr>
+        <p:spPr>
+          <a:xfrm>
+            <a:off x="2320990" y="3405673"/>
+            <a:ext cx="276032" cy="0"/>
+          </a:xfrm>
+          <a:prstGeom prst="straightConnector1">
+            <a:avLst/>
+          </a:prstGeom>
+          <a:ln>
+            <a:tailEnd type="triangle"/>
+          </a:ln>
+        </p:spPr>
+        <p:style>
+          <a:lnRef idx="1">
+            <a:schemeClr val="dk1"/>
+          </a:lnRef>
+          <a:fillRef idx="0">
+            <a:schemeClr val="dk1"/>
+          </a:fillRef>
+          <a:effectRef idx="0">
+            <a:schemeClr val="dk1"/>
+          </a:effectRef>
+          <a:fontRef idx="minor">
+            <a:schemeClr val="tx1"/>
+          </a:fontRef>
+        </p:style>
+      </p:cxnSp>
+      <p:pic>
+        <p:nvPicPr>
+          <p:cNvPr id="20" name="Grafik 19" descr="Ein Bild, das Mond, Dunkelheit, Schwarz, Natur enthält.&#10;&#10;Automatisch generierte Beschreibung">
+            <a:extLst>
+              <a:ext uri="{FF2B5EF4-FFF2-40B4-BE49-F238E27FC236}">
+                <a16:creationId xmlns:a16="http://schemas.microsoft.com/office/drawing/2014/main" id="{293B21F1-7199-DE47-E6B2-E0BFA934B602}"/>
+              </a:ext>
+            </a:extLst>
+          </p:cNvPr>
+          <p:cNvPicPr>
+            <a:picLocks noChangeAspect="1"/>
+          </p:cNvPicPr>
+          <p:nvPr/>
+        </p:nvPicPr>
+        <p:blipFill rotWithShape="1">
+          <a:blip r:embed="rId3">
+            <a:extLst>
+              <a:ext uri="{28A0092B-C50C-407E-A947-70E740481C1C}">
+                <a14:useLocalDpi xmlns:a14="http://schemas.microsoft.com/office/drawing/2010/main" val="0"/>
+              </a:ext>
+            </a:extLst>
+          </a:blip>
+          <a:srcRect l="40561" r="30510"/>
+          <a:stretch/>
+        </p:blipFill>
+        <p:spPr>
+          <a:xfrm rot="18203354">
+            <a:off x="885332" y="1801435"/>
+            <a:ext cx="761162" cy="898936"/>
+          </a:xfrm>
+          <a:prstGeom prst="rect">
+            <a:avLst/>
+          </a:prstGeom>
+        </p:spPr>
+      </p:pic>
+      <p:sp>
+        <p:nvSpPr>
+          <p:cNvPr id="34" name="Textfeld 33">
+            <a:extLst>
+              <a:ext uri="{FF2B5EF4-FFF2-40B4-BE49-F238E27FC236}">
+                <a16:creationId xmlns:a16="http://schemas.microsoft.com/office/drawing/2014/main" id="{61806AD9-95F6-4922-EA10-268AC03881F1}"/>
+              </a:ext>
+            </a:extLst>
+          </p:cNvPr>
+          <p:cNvSpPr txBox="1"/>
+          <p:nvPr/>
+        </p:nvSpPr>
+        <p:spPr>
+          <a:xfrm>
+            <a:off x="587701" y="2604357"/>
+            <a:ext cx="1497564" cy="261610"/>
+          </a:xfrm>
+          <a:prstGeom prst="rect">
+            <a:avLst/>
+          </a:prstGeom>
+          <a:noFill/>
+        </p:spPr>
+        <p:txBody>
+          <a:bodyPr wrap="square" rtlCol="0">
+            <a:spAutoFit/>
+          </a:bodyPr>
+          <a:lstStyle/>
+          <a:p>
+            <a:r>
+              <a:rPr lang="en-US" sz="1100" dirty="0"/>
+              <a:t>Social network graph</a:t>
+            </a:r>
+            <a:endParaRPr lang="de-DE" dirty="0"/>
+          </a:p>
+        </p:txBody>
+      </p:sp>
+      <p:pic>
+        <p:nvPicPr>
+          <p:cNvPr id="39" name="Grafik 38">
+            <a:extLst>
+              <a:ext uri="{FF2B5EF4-FFF2-40B4-BE49-F238E27FC236}">
+                <a16:creationId xmlns:a16="http://schemas.microsoft.com/office/drawing/2014/main" id="{AE27EE35-2996-74F7-6FFE-2A57C3C1D3AF}"/>
+              </a:ext>
+            </a:extLst>
+          </p:cNvPr>
+          <p:cNvPicPr>
+            <a:picLocks noChangeAspect="1"/>
+          </p:cNvPicPr>
+          <p:nvPr/>
+        </p:nvPicPr>
+        <p:blipFill>
+          <a:blip r:embed="rId4"/>
+          <a:stretch>
+            <a:fillRect/>
+          </a:stretch>
+        </p:blipFill>
+        <p:spPr>
+          <a:xfrm>
+            <a:off x="792385" y="4260023"/>
+            <a:ext cx="948491" cy="955055"/>
+          </a:xfrm>
+          <a:prstGeom prst="rect">
+            <a:avLst/>
+          </a:prstGeom>
+        </p:spPr>
+      </p:pic>
+      <p:sp>
+        <p:nvSpPr>
+          <p:cNvPr id="40" name="Textfeld 39">
+            <a:extLst>
+              <a:ext uri="{FF2B5EF4-FFF2-40B4-BE49-F238E27FC236}">
+                <a16:creationId xmlns:a16="http://schemas.microsoft.com/office/drawing/2014/main" id="{AB08F8B1-4D79-E7A2-3503-D7CA56C608BF}"/>
+              </a:ext>
+            </a:extLst>
+          </p:cNvPr>
+          <p:cNvSpPr txBox="1"/>
+          <p:nvPr/>
+        </p:nvSpPr>
+        <p:spPr>
+          <a:xfrm>
+            <a:off x="886556" y="5173920"/>
+            <a:ext cx="779903" cy="261610"/>
+          </a:xfrm>
+          <a:prstGeom prst="rect">
+            <a:avLst/>
+          </a:prstGeom>
+          <a:noFill/>
+        </p:spPr>
+        <p:txBody>
+          <a:bodyPr wrap="square" rtlCol="0">
+            <a:spAutoFit/>
+          </a:bodyPr>
+          <a:lstStyle/>
+          <a:p>
+            <a:r>
+              <a:rPr lang="en-US" sz="1100" dirty="0"/>
+              <a:t>JSON file</a:t>
+            </a:r>
+            <a:endParaRPr lang="de-DE" dirty="0"/>
+          </a:p>
+        </p:txBody>
+      </p:sp>
+      <p:sp>
+        <p:nvSpPr>
+          <p:cNvPr id="41" name="Rechteck: abgerundete Ecken 40">
+            <a:extLst>
+              <a:ext uri="{FF2B5EF4-FFF2-40B4-BE49-F238E27FC236}">
+                <a16:creationId xmlns:a16="http://schemas.microsoft.com/office/drawing/2014/main" id="{5860AEC8-D72A-F69E-B8A6-04F4CF78350D}"/>
+              </a:ext>
+            </a:extLst>
+          </p:cNvPr>
+          <p:cNvSpPr/>
+          <p:nvPr/>
+        </p:nvSpPr>
+        <p:spPr>
+          <a:xfrm>
+            <a:off x="8468310" y="1338353"/>
+            <a:ext cx="3561184" cy="4134639"/>
+          </a:xfrm>
+          <a:prstGeom prst="roundRect">
+            <a:avLst/>
+          </a:prstGeom>
+        </p:spPr>
+        <p:style>
+          <a:lnRef idx="2">
+            <a:schemeClr val="dk1"/>
+          </a:lnRef>
+          <a:fillRef idx="1">
+            <a:schemeClr val="lt1"/>
+          </a:fillRef>
+          <a:effectRef idx="0">
+            <a:schemeClr val="dk1"/>
+          </a:effectRef>
+          <a:fontRef idx="minor">
+            <a:schemeClr val="dk1"/>
+          </a:fontRef>
+        </p:style>
+        <p:txBody>
+          <a:bodyPr rtlCol="0" anchor="ctr"/>
+          <a:lstStyle/>
+          <a:p>
+            <a:pPr algn="ctr"/>
+            <a:r>
+              <a:rPr lang="en-US" dirty="0"/>
+              <a:t>Output:</a:t>
+            </a:r>
+          </a:p>
+          <a:p>
+            <a:pPr algn="ctr"/>
+            <a:endParaRPr lang="en-US" dirty="0"/>
+          </a:p>
+          <a:p>
+            <a:pPr algn="ctr"/>
+            <a:endParaRPr lang="en-US" dirty="0"/>
+          </a:p>
+          <a:p>
+            <a:pPr algn="ctr"/>
+            <a:endParaRPr lang="en-US" dirty="0"/>
+          </a:p>
+          <a:p>
+            <a:pPr algn="ctr"/>
+            <a:endParaRPr lang="en-US" dirty="0"/>
+          </a:p>
+          <a:p>
+            <a:pPr algn="ctr"/>
+            <a:endParaRPr lang="en-US" dirty="0"/>
+          </a:p>
+          <a:p>
+            <a:pPr algn="ctr"/>
+            <a:endParaRPr lang="en-US" dirty="0"/>
+          </a:p>
+          <a:p>
+            <a:pPr algn="ctr"/>
+            <a:endParaRPr lang="en-US" dirty="0"/>
+          </a:p>
+          <a:p>
+            <a:pPr algn="ctr"/>
+            <a:endParaRPr lang="en-US" dirty="0"/>
+          </a:p>
+          <a:p>
+            <a:pPr algn="ctr"/>
+            <a:endParaRPr lang="en-US" dirty="0"/>
+          </a:p>
+          <a:p>
+            <a:pPr algn="ctr"/>
+            <a:endParaRPr lang="en-US" dirty="0"/>
+          </a:p>
+          <a:p>
+            <a:pPr algn="ctr"/>
+            <a:endParaRPr lang="en-US" dirty="0"/>
+          </a:p>
+          <a:p>
+            <a:pPr algn="ctr"/>
+            <a:endParaRPr lang="en-US" dirty="0"/>
+          </a:p>
+          <a:p>
+            <a:pPr algn="ctr"/>
+            <a:endParaRPr lang="en-US" dirty="0"/>
+          </a:p>
+        </p:txBody>
+      </p:sp>
+      <p:cxnSp>
+        <p:nvCxnSpPr>
+          <p:cNvPr id="43" name="Gerade Verbindung mit Pfeil 42">
+            <a:extLst>
+              <a:ext uri="{FF2B5EF4-FFF2-40B4-BE49-F238E27FC236}">
+                <a16:creationId xmlns:a16="http://schemas.microsoft.com/office/drawing/2014/main" id="{7B647D0B-E4FB-916B-603E-8BB270B78723}"/>
+              </a:ext>
+            </a:extLst>
+          </p:cNvPr>
+          <p:cNvCxnSpPr>
+            <a:cxnSpLocks/>
+            <a:stCxn id="5" idx="3"/>
+            <a:endCxn id="41" idx="1"/>
+          </p:cNvCxnSpPr>
+          <p:nvPr/>
+        </p:nvCxnSpPr>
+        <p:spPr>
+          <a:xfrm>
+            <a:off x="8192278" y="3405673"/>
+            <a:ext cx="276032" cy="0"/>
+          </a:xfrm>
+          <a:prstGeom prst="straightConnector1">
+            <a:avLst/>
+          </a:prstGeom>
+          <a:ln>
+            <a:tailEnd type="triangle"/>
+          </a:ln>
+        </p:spPr>
+        <p:style>
+          <a:lnRef idx="1">
+            <a:schemeClr val="dk1"/>
+          </a:lnRef>
+          <a:fillRef idx="0">
+            <a:schemeClr val="dk1"/>
+          </a:fillRef>
+          <a:effectRef idx="0">
+            <a:schemeClr val="dk1"/>
+          </a:effectRef>
+          <a:fontRef idx="minor">
+            <a:schemeClr val="tx1"/>
+          </a:fontRef>
+        </p:style>
+      </p:cxnSp>
+      <p:pic>
+        <p:nvPicPr>
+          <p:cNvPr id="46" name="Grafik 45">
+            <a:extLst>
+              <a:ext uri="{FF2B5EF4-FFF2-40B4-BE49-F238E27FC236}">
+                <a16:creationId xmlns:a16="http://schemas.microsoft.com/office/drawing/2014/main" id="{253D059B-4C0F-B89F-BE7E-CCAFAC71283A}"/>
+              </a:ext>
+            </a:extLst>
+          </p:cNvPr>
+          <p:cNvPicPr>
+            <a:picLocks noChangeAspect="1"/>
+          </p:cNvPicPr>
+          <p:nvPr/>
+        </p:nvPicPr>
+        <p:blipFill>
+          <a:blip r:embed="rId5"/>
+          <a:stretch>
+            <a:fillRect/>
+          </a:stretch>
+        </p:blipFill>
+        <p:spPr>
+          <a:xfrm>
+            <a:off x="577105" y="2902020"/>
+            <a:ext cx="1377615" cy="1032213"/>
+          </a:xfrm>
+          <a:prstGeom prst="rect">
+            <a:avLst/>
+          </a:prstGeom>
+        </p:spPr>
+      </p:pic>
+      <p:sp>
+        <p:nvSpPr>
+          <p:cNvPr id="48" name="Textfeld 47">
+            <a:extLst>
+              <a:ext uri="{FF2B5EF4-FFF2-40B4-BE49-F238E27FC236}">
+                <a16:creationId xmlns:a16="http://schemas.microsoft.com/office/drawing/2014/main" id="{1E4A0C9B-DB08-EF16-59C9-90947A237671}"/>
+              </a:ext>
+            </a:extLst>
+          </p:cNvPr>
+          <p:cNvSpPr txBox="1"/>
+          <p:nvPr/>
+        </p:nvSpPr>
+        <p:spPr>
+          <a:xfrm>
+            <a:off x="527725" y="3927613"/>
+            <a:ext cx="1497564" cy="261610"/>
+          </a:xfrm>
+          <a:prstGeom prst="rect">
+            <a:avLst/>
+          </a:prstGeom>
+          <a:noFill/>
+        </p:spPr>
+        <p:txBody>
+          <a:bodyPr wrap="square" rtlCol="0">
+            <a:spAutoFit/>
+          </a:bodyPr>
+          <a:lstStyle/>
+          <a:p>
+            <a:r>
+              <a:rPr lang="en-US" sz="1100" dirty="0"/>
+              <a:t>Reference power data</a:t>
+            </a:r>
+            <a:endParaRPr lang="de-DE" dirty="0"/>
+          </a:p>
+        </p:txBody>
+      </p:sp>
+      <p:pic>
+        <p:nvPicPr>
+          <p:cNvPr id="65" name="Grafik 64">
+            <a:extLst>
+              <a:ext uri="{FF2B5EF4-FFF2-40B4-BE49-F238E27FC236}">
+                <a16:creationId xmlns:a16="http://schemas.microsoft.com/office/drawing/2014/main" id="{40CC10EE-C351-BE5B-064E-F8D440250E88}"/>
+              </a:ext>
+            </a:extLst>
+          </p:cNvPr>
+          <p:cNvPicPr>
+            <a:picLocks noChangeAspect="1"/>
+          </p:cNvPicPr>
+          <p:nvPr/>
+        </p:nvPicPr>
+        <p:blipFill rotWithShape="1">
+          <a:blip r:embed="rId6"/>
+          <a:srcRect l="1313" t="4028" r="50000" b="1"/>
+          <a:stretch/>
+        </p:blipFill>
+        <p:spPr>
+          <a:xfrm>
+            <a:off x="8511627" y="1881314"/>
+            <a:ext cx="3474550" cy="3095372"/>
+          </a:xfrm>
+          <a:prstGeom prst="rect">
+            <a:avLst/>
+          </a:prstGeom>
+        </p:spPr>
+      </p:pic>
+    </p:spTree>
+    <p:extLst>
+      <p:ext uri="{BB962C8B-B14F-4D97-AF65-F5344CB8AC3E}">
+        <p14:creationId xmlns:p14="http://schemas.microsoft.com/office/powerpoint/2010/main" val="1211478565"/>
       </p:ext>
     </p:extLst>
   </p:cSld>

</xml_diff>

<commit_message>
hopefully only related works missing
</commit_message>
<xml_diff>
--- a/presentations/GrafikenThesis.pptx
+++ b/presentations/GrafikenThesis.pptx
@@ -264,7 +264,7 @@
           <a:p>
             <a:fld id="{1E68AC87-6ADD-4255-8209-B0E6CC8A4267}" type="datetimeFigureOut">
               <a:rPr lang="de-DE" smtClean="0"/>
-              <a:t>14.09.2023</a:t>
+              <a:t>27.09.2023</a:t>
             </a:fld>
             <a:endParaRPr lang="de-DE"/>
           </a:p>
@@ -462,7 +462,7 @@
           <a:p>
             <a:fld id="{1E68AC87-6ADD-4255-8209-B0E6CC8A4267}" type="datetimeFigureOut">
               <a:rPr lang="de-DE" smtClean="0"/>
-              <a:t>14.09.2023</a:t>
+              <a:t>27.09.2023</a:t>
             </a:fld>
             <a:endParaRPr lang="de-DE"/>
           </a:p>
@@ -670,7 +670,7 @@
           <a:p>
             <a:fld id="{1E68AC87-6ADD-4255-8209-B0E6CC8A4267}" type="datetimeFigureOut">
               <a:rPr lang="de-DE" smtClean="0"/>
-              <a:t>14.09.2023</a:t>
+              <a:t>27.09.2023</a:t>
             </a:fld>
             <a:endParaRPr lang="de-DE"/>
           </a:p>
@@ -868,7 +868,7 @@
           <a:p>
             <a:fld id="{1E68AC87-6ADD-4255-8209-B0E6CC8A4267}" type="datetimeFigureOut">
               <a:rPr lang="de-DE" smtClean="0"/>
-              <a:t>14.09.2023</a:t>
+              <a:t>27.09.2023</a:t>
             </a:fld>
             <a:endParaRPr lang="de-DE"/>
           </a:p>
@@ -1143,7 +1143,7 @@
           <a:p>
             <a:fld id="{1E68AC87-6ADD-4255-8209-B0E6CC8A4267}" type="datetimeFigureOut">
               <a:rPr lang="de-DE" smtClean="0"/>
-              <a:t>14.09.2023</a:t>
+              <a:t>27.09.2023</a:t>
             </a:fld>
             <a:endParaRPr lang="de-DE"/>
           </a:p>
@@ -1408,7 +1408,7 @@
           <a:p>
             <a:fld id="{1E68AC87-6ADD-4255-8209-B0E6CC8A4267}" type="datetimeFigureOut">
               <a:rPr lang="de-DE" smtClean="0"/>
-              <a:t>14.09.2023</a:t>
+              <a:t>27.09.2023</a:t>
             </a:fld>
             <a:endParaRPr lang="de-DE"/>
           </a:p>
@@ -1820,7 +1820,7 @@
           <a:p>
             <a:fld id="{1E68AC87-6ADD-4255-8209-B0E6CC8A4267}" type="datetimeFigureOut">
               <a:rPr lang="de-DE" smtClean="0"/>
-              <a:t>14.09.2023</a:t>
+              <a:t>27.09.2023</a:t>
             </a:fld>
             <a:endParaRPr lang="de-DE"/>
           </a:p>
@@ -1961,7 +1961,7 @@
           <a:p>
             <a:fld id="{1E68AC87-6ADD-4255-8209-B0E6CC8A4267}" type="datetimeFigureOut">
               <a:rPr lang="de-DE" smtClean="0"/>
-              <a:t>14.09.2023</a:t>
+              <a:t>27.09.2023</a:t>
             </a:fld>
             <a:endParaRPr lang="de-DE"/>
           </a:p>
@@ -2074,7 +2074,7 @@
           <a:p>
             <a:fld id="{1E68AC87-6ADD-4255-8209-B0E6CC8A4267}" type="datetimeFigureOut">
               <a:rPr lang="de-DE" smtClean="0"/>
-              <a:t>14.09.2023</a:t>
+              <a:t>27.09.2023</a:t>
             </a:fld>
             <a:endParaRPr lang="de-DE"/>
           </a:p>
@@ -2385,7 +2385,7 @@
           <a:p>
             <a:fld id="{1E68AC87-6ADD-4255-8209-B0E6CC8A4267}" type="datetimeFigureOut">
               <a:rPr lang="de-DE" smtClean="0"/>
-              <a:t>14.09.2023</a:t>
+              <a:t>27.09.2023</a:t>
             </a:fld>
             <a:endParaRPr lang="de-DE"/>
           </a:p>
@@ -2673,7 +2673,7 @@
           <a:p>
             <a:fld id="{1E68AC87-6ADD-4255-8209-B0E6CC8A4267}" type="datetimeFigureOut">
               <a:rPr lang="de-DE" smtClean="0"/>
-              <a:t>14.09.2023</a:t>
+              <a:t>27.09.2023</a:t>
             </a:fld>
             <a:endParaRPr lang="de-DE"/>
           </a:p>
@@ -2914,7 +2914,7 @@
           <a:p>
             <a:fld id="{1E68AC87-6ADD-4255-8209-B0E6CC8A4267}" type="datetimeFigureOut">
               <a:rPr lang="de-DE" smtClean="0"/>
-              <a:t>14.09.2023</a:t>
+              <a:t>27.09.2023</a:t>
             </a:fld>
             <a:endParaRPr lang="de-DE"/>
           </a:p>
@@ -3345,7 +3345,7 @@
         </p:nvSpPr>
         <p:spPr>
           <a:xfrm>
-            <a:off x="195946" y="2024744"/>
+            <a:off x="186615" y="2640564"/>
             <a:ext cx="2108718" cy="1101012"/>
           </a:xfrm>
           <a:prstGeom prst="roundRect">
@@ -3392,7 +3392,7 @@
         </p:nvSpPr>
         <p:spPr>
           <a:xfrm>
-            <a:off x="2597022" y="2024744"/>
+            <a:off x="2587691" y="2640564"/>
             <a:ext cx="2108718" cy="1101012"/>
           </a:xfrm>
           <a:prstGeom prst="roundRect">
@@ -3439,7 +3439,7 @@
         </p:nvSpPr>
         <p:spPr>
           <a:xfrm>
-            <a:off x="5041641" y="2018394"/>
+            <a:off x="5032310" y="2634214"/>
             <a:ext cx="2108718" cy="1101012"/>
           </a:xfrm>
           <a:prstGeom prst="roundRect">
@@ -3472,8 +3472,8 @@
           </a:p>
         </p:txBody>
       </p:sp>
-      <mc:AlternateContent xmlns:mc="http://schemas.openxmlformats.org/markup-compatibility/2006" xmlns:a14="http://schemas.microsoft.com/office/drawing/2010/main">
-        <mc:Choice Requires="a14">
+      <mc:AlternateContent xmlns:mc="http://schemas.openxmlformats.org/markup-compatibility/2006">
+        <mc:Choice xmlns:a14="http://schemas.microsoft.com/office/drawing/2010/main" Requires="a14">
           <p:sp>
             <p:nvSpPr>
               <p:cNvPr id="7" name="Rechteck: abgerundete Ecken 6">
@@ -3488,7 +3488,7 @@
             </p:nvSpPr>
             <p:spPr>
               <a:xfrm>
-                <a:off x="7486260" y="2024744"/>
+                <a:off x="7476929" y="2640564"/>
                 <a:ext cx="2108718" cy="1101012"/>
               </a:xfrm>
               <a:prstGeom prst="roundRect">
@@ -3571,12 +3571,31 @@
                             </a:rPr>
                             <m:t>−</m:t>
                           </m:r>
-                          <m:r>
-                            <a:rPr lang="de-DE" b="0" i="1" smtClean="0">
-                              <a:latin typeface="Cambria Math" panose="02040503050406030204" pitchFamily="18" charset="0"/>
-                            </a:rPr>
-                            <m:t>𝑝𝑜𝑠𝑡𝑠</m:t>
-                          </m:r>
+                          <m:sSub>
+                            <m:sSubPr>
+                              <m:ctrlPr>
+                                <a:rPr lang="de-DE" b="0" i="1" smtClean="0">
+                                  <a:latin typeface="Cambria Math" panose="02040503050406030204" pitchFamily="18" charset="0"/>
+                                </a:rPr>
+                              </m:ctrlPr>
+                            </m:sSubPr>
+                            <m:e>
+                              <m:r>
+                                <a:rPr lang="de-DE" b="0" i="1" smtClean="0">
+                                  <a:latin typeface="Cambria Math" panose="02040503050406030204" pitchFamily="18" charset="0"/>
+                                </a:rPr>
+                                <m:t>𝑛</m:t>
+                              </m:r>
+                            </m:e>
+                            <m:sub>
+                              <m:r>
+                                <a:rPr lang="de-DE" b="0" i="1" smtClean="0">
+                                  <a:latin typeface="Cambria Math" panose="02040503050406030204" pitchFamily="18" charset="0"/>
+                                </a:rPr>
+                                <m:t>𝑝𝑜𝑠𝑡𝑠</m:t>
+                              </m:r>
+                            </m:sub>
+                          </m:sSub>
                           <m:d>
                             <m:dPr>
                               <m:ctrlPr>
@@ -3618,7 +3637,7 @@
             </p:txBody>
           </p:sp>
         </mc:Choice>
-        <mc:Fallback xmlns="">
+        <mc:Fallback>
           <p:sp>
             <p:nvSpPr>
               <p:cNvPr id="7" name="Rechteck: abgerundete Ecken 6">
@@ -3635,7 +3654,7 @@
             </p:nvSpPr>
             <p:spPr>
               <a:xfrm>
-                <a:off x="7486260" y="2024744"/>
+                <a:off x="7476929" y="2640564"/>
                 <a:ext cx="2108718" cy="1101012"/>
               </a:xfrm>
               <a:prstGeom prst="roundRect">
@@ -3677,7 +3696,7 @@
         </p:nvSpPr>
         <p:spPr>
           <a:xfrm>
-            <a:off x="9831354" y="2024744"/>
+            <a:off x="9822023" y="2640564"/>
             <a:ext cx="2108718" cy="1101012"/>
           </a:xfrm>
           <a:prstGeom prst="roundRect">
@@ -3727,7 +3746,7 @@
         </p:nvCxnSpPr>
         <p:spPr>
           <a:xfrm>
-            <a:off x="2304664" y="2575250"/>
+            <a:off x="2295333" y="3191070"/>
             <a:ext cx="292358" cy="0"/>
           </a:xfrm>
           <a:prstGeom prst="straightConnector1">
@@ -3769,7 +3788,7 @@
         </p:nvCxnSpPr>
         <p:spPr>
           <a:xfrm flipV="1">
-            <a:off x="4705740" y="2568900"/>
+            <a:off x="4696409" y="3184720"/>
             <a:ext cx="335901" cy="6350"/>
           </a:xfrm>
           <a:prstGeom prst="straightConnector1">
@@ -3811,7 +3830,7 @@
         </p:nvCxnSpPr>
         <p:spPr>
           <a:xfrm>
-            <a:off x="7150359" y="2568900"/>
+            <a:off x="7141028" y="3184720"/>
             <a:ext cx="335901" cy="6350"/>
           </a:xfrm>
           <a:prstGeom prst="straightConnector1">
@@ -3853,7 +3872,7 @@
         </p:nvCxnSpPr>
         <p:spPr>
           <a:xfrm rot="5400000" flipH="1" flipV="1">
-            <a:off x="9713166" y="852197"/>
+            <a:off x="9703835" y="1468017"/>
             <a:ext cx="12700" cy="2345094"/>
           </a:xfrm>
           <a:prstGeom prst="bentConnector3">
@@ -3897,7 +3916,7 @@
         </p:nvCxnSpPr>
         <p:spPr>
           <a:xfrm rot="5400000">
-            <a:off x="9713166" y="1953209"/>
+            <a:off x="9703835" y="2569029"/>
             <a:ext cx="12700" cy="2345094"/>
           </a:xfrm>
           <a:prstGeom prst="bentConnector3">
@@ -4100,7 +4119,7 @@
         </p:nvSpPr>
         <p:spPr>
           <a:xfrm>
-            <a:off x="195946" y="2024744"/>
+            <a:off x="1362272" y="2780523"/>
             <a:ext cx="2108718" cy="1101012"/>
           </a:xfrm>
           <a:prstGeom prst="roundRect">
@@ -4147,7 +4166,7 @@
         </p:nvSpPr>
         <p:spPr>
           <a:xfrm>
-            <a:off x="2597022" y="2024744"/>
+            <a:off x="3763348" y="2780523"/>
             <a:ext cx="2108718" cy="1101012"/>
           </a:xfrm>
           <a:prstGeom prst="roundRect">
@@ -4194,7 +4213,7 @@
         </p:nvSpPr>
         <p:spPr>
           <a:xfrm>
-            <a:off x="5041641" y="2018394"/>
+            <a:off x="6207967" y="2774173"/>
             <a:ext cx="2108718" cy="1101012"/>
           </a:xfrm>
           <a:prstGeom prst="roundRect">
@@ -4241,7 +4260,7 @@
         </p:nvSpPr>
         <p:spPr>
           <a:xfrm>
-            <a:off x="7486260" y="2024744"/>
+            <a:off x="8652586" y="2780523"/>
             <a:ext cx="2108718" cy="1101012"/>
           </a:xfrm>
           <a:prstGeom prst="roundRect">
@@ -4298,7 +4317,7 @@
         </p:nvCxnSpPr>
         <p:spPr>
           <a:xfrm>
-            <a:off x="2304664" y="2575250"/>
+            <a:off x="3470990" y="3331029"/>
             <a:ext cx="292358" cy="0"/>
           </a:xfrm>
           <a:prstGeom prst="straightConnector1">
@@ -4333,6 +4352,7 @@
             </a:extLst>
           </p:cNvPr>
           <p:cNvCxnSpPr>
+            <a:cxnSpLocks/>
             <a:stCxn id="5" idx="3"/>
             <a:endCxn id="6" idx="1"/>
           </p:cNvCxnSpPr>
@@ -4340,7 +4360,7 @@
         </p:nvCxnSpPr>
         <p:spPr>
           <a:xfrm flipV="1">
-            <a:off x="4705740" y="2568900"/>
+            <a:off x="5872066" y="3324679"/>
             <a:ext cx="335901" cy="6350"/>
           </a:xfrm>
           <a:prstGeom prst="straightConnector1">
@@ -4382,7 +4402,7 @@
         </p:nvCxnSpPr>
         <p:spPr>
           <a:xfrm>
-            <a:off x="7150359" y="2568900"/>
+            <a:off x="8316685" y="3324679"/>
             <a:ext cx="335901" cy="6350"/>
           </a:xfrm>
           <a:prstGeom prst="straightConnector1">
@@ -7075,339 +7095,78 @@
           </a:p>
         </p:txBody>
       </p:sp>
-      <mc:AlternateContent xmlns:mc="http://schemas.openxmlformats.org/markup-compatibility/2006" xmlns:a14="http://schemas.microsoft.com/office/drawing/2010/main">
-        <mc:Choice Requires="a14">
-          <p:sp>
-            <p:nvSpPr>
-              <p:cNvPr id="5" name="Rechteck: abgerundete Ecken 4">
-                <a:extLst>
-                  <a:ext uri="{FF2B5EF4-FFF2-40B4-BE49-F238E27FC236}">
-                    <a16:creationId xmlns:a16="http://schemas.microsoft.com/office/drawing/2014/main" id="{7578C3A9-59A2-1568-E5E3-55796468011A}"/>
-                  </a:ext>
-                </a:extLst>
-              </p:cNvPr>
-              <p:cNvSpPr/>
-              <p:nvPr/>
-            </p:nvSpPr>
-            <p:spPr>
-              <a:xfrm>
-                <a:off x="2597022" y="746449"/>
-                <a:ext cx="5595256" cy="5318449"/>
-              </a:xfrm>
-              <a:prstGeom prst="roundRect">
-                <a:avLst/>
-              </a:prstGeom>
-            </p:spPr>
-            <p:style>
-              <a:lnRef idx="2">
-                <a:schemeClr val="dk1"/>
-              </a:lnRef>
-              <a:fillRef idx="1">
-                <a:schemeClr val="lt1"/>
-              </a:fillRef>
-              <a:effectRef idx="0">
-                <a:schemeClr val="dk1"/>
-              </a:effectRef>
-              <a:fontRef idx="minor">
-                <a:schemeClr val="dk1"/>
-              </a:fontRef>
-            </p:style>
-            <p:txBody>
-              <a:bodyPr rtlCol="0" anchor="ctr"/>
-              <a:lstStyle/>
-              <a:p>
-                <a:pPr algn="ctr"/>
-                <a:r>
-                  <a:rPr lang="en-US" dirty="0"/>
-                  <a:t>Simulation steps:</a:t>
-                </a:r>
-              </a:p>
-              <a:p>
-                <a:pPr algn="ctr"/>
-                <a:endParaRPr lang="en-US" dirty="0"/>
-              </a:p>
-              <a:p>
-                <a:pPr marL="342900" indent="-342900">
-                  <a:buFont typeface="+mj-lt"/>
-                  <a:buAutoNum type="arabicPeriod"/>
-                </a:pPr>
-                <a:r>
-                  <a:rPr lang="en-US" dirty="0"/>
-                  <a:t>Initialize the network graph with one node as a source of information</a:t>
-                </a:r>
-              </a:p>
-              <a:p>
-                <a:pPr marL="342900" indent="-342900">
-                  <a:buFont typeface="+mj-lt"/>
-                  <a:buAutoNum type="arabicPeriod"/>
-                </a:pPr>
-                <a:r>
-                  <a:rPr lang="en-US" dirty="0"/>
-                  <a:t>For each iteration step </a:t>
-                </a:r>
-                <a14:m>
-                  <m:oMath xmlns:m="http://schemas.openxmlformats.org/officeDocument/2006/math">
-                    <m:sSub>
-                      <m:sSubPr>
-                        <m:ctrlPr>
-                          <a:rPr lang="en-US" i="1" smtClean="0">
-                            <a:latin typeface="Cambria Math" panose="02040503050406030204" pitchFamily="18" charset="0"/>
-                          </a:rPr>
-                        </m:ctrlPr>
-                      </m:sSubPr>
-                      <m:e>
-                        <m:r>
-                          <a:rPr lang="de-DE" b="0" i="1" smtClean="0">
-                            <a:latin typeface="Cambria Math" panose="02040503050406030204" pitchFamily="18" charset="0"/>
-                          </a:rPr>
-                          <m:t>𝑡</m:t>
-                        </m:r>
-                      </m:e>
-                      <m:sub>
-                        <m:r>
-                          <a:rPr lang="de-DE" b="0" i="1" smtClean="0">
-                            <a:latin typeface="Cambria Math" panose="02040503050406030204" pitchFamily="18" charset="0"/>
-                          </a:rPr>
-                          <m:t>𝑖</m:t>
-                        </m:r>
-                      </m:sub>
-                    </m:sSub>
-                  </m:oMath>
-                </a14:m>
-                <a:r>
-                  <a:rPr lang="en-US" dirty="0"/>
-                  <a:t>:</a:t>
-                </a:r>
-              </a:p>
-              <a:p>
-                <a:pPr marL="800100" lvl="1" indent="-342900">
-                  <a:buFont typeface="+mj-lt"/>
-                  <a:buAutoNum type="alphaLcPeriod"/>
-                </a:pPr>
-                <a:r>
-                  <a:rPr lang="en-US" sz="1600" dirty="0"/>
-                  <a:t>Calculate the power consumption as the sum of the power consumption of all nodes, where each node </a:t>
-                </a:r>
-                <a14:m>
-                  <m:oMath xmlns:m="http://schemas.openxmlformats.org/officeDocument/2006/math">
-                    <m:r>
-                      <a:rPr lang="de-DE" sz="1600" b="0" i="1" smtClean="0">
-                        <a:latin typeface="Cambria Math" panose="02040503050406030204" pitchFamily="18" charset="0"/>
-                      </a:rPr>
-                      <m:t>𝑛</m:t>
-                    </m:r>
-                  </m:oMath>
-                </a14:m>
-                <a:r>
-                  <a:rPr lang="en-US" sz="1600" dirty="0"/>
-                  <a:t> consumes power given the equation </a:t>
-                </a:r>
-                <a14:m>
-                  <m:oMath xmlns:m="http://schemas.openxmlformats.org/officeDocument/2006/math">
-                    <m:sSub>
-                      <m:sSubPr>
-                        <m:ctrlPr>
-                          <a:rPr lang="en-US" sz="1600" i="1" smtClean="0">
-                            <a:latin typeface="Cambria Math" panose="02040503050406030204" pitchFamily="18" charset="0"/>
-                          </a:rPr>
-                        </m:ctrlPr>
-                      </m:sSubPr>
-                      <m:e>
-                        <m:r>
-                          <a:rPr lang="de-DE" sz="1600" b="0" i="1" smtClean="0">
-                            <a:latin typeface="Cambria Math" panose="02040503050406030204" pitchFamily="18" charset="0"/>
-                          </a:rPr>
-                          <m:t>𝑝𝑜𝑤𝑒𝑟</m:t>
-                        </m:r>
-                      </m:e>
-                      <m:sub>
-                        <m:r>
-                          <a:rPr lang="de-DE" sz="1600" b="0" i="1" smtClean="0">
-                            <a:latin typeface="Cambria Math" panose="02040503050406030204" pitchFamily="18" charset="0"/>
-                          </a:rPr>
-                          <m:t>𝑛</m:t>
-                        </m:r>
-                      </m:sub>
-                    </m:sSub>
-                    <m:r>
-                      <a:rPr lang="de-DE" sz="1600" b="0" i="1" smtClean="0">
-                        <a:latin typeface="Cambria Math" panose="02040503050406030204" pitchFamily="18" charset="0"/>
-                      </a:rPr>
-                      <m:t>=</m:t>
-                    </m:r>
-                    <m:r>
-                      <a:rPr lang="de-DE" sz="1600" b="0" i="1" smtClean="0">
-                        <a:latin typeface="Cambria Math" panose="02040503050406030204" pitchFamily="18" charset="0"/>
-                      </a:rPr>
-                      <m:t>𝑎</m:t>
-                    </m:r>
-                    <m:r>
-                      <a:rPr lang="de-DE" sz="1600" b="0" i="1" smtClean="0">
-                        <a:latin typeface="Cambria Math" panose="02040503050406030204" pitchFamily="18" charset="0"/>
-                        <a:ea typeface="Cambria Math" panose="02040503050406030204" pitchFamily="18" charset="0"/>
-                      </a:rPr>
-                      <m:t>∙</m:t>
-                    </m:r>
-                    <m:sSub>
-                      <m:sSubPr>
-                        <m:ctrlPr>
-                          <a:rPr lang="de-DE" sz="1600" b="0" i="1" smtClean="0">
-                            <a:latin typeface="Cambria Math" panose="02040503050406030204" pitchFamily="18" charset="0"/>
-                            <a:ea typeface="Cambria Math" panose="02040503050406030204" pitchFamily="18" charset="0"/>
-                          </a:rPr>
-                        </m:ctrlPr>
-                      </m:sSubPr>
-                      <m:e>
-                        <m:r>
-                          <a:rPr lang="de-DE" sz="1600" b="0" i="1" smtClean="0">
-                            <a:latin typeface="Cambria Math" panose="02040503050406030204" pitchFamily="18" charset="0"/>
-                            <a:ea typeface="Cambria Math" panose="02040503050406030204" pitchFamily="18" charset="0"/>
-                          </a:rPr>
-                          <m:t>𝑝𝑜𝑤𝑒𝑟</m:t>
-                        </m:r>
-                      </m:e>
-                      <m:sub>
-                        <m:r>
-                          <a:rPr lang="de-DE" sz="1600" b="0" i="1" smtClean="0">
-                            <a:latin typeface="Cambria Math" panose="02040503050406030204" pitchFamily="18" charset="0"/>
-                            <a:ea typeface="Cambria Math" panose="02040503050406030204" pitchFamily="18" charset="0"/>
-                          </a:rPr>
-                          <m:t>𝑟𝑒𝑓</m:t>
-                        </m:r>
-                      </m:sub>
-                    </m:sSub>
-                    <m:r>
-                      <a:rPr lang="de-DE" sz="1600" b="0" i="1" smtClean="0">
-                        <a:latin typeface="Cambria Math" panose="02040503050406030204" pitchFamily="18" charset="0"/>
-                        <a:ea typeface="Cambria Math" panose="02040503050406030204" pitchFamily="18" charset="0"/>
-                      </a:rPr>
-                      <m:t>+</m:t>
-                    </m:r>
-                    <m:r>
-                      <a:rPr lang="de-DE" sz="1600" b="0" i="1" smtClean="0">
-                        <a:latin typeface="Cambria Math" panose="02040503050406030204" pitchFamily="18" charset="0"/>
-                        <a:ea typeface="Cambria Math" panose="02040503050406030204" pitchFamily="18" charset="0"/>
-                      </a:rPr>
-                      <m:t>𝑜𝑓𝑓𝑠𝑒𝑡</m:t>
-                    </m:r>
-                  </m:oMath>
-                </a14:m>
-                <a:r>
-                  <a:rPr lang="en-US" sz="1600" dirty="0"/>
-                  <a:t>, where </a:t>
-                </a:r>
-                <a14:m>
-                  <m:oMath xmlns:m="http://schemas.openxmlformats.org/officeDocument/2006/math">
-                    <m:r>
-                      <a:rPr lang="de-DE" sz="1600" b="0" i="1" smtClean="0">
-                        <a:latin typeface="Cambria Math" panose="02040503050406030204" pitchFamily="18" charset="0"/>
-                      </a:rPr>
-                      <m:t>𝑎</m:t>
-                    </m:r>
-                  </m:oMath>
-                </a14:m>
-                <a:r>
-                  <a:rPr lang="en-US" sz="1600" dirty="0"/>
-                  <a:t> is the constant overconsumption factor and </a:t>
-                </a:r>
-                <a14:m>
-                  <m:oMath xmlns:m="http://schemas.openxmlformats.org/officeDocument/2006/math">
-                    <m:r>
-                      <a:rPr lang="de-DE" sz="1600" b="0" i="1" smtClean="0">
-                        <a:latin typeface="Cambria Math" panose="02040503050406030204" pitchFamily="18" charset="0"/>
-                      </a:rPr>
-                      <m:t>𝑜𝑓𝑓𝑠𝑒𝑡</m:t>
-                    </m:r>
-                  </m:oMath>
-                </a14:m>
-                <a:r>
-                  <a:rPr lang="en-US" sz="1600" dirty="0"/>
-                  <a:t> is the excess power demand by the usage of the appliances defined in the JSON file</a:t>
-                </a:r>
-              </a:p>
-              <a:p>
-                <a:pPr marL="800100" lvl="1" indent="-342900">
-                  <a:buFont typeface="+mj-lt"/>
-                  <a:buAutoNum type="alphaLcPeriod"/>
-                </a:pPr>
-                <a:r>
-                  <a:rPr lang="en-US" sz="1600" dirty="0"/>
-                  <a:t>Calculate the next step of the information propagation process</a:t>
-                </a:r>
-              </a:p>
-              <a:p>
-                <a:pPr marL="1257300" lvl="2" indent="-342900">
-                  <a:buFont typeface="+mj-lt"/>
-                  <a:buAutoNum type="romanLcPeriod"/>
-                </a:pPr>
-                <a:r>
-                  <a:rPr lang="en-US" sz="1400" dirty="0"/>
-                  <a:t>Check if newly infected households will ever act on the information</a:t>
-                </a:r>
-              </a:p>
-              <a:p>
-                <a:pPr marL="1257300" lvl="2" indent="-342900">
-                  <a:buFont typeface="+mj-lt"/>
-                  <a:buAutoNum type="romanLcPeriod"/>
-                </a:pPr>
-                <a:r>
-                  <a:rPr lang="en-US" sz="1400" dirty="0"/>
-                  <a:t>Check if infected households will delay their actions</a:t>
-                </a:r>
-                <a:endParaRPr lang="en-US" dirty="0"/>
-              </a:p>
-              <a:p>
-                <a:pPr algn="ctr"/>
-                <a:endParaRPr lang="en-US" dirty="0"/>
-              </a:p>
-            </p:txBody>
-          </p:sp>
-        </mc:Choice>
-        <mc:Fallback xmlns="">
-          <p:sp>
-            <p:nvSpPr>
-              <p:cNvPr id="5" name="Rechteck: abgerundete Ecken 4">
-                <a:extLst>
-                  <a:ext uri="{FF2B5EF4-FFF2-40B4-BE49-F238E27FC236}">
-                    <a16:creationId xmlns:a16="http://schemas.microsoft.com/office/drawing/2014/main" id="{7578C3A9-59A2-1568-E5E3-55796468011A}"/>
-                  </a:ext>
-                </a:extLst>
-              </p:cNvPr>
-              <p:cNvSpPr>
-                <a:spLocks noRot="1" noChangeAspect="1" noMove="1" noResize="1" noEditPoints="1" noAdjustHandles="1" noChangeArrowheads="1" noChangeShapeType="1" noTextEdit="1"/>
-              </p:cNvSpPr>
-              <p:nvPr/>
-            </p:nvSpPr>
-            <p:spPr>
-              <a:xfrm>
-                <a:off x="2597022" y="746449"/>
-                <a:ext cx="5595256" cy="5318449"/>
-              </a:xfrm>
-              <a:prstGeom prst="roundRect">
-                <a:avLst/>
-              </a:prstGeom>
-              <a:blipFill>
-                <a:blip r:embed="rId2"/>
-                <a:stretch>
-                  <a:fillRect/>
-                </a:stretch>
-              </a:blipFill>
-            </p:spPr>
-            <p:txBody>
-              <a:bodyPr/>
-              <a:lstStyle/>
-              <a:p>
-                <a:r>
-                  <a:rPr lang="de-DE">
-                    <a:noFill/>
-                  </a:rPr>
-                  <a:t> </a:t>
-                </a:r>
-              </a:p>
-            </p:txBody>
-          </p:sp>
-        </mc:Fallback>
-      </mc:AlternateContent>
+      <p:sp>
+        <p:nvSpPr>
+          <p:cNvPr id="5" name="Rechteck: abgerundete Ecken 4">
+            <a:extLst>
+              <a:ext uri="{FF2B5EF4-FFF2-40B4-BE49-F238E27FC236}">
+                <a16:creationId xmlns:a16="http://schemas.microsoft.com/office/drawing/2014/main" id="{7578C3A9-59A2-1568-E5E3-55796468011A}"/>
+              </a:ext>
+            </a:extLst>
+          </p:cNvPr>
+          <p:cNvSpPr/>
+          <p:nvPr/>
+        </p:nvSpPr>
+        <p:spPr>
+          <a:xfrm>
+            <a:off x="2577353" y="2539958"/>
+            <a:ext cx="5595256" cy="1731427"/>
+          </a:xfrm>
+          <a:prstGeom prst="roundRect">
+            <a:avLst/>
+          </a:prstGeom>
+        </p:spPr>
+        <p:style>
+          <a:lnRef idx="2">
+            <a:schemeClr val="dk1"/>
+          </a:lnRef>
+          <a:fillRef idx="1">
+            <a:schemeClr val="lt1"/>
+          </a:fillRef>
+          <a:effectRef idx="0">
+            <a:schemeClr val="dk1"/>
+          </a:effectRef>
+          <a:fontRef idx="minor">
+            <a:schemeClr val="dk1"/>
+          </a:fontRef>
+        </p:style>
+        <p:txBody>
+          <a:bodyPr rtlCol="0" anchor="ctr"/>
+          <a:lstStyle/>
+          <a:p>
+            <a:pPr algn="ctr"/>
+            <a:endParaRPr lang="en-US" dirty="0"/>
+          </a:p>
+          <a:p>
+            <a:pPr marL="342900" indent="-342900">
+              <a:buFont typeface="+mj-lt"/>
+              <a:buAutoNum type="arabicPeriod"/>
+            </a:pPr>
+            <a:r>
+              <a:rPr lang="en-US" dirty="0"/>
+              <a:t>Initialize the network graph with one node as a source of information</a:t>
+            </a:r>
+          </a:p>
+          <a:p>
+            <a:pPr marL="342900" indent="-342900">
+              <a:buFont typeface="+mj-lt"/>
+              <a:buAutoNum type="arabicPeriod"/>
+            </a:pPr>
+            <a:r>
+              <a:rPr lang="de-DE" dirty="0"/>
+              <a:t>Run </a:t>
+            </a:r>
+            <a:r>
+              <a:rPr lang="en-US" dirty="0"/>
+              <a:t>the simulation algorithm</a:t>
+            </a:r>
+          </a:p>
+          <a:p>
+            <a:pPr algn="ctr"/>
+            <a:endParaRPr lang="en-US" dirty="0"/>
+          </a:p>
+        </p:txBody>
+      </p:sp>
       <p:cxnSp>
         <p:nvCxnSpPr>
           <p:cNvPr id="10" name="Gerade Verbindung mit Pfeil 9">
@@ -7425,9 +7184,9 @@
           <p:nvPr/>
         </p:nvCxnSpPr>
         <p:spPr>
-          <a:xfrm>
-            <a:off x="2320990" y="3405673"/>
-            <a:ext cx="276032" cy="1"/>
+          <a:xfrm flipV="1">
+            <a:off x="2320990" y="3405672"/>
+            <a:ext cx="256363" cy="1"/>
           </a:xfrm>
           <a:prstGeom prst="straightConnector1">
             <a:avLst/>
@@ -7466,7 +7225,7 @@
           <p:nvPr/>
         </p:nvPicPr>
         <p:blipFill rotWithShape="1">
-          <a:blip r:embed="rId3">
+          <a:blip r:embed="rId2">
             <a:extLst>
               <a:ext uri="{28A0092B-C50C-407E-A947-70E740481C1C}">
                 <a14:useLocalDpi xmlns:a14="http://schemas.microsoft.com/office/drawing/2010/main" val="0"/>
@@ -7537,7 +7296,7 @@
           <p:nvPr/>
         </p:nvPicPr>
         <p:blipFill>
-          <a:blip r:embed="rId4"/>
+          <a:blip r:embed="rId3"/>
           <a:stretch>
             <a:fillRect/>
           </a:stretch>
@@ -7704,9 +7463,9 @@
           <p:nvPr/>
         </p:nvCxnSpPr>
         <p:spPr>
-          <a:xfrm flipV="1">
-            <a:off x="8192278" y="3405673"/>
-            <a:ext cx="276032" cy="1"/>
+          <a:xfrm>
+            <a:off x="8172609" y="3405672"/>
+            <a:ext cx="295701" cy="1"/>
           </a:xfrm>
           <a:prstGeom prst="straightConnector1">
             <a:avLst/>
@@ -7745,7 +7504,7 @@
           <p:nvPr/>
         </p:nvPicPr>
         <p:blipFill>
-          <a:blip r:embed="rId5"/>
+          <a:blip r:embed="rId4"/>
           <a:stretch>
             <a:fillRect/>
           </a:stretch>
@@ -7811,7 +7570,7 @@
           <p:nvPr/>
         </p:nvPicPr>
         <p:blipFill rotWithShape="1">
-          <a:blip r:embed="rId6"/>
+          <a:blip r:embed="rId5"/>
           <a:srcRect l="1313" t="4028" r="50000" b="1"/>
           <a:stretch/>
         </p:blipFill>

</xml_diff>

<commit_message>
almost done: only proofread necessary
</commit_message>
<xml_diff>
--- a/presentations/GrafikenThesis.pptx
+++ b/presentations/GrafikenThesis.pptx
@@ -264,7 +264,7 @@
           <a:p>
             <a:fld id="{1E68AC87-6ADD-4255-8209-B0E6CC8A4267}" type="datetimeFigureOut">
               <a:rPr lang="de-DE" smtClean="0"/>
-              <a:t>03.10.2023</a:t>
+              <a:t>04.10.2023</a:t>
             </a:fld>
             <a:endParaRPr lang="de-DE"/>
           </a:p>
@@ -462,7 +462,7 @@
           <a:p>
             <a:fld id="{1E68AC87-6ADD-4255-8209-B0E6CC8A4267}" type="datetimeFigureOut">
               <a:rPr lang="de-DE" smtClean="0"/>
-              <a:t>03.10.2023</a:t>
+              <a:t>04.10.2023</a:t>
             </a:fld>
             <a:endParaRPr lang="de-DE"/>
           </a:p>
@@ -670,7 +670,7 @@
           <a:p>
             <a:fld id="{1E68AC87-6ADD-4255-8209-B0E6CC8A4267}" type="datetimeFigureOut">
               <a:rPr lang="de-DE" smtClean="0"/>
-              <a:t>03.10.2023</a:t>
+              <a:t>04.10.2023</a:t>
             </a:fld>
             <a:endParaRPr lang="de-DE"/>
           </a:p>
@@ -868,7 +868,7 @@
           <a:p>
             <a:fld id="{1E68AC87-6ADD-4255-8209-B0E6CC8A4267}" type="datetimeFigureOut">
               <a:rPr lang="de-DE" smtClean="0"/>
-              <a:t>03.10.2023</a:t>
+              <a:t>04.10.2023</a:t>
             </a:fld>
             <a:endParaRPr lang="de-DE"/>
           </a:p>
@@ -1143,7 +1143,7 @@
           <a:p>
             <a:fld id="{1E68AC87-6ADD-4255-8209-B0E6CC8A4267}" type="datetimeFigureOut">
               <a:rPr lang="de-DE" smtClean="0"/>
-              <a:t>03.10.2023</a:t>
+              <a:t>04.10.2023</a:t>
             </a:fld>
             <a:endParaRPr lang="de-DE"/>
           </a:p>
@@ -1408,7 +1408,7 @@
           <a:p>
             <a:fld id="{1E68AC87-6ADD-4255-8209-B0E6CC8A4267}" type="datetimeFigureOut">
               <a:rPr lang="de-DE" smtClean="0"/>
-              <a:t>03.10.2023</a:t>
+              <a:t>04.10.2023</a:t>
             </a:fld>
             <a:endParaRPr lang="de-DE"/>
           </a:p>
@@ -1820,7 +1820,7 @@
           <a:p>
             <a:fld id="{1E68AC87-6ADD-4255-8209-B0E6CC8A4267}" type="datetimeFigureOut">
               <a:rPr lang="de-DE" smtClean="0"/>
-              <a:t>03.10.2023</a:t>
+              <a:t>04.10.2023</a:t>
             </a:fld>
             <a:endParaRPr lang="de-DE"/>
           </a:p>
@@ -1961,7 +1961,7 @@
           <a:p>
             <a:fld id="{1E68AC87-6ADD-4255-8209-B0E6CC8A4267}" type="datetimeFigureOut">
               <a:rPr lang="de-DE" smtClean="0"/>
-              <a:t>03.10.2023</a:t>
+              <a:t>04.10.2023</a:t>
             </a:fld>
             <a:endParaRPr lang="de-DE"/>
           </a:p>
@@ -2074,7 +2074,7 @@
           <a:p>
             <a:fld id="{1E68AC87-6ADD-4255-8209-B0E6CC8A4267}" type="datetimeFigureOut">
               <a:rPr lang="de-DE" smtClean="0"/>
-              <a:t>03.10.2023</a:t>
+              <a:t>04.10.2023</a:t>
             </a:fld>
             <a:endParaRPr lang="de-DE"/>
           </a:p>
@@ -2385,7 +2385,7 @@
           <a:p>
             <a:fld id="{1E68AC87-6ADD-4255-8209-B0E6CC8A4267}" type="datetimeFigureOut">
               <a:rPr lang="de-DE" smtClean="0"/>
-              <a:t>03.10.2023</a:t>
+              <a:t>04.10.2023</a:t>
             </a:fld>
             <a:endParaRPr lang="de-DE"/>
           </a:p>
@@ -2673,7 +2673,7 @@
           <a:p>
             <a:fld id="{1E68AC87-6ADD-4255-8209-B0E6CC8A4267}" type="datetimeFigureOut">
               <a:rPr lang="de-DE" smtClean="0"/>
-              <a:t>03.10.2023</a:t>
+              <a:t>04.10.2023</a:t>
             </a:fld>
             <a:endParaRPr lang="de-DE"/>
           </a:p>
@@ -2914,7 +2914,7 @@
           <a:p>
             <a:fld id="{1E68AC87-6ADD-4255-8209-B0E6CC8A4267}" type="datetimeFigureOut">
               <a:rPr lang="de-DE" smtClean="0"/>
-              <a:t>03.10.2023</a:t>
+              <a:t>04.10.2023</a:t>
             </a:fld>
             <a:endParaRPr lang="de-DE"/>
           </a:p>
@@ -3420,7 +3420,7 @@
             <a:pPr algn="ctr"/>
             <a:r>
               <a:rPr lang="en-US" dirty="0"/>
-              <a:t>Count the amount of social media posts over a given amount of time</a:t>
+              <a:t>Count the number of social media posts over a given amount of time</a:t>
             </a:r>
           </a:p>
         </p:txBody>
@@ -3472,8 +3472,8 @@
           </a:p>
         </p:txBody>
       </p:sp>
-      <mc:AlternateContent xmlns:mc="http://schemas.openxmlformats.org/markup-compatibility/2006">
-        <mc:Choice xmlns:a14="http://schemas.microsoft.com/office/drawing/2010/main" Requires="a14">
+      <mc:AlternateContent xmlns:mc="http://schemas.openxmlformats.org/markup-compatibility/2006" xmlns:a14="http://schemas.microsoft.com/office/drawing/2010/main">
+        <mc:Choice Requires="a14">
           <p:sp>
             <p:nvSpPr>
               <p:cNvPr id="7" name="Rechteck: abgerundete Ecken 6">
@@ -3637,7 +3637,7 @@
             </p:txBody>
           </p:sp>
         </mc:Choice>
-        <mc:Fallback>
+        <mc:Fallback xmlns="">
           <p:sp>
             <p:nvSpPr>
               <p:cNvPr id="7" name="Rechteck: abgerundete Ecken 6">

</xml_diff>